<commit_message>
amended some of the stimuli
</commit_message>
<xml_diff>
--- a/control_task/stimuli/originals_SAPC_Task.pptx
+++ b/control_task/stimuli/originals_SAPC_Task.pptx
@@ -10,32 +10,33 @@
     <p:sldId id="282" r:id="rId4"/>
     <p:sldId id="3497" r:id="rId5"/>
     <p:sldId id="3519" r:id="rId6"/>
-    <p:sldId id="3480" r:id="rId7"/>
-    <p:sldId id="3482" r:id="rId8"/>
-    <p:sldId id="3484" r:id="rId9"/>
-    <p:sldId id="3486" r:id="rId10"/>
-    <p:sldId id="3521" r:id="rId11"/>
-    <p:sldId id="3523" r:id="rId12"/>
-    <p:sldId id="3525" r:id="rId13"/>
-    <p:sldId id="3527" r:id="rId14"/>
-    <p:sldId id="283" r:id="rId15"/>
-    <p:sldId id="3503" r:id="rId16"/>
-    <p:sldId id="3504" r:id="rId17"/>
-    <p:sldId id="3505" r:id="rId18"/>
-    <p:sldId id="3506" r:id="rId19"/>
-    <p:sldId id="3507" r:id="rId20"/>
-    <p:sldId id="3508" r:id="rId21"/>
-    <p:sldId id="3509" r:id="rId22"/>
-    <p:sldId id="3513" r:id="rId23"/>
-    <p:sldId id="3510" r:id="rId24"/>
-    <p:sldId id="3512" r:id="rId25"/>
-    <p:sldId id="3517" r:id="rId26"/>
-    <p:sldId id="3514" r:id="rId27"/>
-    <p:sldId id="3515" r:id="rId28"/>
-    <p:sldId id="3516" r:id="rId29"/>
-    <p:sldId id="3518" r:id="rId30"/>
-    <p:sldId id="3476" r:id="rId31"/>
-    <p:sldId id="3477" r:id="rId32"/>
+    <p:sldId id="3528" r:id="rId7"/>
+    <p:sldId id="3480" r:id="rId8"/>
+    <p:sldId id="3482" r:id="rId9"/>
+    <p:sldId id="3484" r:id="rId10"/>
+    <p:sldId id="3486" r:id="rId11"/>
+    <p:sldId id="3521" r:id="rId12"/>
+    <p:sldId id="3523" r:id="rId13"/>
+    <p:sldId id="3525" r:id="rId14"/>
+    <p:sldId id="3527" r:id="rId15"/>
+    <p:sldId id="283" r:id="rId16"/>
+    <p:sldId id="3503" r:id="rId17"/>
+    <p:sldId id="3504" r:id="rId18"/>
+    <p:sldId id="3505" r:id="rId19"/>
+    <p:sldId id="3506" r:id="rId20"/>
+    <p:sldId id="3507" r:id="rId21"/>
+    <p:sldId id="3508" r:id="rId22"/>
+    <p:sldId id="3509" r:id="rId23"/>
+    <p:sldId id="3513" r:id="rId24"/>
+    <p:sldId id="3510" r:id="rId25"/>
+    <p:sldId id="3512" r:id="rId26"/>
+    <p:sldId id="3517" r:id="rId27"/>
+    <p:sldId id="3514" r:id="rId28"/>
+    <p:sldId id="3515" r:id="rId29"/>
+    <p:sldId id="3516" r:id="rId30"/>
+    <p:sldId id="3518" r:id="rId31"/>
+    <p:sldId id="3476" r:id="rId32"/>
+    <p:sldId id="3477" r:id="rId33"/>
   </p:sldIdLst>
   <p:sldSz cx="12192000" cy="6858000"/>
   <p:notesSz cx="6858000" cy="9144000"/>
@@ -291,7 +292,7 @@
           <a:p>
             <a:fld id="{9B916260-F45C-B647-88A4-C91F6BA5DC4E}" type="datetimeFigureOut">
               <a:rPr lang="en-CH" smtClean="0"/>
-              <a:t>25.09.24</a:t>
+              <a:t>03.10.24</a:t>
             </a:fld>
             <a:endParaRPr lang="en-CH"/>
           </a:p>
@@ -491,7 +492,7 @@
           <a:p>
             <a:fld id="{9B916260-F45C-B647-88A4-C91F6BA5DC4E}" type="datetimeFigureOut">
               <a:rPr lang="en-CH" smtClean="0"/>
-              <a:t>25.09.24</a:t>
+              <a:t>03.10.24</a:t>
             </a:fld>
             <a:endParaRPr lang="en-CH"/>
           </a:p>
@@ -701,7 +702,7 @@
           <a:p>
             <a:fld id="{9B916260-F45C-B647-88A4-C91F6BA5DC4E}" type="datetimeFigureOut">
               <a:rPr lang="en-CH" smtClean="0"/>
-              <a:t>25.09.24</a:t>
+              <a:t>03.10.24</a:t>
             </a:fld>
             <a:endParaRPr lang="en-CH"/>
           </a:p>
@@ -901,7 +902,7 @@
           <a:p>
             <a:fld id="{9B916260-F45C-B647-88A4-C91F6BA5DC4E}" type="datetimeFigureOut">
               <a:rPr lang="en-CH" smtClean="0"/>
-              <a:t>25.09.24</a:t>
+              <a:t>03.10.24</a:t>
             </a:fld>
             <a:endParaRPr lang="en-CH"/>
           </a:p>
@@ -1177,7 +1178,7 @@
           <a:p>
             <a:fld id="{9B916260-F45C-B647-88A4-C91F6BA5DC4E}" type="datetimeFigureOut">
               <a:rPr lang="en-CH" smtClean="0"/>
-              <a:t>25.09.24</a:t>
+              <a:t>03.10.24</a:t>
             </a:fld>
             <a:endParaRPr lang="en-CH"/>
           </a:p>
@@ -1445,7 +1446,7 @@
           <a:p>
             <a:fld id="{9B916260-F45C-B647-88A4-C91F6BA5DC4E}" type="datetimeFigureOut">
               <a:rPr lang="en-CH" smtClean="0"/>
-              <a:t>25.09.24</a:t>
+              <a:t>03.10.24</a:t>
             </a:fld>
             <a:endParaRPr lang="en-CH"/>
           </a:p>
@@ -1860,7 +1861,7 @@
           <a:p>
             <a:fld id="{9B916260-F45C-B647-88A4-C91F6BA5DC4E}" type="datetimeFigureOut">
               <a:rPr lang="en-CH" smtClean="0"/>
-              <a:t>25.09.24</a:t>
+              <a:t>03.10.24</a:t>
             </a:fld>
             <a:endParaRPr lang="en-CH"/>
           </a:p>
@@ -2002,7 +2003,7 @@
           <a:p>
             <a:fld id="{9B916260-F45C-B647-88A4-C91F6BA5DC4E}" type="datetimeFigureOut">
               <a:rPr lang="en-CH" smtClean="0"/>
-              <a:t>25.09.24</a:t>
+              <a:t>03.10.24</a:t>
             </a:fld>
             <a:endParaRPr lang="en-CH"/>
           </a:p>
@@ -2115,7 +2116,7 @@
           <a:p>
             <a:fld id="{9B916260-F45C-B647-88A4-C91F6BA5DC4E}" type="datetimeFigureOut">
               <a:rPr lang="en-CH" smtClean="0"/>
-              <a:t>25.09.24</a:t>
+              <a:t>03.10.24</a:t>
             </a:fld>
             <a:endParaRPr lang="en-CH"/>
           </a:p>
@@ -2428,7 +2429,7 @@
           <a:p>
             <a:fld id="{9B916260-F45C-B647-88A4-C91F6BA5DC4E}" type="datetimeFigureOut">
               <a:rPr lang="en-CH" smtClean="0"/>
-              <a:t>25.09.24</a:t>
+              <a:t>03.10.24</a:t>
             </a:fld>
             <a:endParaRPr lang="en-CH"/>
           </a:p>
@@ -2717,7 +2718,7 @@
           <a:p>
             <a:fld id="{9B916260-F45C-B647-88A4-C91F6BA5DC4E}" type="datetimeFigureOut">
               <a:rPr lang="en-CH" smtClean="0"/>
-              <a:t>25.09.24</a:t>
+              <a:t>03.10.24</a:t>
             </a:fld>
             <a:endParaRPr lang="en-CH"/>
           </a:p>
@@ -2960,7 +2961,7 @@
           <a:p>
             <a:fld id="{9B916260-F45C-B647-88A4-C91F6BA5DC4E}" type="datetimeFigureOut">
               <a:rPr lang="en-CH" smtClean="0"/>
-              <a:t>25.09.24</a:t>
+              <a:t>03.10.24</a:t>
             </a:fld>
             <a:endParaRPr lang="en-CH"/>
           </a:p>
@@ -3475,6 +3476,74 @@
     </p:bg>
     <p:spTree>
       <p:nvGrpSpPr>
+        <p:cNvPr id="1" name=""/>
+        <p:cNvGrpSpPr/>
+        <p:nvPr/>
+      </p:nvGrpSpPr>
+      <p:grpSpPr>
+        <a:xfrm>
+          <a:off x="0" y="0"/>
+          <a:ext cx="0" cy="0"/>
+          <a:chOff x="0" y="0"/>
+          <a:chExt cx="0" cy="0"/>
+        </a:xfrm>
+      </p:grpSpPr>
+      <p:pic>
+        <p:nvPicPr>
+          <p:cNvPr id="6" name="Picture 5">
+            <a:extLst>
+              <a:ext uri="{FF2B5EF4-FFF2-40B4-BE49-F238E27FC236}">
+                <a16:creationId xmlns:a16="http://schemas.microsoft.com/office/drawing/2014/main" id="{44A62FE8-2D8D-89A6-318D-1514870111D0}"/>
+              </a:ext>
+            </a:extLst>
+          </p:cNvPr>
+          <p:cNvPicPr>
+            <a:picLocks noChangeAspect="1"/>
+          </p:cNvPicPr>
+          <p:nvPr/>
+        </p:nvPicPr>
+        <p:blipFill>
+          <a:blip r:embed="rId2"/>
+          <a:stretch>
+            <a:fillRect/>
+          </a:stretch>
+        </p:blipFill>
+        <p:spPr>
+          <a:xfrm>
+            <a:off x="3501517" y="1449000"/>
+            <a:ext cx="5188966" cy="3960000"/>
+          </a:xfrm>
+          <a:prstGeom prst="rect">
+            <a:avLst/>
+          </a:prstGeom>
+        </p:spPr>
+      </p:pic>
+    </p:spTree>
+    <p:extLst>
+      <p:ext uri="{BB962C8B-B14F-4D97-AF65-F5344CB8AC3E}">
+        <p14:creationId xmlns:p14="http://schemas.microsoft.com/office/powerpoint/2010/main" val="3402998468"/>
+      </p:ext>
+    </p:extLst>
+  </p:cSld>
+  <p:clrMapOvr>
+    <a:masterClrMapping/>
+  </p:clrMapOvr>
+</p:sld>
+</file>
+
+<file path=ppt/slides/slide11.xml><?xml version="1.0" encoding="utf-8"?>
+<p:sld xmlns:a="http://schemas.openxmlformats.org/drawingml/2006/main" xmlns:r="http://schemas.openxmlformats.org/officeDocument/2006/relationships" xmlns:p="http://schemas.openxmlformats.org/presentationml/2006/main">
+  <p:cSld>
+    <p:bg>
+      <p:bgPr>
+        <a:solidFill>
+          <a:srgbClr val="5C5C5C"/>
+        </a:solidFill>
+        <a:effectLst/>
+      </p:bgPr>
+    </p:bg>
+    <p:spTree>
+      <p:nvGrpSpPr>
         <p:cNvPr id="1" name="">
           <a:extLst>
             <a:ext uri="{FF2B5EF4-FFF2-40B4-BE49-F238E27FC236}">
@@ -3536,7 +3605,7 @@
 </p:sld>
 </file>
 
-<file path=ppt/slides/slide11.xml><?xml version="1.0" encoding="utf-8"?>
+<file path=ppt/slides/slide12.xml><?xml version="1.0" encoding="utf-8"?>
 <p:sld xmlns:a="http://schemas.openxmlformats.org/drawingml/2006/main" xmlns:r="http://schemas.openxmlformats.org/officeDocument/2006/relationships" xmlns:p="http://schemas.openxmlformats.org/presentationml/2006/main">
   <p:cSld>
     <p:bg>
@@ -3610,7 +3679,7 @@
 </p:sld>
 </file>
 
-<file path=ppt/slides/slide12.xml><?xml version="1.0" encoding="utf-8"?>
+<file path=ppt/slides/slide13.xml><?xml version="1.0" encoding="utf-8"?>
 <p:sld xmlns:a="http://schemas.openxmlformats.org/drawingml/2006/main" xmlns:r="http://schemas.openxmlformats.org/officeDocument/2006/relationships" xmlns:p="http://schemas.openxmlformats.org/presentationml/2006/main">
   <p:cSld>
     <p:bg>
@@ -3684,7 +3753,7 @@
 </p:sld>
 </file>
 
-<file path=ppt/slides/slide13.xml><?xml version="1.0" encoding="utf-8"?>
+<file path=ppt/slides/slide14.xml><?xml version="1.0" encoding="utf-8"?>
 <p:sld xmlns:a="http://schemas.openxmlformats.org/drawingml/2006/main" xmlns:r="http://schemas.openxmlformats.org/officeDocument/2006/relationships" xmlns:p="http://schemas.openxmlformats.org/presentationml/2006/main">
   <p:cSld>
     <p:bg>
@@ -3764,7 +3833,7 @@
 </p:sld>
 </file>
 
-<file path=ppt/slides/slide14.xml><?xml version="1.0" encoding="utf-8"?>
+<file path=ppt/slides/slide15.xml><?xml version="1.0" encoding="utf-8"?>
 <p:sld xmlns:a="http://schemas.openxmlformats.org/drawingml/2006/main" xmlns:r="http://schemas.openxmlformats.org/officeDocument/2006/relationships" xmlns:p="http://schemas.openxmlformats.org/presentationml/2006/main">
   <p:cSld>
     <p:bg>
@@ -3832,7 +3901,7 @@
 </p:sld>
 </file>
 
-<file path=ppt/slides/slide15.xml><?xml version="1.0" encoding="utf-8"?>
+<file path=ppt/slides/slide16.xml><?xml version="1.0" encoding="utf-8"?>
 <p:sld xmlns:a="http://schemas.openxmlformats.org/drawingml/2006/main" xmlns:r="http://schemas.openxmlformats.org/officeDocument/2006/relationships" xmlns:p="http://schemas.openxmlformats.org/presentationml/2006/main">
   <p:cSld>
     <p:bg>
@@ -3906,7 +3975,7 @@
 </p:sld>
 </file>
 
-<file path=ppt/slides/slide16.xml><?xml version="1.0" encoding="utf-8"?>
+<file path=ppt/slides/slide17.xml><?xml version="1.0" encoding="utf-8"?>
 <p:sld xmlns:a="http://schemas.openxmlformats.org/drawingml/2006/main" xmlns:r="http://schemas.openxmlformats.org/officeDocument/2006/relationships" xmlns:p="http://schemas.openxmlformats.org/presentationml/2006/main">
   <p:cSld>
     <p:bg>
@@ -3980,7 +4049,7 @@
 </p:sld>
 </file>
 
-<file path=ppt/slides/slide17.xml><?xml version="1.0" encoding="utf-8"?>
+<file path=ppt/slides/slide18.xml><?xml version="1.0" encoding="utf-8"?>
 <p:sld xmlns:a="http://schemas.openxmlformats.org/drawingml/2006/main" xmlns:r="http://schemas.openxmlformats.org/officeDocument/2006/relationships" xmlns:p="http://schemas.openxmlformats.org/presentationml/2006/main">
   <p:cSld>
     <p:bg>
@@ -4054,7 +4123,7 @@
 </p:sld>
 </file>
 
-<file path=ppt/slides/slide18.xml><?xml version="1.0" encoding="utf-8"?>
+<file path=ppt/slides/slide19.xml><?xml version="1.0" encoding="utf-8"?>
 <p:sld xmlns:a="http://schemas.openxmlformats.org/drawingml/2006/main" xmlns:r="http://schemas.openxmlformats.org/officeDocument/2006/relationships" xmlns:p="http://schemas.openxmlformats.org/presentationml/2006/main">
   <p:cSld>
     <p:bg>
@@ -4128,7 +4197,74 @@
 </p:sld>
 </file>
 
-<file path=ppt/slides/slide19.xml><?xml version="1.0" encoding="utf-8"?>
+<file path=ppt/slides/slide2.xml><?xml version="1.0" encoding="utf-8"?>
+<p:sld xmlns:a="http://schemas.openxmlformats.org/drawingml/2006/main" xmlns:r="http://schemas.openxmlformats.org/officeDocument/2006/relationships" xmlns:p="http://schemas.openxmlformats.org/presentationml/2006/main">
+  <p:cSld>
+    <p:spTree>
+      <p:nvGrpSpPr>
+        <p:cNvPr id="1" name=""/>
+        <p:cNvGrpSpPr/>
+        <p:nvPr/>
+      </p:nvGrpSpPr>
+      <p:grpSpPr>
+        <a:xfrm>
+          <a:off x="0" y="0"/>
+          <a:ext cx="0" cy="0"/>
+          <a:chOff x="0" y="0"/>
+          <a:chExt cx="0" cy="0"/>
+        </a:xfrm>
+      </p:grpSpPr>
+      <p:sp>
+        <p:nvSpPr>
+          <p:cNvPr id="2" name="Title 1">
+            <a:extLst>
+              <a:ext uri="{FF2B5EF4-FFF2-40B4-BE49-F238E27FC236}">
+                <a16:creationId xmlns:a16="http://schemas.microsoft.com/office/drawing/2014/main" id="{0A1FA53E-25A0-0960-0FCC-4CC105416AC1}"/>
+              </a:ext>
+            </a:extLst>
+          </p:cNvPr>
+          <p:cNvSpPr>
+            <a:spLocks noGrp="1"/>
+          </p:cNvSpPr>
+          <p:nvPr>
+            <p:ph type="title"/>
+          </p:nvPr>
+        </p:nvSpPr>
+        <p:spPr>
+          <a:xfrm>
+            <a:off x="410688" y="365125"/>
+            <a:ext cx="10943112" cy="584901"/>
+          </a:xfrm>
+        </p:spPr>
+        <p:txBody>
+          <a:bodyPr>
+            <a:normAutofit/>
+          </a:bodyPr>
+          <a:lstStyle/>
+          <a:p>
+            <a:r>
+              <a:rPr lang="en-CH" sz="2800" b="1" dirty="0">
+                <a:latin typeface="Avenir Book" panose="02000503020000020003" pitchFamily="2" charset="0"/>
+              </a:rPr>
+              <a:t>Practice Task Slides (12 trials)</a:t>
+            </a:r>
+          </a:p>
+        </p:txBody>
+      </p:sp>
+    </p:spTree>
+    <p:extLst>
+      <p:ext uri="{BB962C8B-B14F-4D97-AF65-F5344CB8AC3E}">
+        <p14:creationId xmlns:p14="http://schemas.microsoft.com/office/powerpoint/2010/main" val="2739542140"/>
+      </p:ext>
+    </p:extLst>
+  </p:cSld>
+  <p:clrMapOvr>
+    <a:masterClrMapping/>
+  </p:clrMapOvr>
+</p:sld>
+</file>
+
+<file path=ppt/slides/slide20.xml><?xml version="1.0" encoding="utf-8"?>
 <p:sld xmlns:a="http://schemas.openxmlformats.org/drawingml/2006/main" xmlns:r="http://schemas.openxmlformats.org/officeDocument/2006/relationships" xmlns:p="http://schemas.openxmlformats.org/presentationml/2006/main">
   <p:cSld>
     <p:bg>
@@ -4202,74 +4338,7 @@
 </p:sld>
 </file>
 
-<file path=ppt/slides/slide2.xml><?xml version="1.0" encoding="utf-8"?>
-<p:sld xmlns:a="http://schemas.openxmlformats.org/drawingml/2006/main" xmlns:r="http://schemas.openxmlformats.org/officeDocument/2006/relationships" xmlns:p="http://schemas.openxmlformats.org/presentationml/2006/main">
-  <p:cSld>
-    <p:spTree>
-      <p:nvGrpSpPr>
-        <p:cNvPr id="1" name=""/>
-        <p:cNvGrpSpPr/>
-        <p:nvPr/>
-      </p:nvGrpSpPr>
-      <p:grpSpPr>
-        <a:xfrm>
-          <a:off x="0" y="0"/>
-          <a:ext cx="0" cy="0"/>
-          <a:chOff x="0" y="0"/>
-          <a:chExt cx="0" cy="0"/>
-        </a:xfrm>
-      </p:grpSpPr>
-      <p:sp>
-        <p:nvSpPr>
-          <p:cNvPr id="2" name="Title 1">
-            <a:extLst>
-              <a:ext uri="{FF2B5EF4-FFF2-40B4-BE49-F238E27FC236}">
-                <a16:creationId xmlns:a16="http://schemas.microsoft.com/office/drawing/2014/main" id="{0A1FA53E-25A0-0960-0FCC-4CC105416AC1}"/>
-              </a:ext>
-            </a:extLst>
-          </p:cNvPr>
-          <p:cNvSpPr>
-            <a:spLocks noGrp="1"/>
-          </p:cNvSpPr>
-          <p:nvPr>
-            <p:ph type="title"/>
-          </p:nvPr>
-        </p:nvSpPr>
-        <p:spPr>
-          <a:xfrm>
-            <a:off x="410688" y="365125"/>
-            <a:ext cx="10943112" cy="584901"/>
-          </a:xfrm>
-        </p:spPr>
-        <p:txBody>
-          <a:bodyPr>
-            <a:normAutofit/>
-          </a:bodyPr>
-          <a:lstStyle/>
-          <a:p>
-            <a:r>
-              <a:rPr lang="en-CH" sz="2800" b="1" dirty="0">
-                <a:latin typeface="Avenir Book" panose="02000503020000020003" pitchFamily="2" charset="0"/>
-              </a:rPr>
-              <a:t>Practice Task Slides (12 trials)</a:t>
-            </a:r>
-          </a:p>
-        </p:txBody>
-      </p:sp>
-    </p:spTree>
-    <p:extLst>
-      <p:ext uri="{BB962C8B-B14F-4D97-AF65-F5344CB8AC3E}">
-        <p14:creationId xmlns:p14="http://schemas.microsoft.com/office/powerpoint/2010/main" val="2739542140"/>
-      </p:ext>
-    </p:extLst>
-  </p:cSld>
-  <p:clrMapOvr>
-    <a:masterClrMapping/>
-  </p:clrMapOvr>
-</p:sld>
-</file>
-
-<file path=ppt/slides/slide20.xml><?xml version="1.0" encoding="utf-8"?>
+<file path=ppt/slides/slide21.xml><?xml version="1.0" encoding="utf-8"?>
 <p:sld xmlns:a="http://schemas.openxmlformats.org/drawingml/2006/main" xmlns:r="http://schemas.openxmlformats.org/officeDocument/2006/relationships" xmlns:p="http://schemas.openxmlformats.org/presentationml/2006/main">
   <p:cSld>
     <p:bg>
@@ -4343,7 +4412,7 @@
 </p:sld>
 </file>
 
-<file path=ppt/slides/slide21.xml><?xml version="1.0" encoding="utf-8"?>
+<file path=ppt/slides/slide22.xml><?xml version="1.0" encoding="utf-8"?>
 <p:sld xmlns:a="http://schemas.openxmlformats.org/drawingml/2006/main" xmlns:r="http://schemas.openxmlformats.org/officeDocument/2006/relationships" xmlns:p="http://schemas.openxmlformats.org/presentationml/2006/main">
   <p:cSld>
     <p:bg>
@@ -4417,7 +4486,7 @@
 </p:sld>
 </file>
 
-<file path=ppt/slides/slide22.xml><?xml version="1.0" encoding="utf-8"?>
+<file path=ppt/slides/slide23.xml><?xml version="1.0" encoding="utf-8"?>
 <p:sld xmlns:a="http://schemas.openxmlformats.org/drawingml/2006/main" xmlns:r="http://schemas.openxmlformats.org/officeDocument/2006/relationships" xmlns:p="http://schemas.openxmlformats.org/presentationml/2006/main">
   <p:cSld>
     <p:bg>
@@ -4491,7 +4560,7 @@
 </p:sld>
 </file>
 
-<file path=ppt/slides/slide23.xml><?xml version="1.0" encoding="utf-8"?>
+<file path=ppt/slides/slide24.xml><?xml version="1.0" encoding="utf-8"?>
 <p:sld xmlns:a="http://schemas.openxmlformats.org/drawingml/2006/main" xmlns:r="http://schemas.openxmlformats.org/officeDocument/2006/relationships" xmlns:p="http://schemas.openxmlformats.org/presentationml/2006/main">
   <p:cSld>
     <p:bg>
@@ -4565,7 +4634,7 @@
 </p:sld>
 </file>
 
-<file path=ppt/slides/slide24.xml><?xml version="1.0" encoding="utf-8"?>
+<file path=ppt/slides/slide25.xml><?xml version="1.0" encoding="utf-8"?>
 <p:sld xmlns:a="http://schemas.openxmlformats.org/drawingml/2006/main" xmlns:r="http://schemas.openxmlformats.org/officeDocument/2006/relationships" xmlns:p="http://schemas.openxmlformats.org/presentationml/2006/main">
   <p:cSld>
     <p:bg>
@@ -4639,7 +4708,7 @@
 </p:sld>
 </file>
 
-<file path=ppt/slides/slide25.xml><?xml version="1.0" encoding="utf-8"?>
+<file path=ppt/slides/slide26.xml><?xml version="1.0" encoding="utf-8"?>
 <p:sld xmlns:a="http://schemas.openxmlformats.org/drawingml/2006/main" xmlns:r="http://schemas.openxmlformats.org/officeDocument/2006/relationships" xmlns:p="http://schemas.openxmlformats.org/presentationml/2006/main">
   <p:cSld>
     <p:bg>
@@ -4713,7 +4782,7 @@
 </p:sld>
 </file>
 
-<file path=ppt/slides/slide26.xml><?xml version="1.0" encoding="utf-8"?>
+<file path=ppt/slides/slide27.xml><?xml version="1.0" encoding="utf-8"?>
 <p:sld xmlns:a="http://schemas.openxmlformats.org/drawingml/2006/main" xmlns:r="http://schemas.openxmlformats.org/officeDocument/2006/relationships" xmlns:p="http://schemas.openxmlformats.org/presentationml/2006/main">
   <p:cSld>
     <p:bg>
@@ -4787,7 +4856,7 @@
 </p:sld>
 </file>
 
-<file path=ppt/slides/slide27.xml><?xml version="1.0" encoding="utf-8"?>
+<file path=ppt/slides/slide28.xml><?xml version="1.0" encoding="utf-8"?>
 <p:sld xmlns:a="http://schemas.openxmlformats.org/drawingml/2006/main" xmlns:r="http://schemas.openxmlformats.org/officeDocument/2006/relationships" xmlns:p="http://schemas.openxmlformats.org/presentationml/2006/main">
   <p:cSld>
     <p:bg>
@@ -4861,7 +4930,7 @@
 </p:sld>
 </file>
 
-<file path=ppt/slides/slide28.xml><?xml version="1.0" encoding="utf-8"?>
+<file path=ppt/slides/slide29.xml><?xml version="1.0" encoding="utf-8"?>
 <p:sld xmlns:a="http://schemas.openxmlformats.org/drawingml/2006/main" xmlns:r="http://schemas.openxmlformats.org/officeDocument/2006/relationships" xmlns:p="http://schemas.openxmlformats.org/presentationml/2006/main">
   <p:cSld>
     <p:bg>
@@ -4935,7 +5004,183 @@
 </p:sld>
 </file>
 
-<file path=ppt/slides/slide29.xml><?xml version="1.0" encoding="utf-8"?>
+<file path=ppt/slides/slide3.xml><?xml version="1.0" encoding="utf-8"?>
+<p:sld xmlns:a="http://schemas.openxmlformats.org/drawingml/2006/main" xmlns:r="http://schemas.openxmlformats.org/officeDocument/2006/relationships" xmlns:p="http://schemas.openxmlformats.org/presentationml/2006/main">
+  <p:cSld>
+    <p:bg>
+      <p:bgPr>
+        <a:solidFill>
+          <a:srgbClr val="5C5C5C"/>
+        </a:solidFill>
+        <a:effectLst/>
+      </p:bgPr>
+    </p:bg>
+    <p:spTree>
+      <p:nvGrpSpPr>
+        <p:cNvPr id="1" name=""/>
+        <p:cNvGrpSpPr/>
+        <p:nvPr/>
+      </p:nvGrpSpPr>
+      <p:grpSpPr>
+        <a:xfrm>
+          <a:off x="0" y="0"/>
+          <a:ext cx="0" cy="0"/>
+          <a:chOff x="0" y="0"/>
+          <a:chExt cx="0" cy="0"/>
+        </a:xfrm>
+      </p:grpSpPr>
+      <p:sp>
+        <p:nvSpPr>
+          <p:cNvPr id="5" name="TextBox 4">
+            <a:extLst>
+              <a:ext uri="{FF2B5EF4-FFF2-40B4-BE49-F238E27FC236}">
+                <a16:creationId xmlns:a16="http://schemas.microsoft.com/office/drawing/2014/main" id="{5C3101FE-916F-7AC8-03CF-F8680EC21ADF}"/>
+              </a:ext>
+            </a:extLst>
+          </p:cNvPr>
+          <p:cNvSpPr txBox="1"/>
+          <p:nvPr/>
+        </p:nvSpPr>
+        <p:spPr>
+          <a:xfrm>
+            <a:off x="391886" y="130629"/>
+            <a:ext cx="11614067" cy="5232202"/>
+          </a:xfrm>
+          <a:prstGeom prst="rect">
+            <a:avLst/>
+          </a:prstGeom>
+          <a:noFill/>
+          <a:ln>
+            <a:noFill/>
+          </a:ln>
+        </p:spPr>
+        <p:txBody>
+          <a:bodyPr wrap="square" rtlCol="0">
+            <a:spAutoFit/>
+          </a:bodyPr>
+          <a:lstStyle/>
+          <a:p>
+            <a:pPr algn="ctr"/>
+            <a:r>
+              <a:rPr lang="en-CH" sz="2400" dirty="0">
+                <a:solidFill>
+                  <a:schemeClr val="bg1"/>
+                </a:solidFill>
+                <a:latin typeface="Arial" panose="020B0604020202020204" pitchFamily="34" charset="0"/>
+                <a:cs typeface="Arial" panose="020B0604020202020204" pitchFamily="34" charset="0"/>
+              </a:rPr>
+              <a:t>Welcome to the Egg task.</a:t>
+            </a:r>
+          </a:p>
+          <a:p>
+            <a:endParaRPr lang="en-CH" sz="2400" dirty="0">
+              <a:solidFill>
+                <a:schemeClr val="bg1"/>
+              </a:solidFill>
+              <a:latin typeface="Arial" panose="020B0604020202020204" pitchFamily="34" charset="0"/>
+              <a:cs typeface="Arial" panose="020B0604020202020204" pitchFamily="34" charset="0"/>
+            </a:endParaRPr>
+          </a:p>
+          <a:p>
+            <a:r>
+              <a:rPr lang="en-GB" sz="2200" dirty="0">
+                <a:solidFill>
+                  <a:schemeClr val="bg1"/>
+                </a:solidFill>
+                <a:latin typeface="Arial" panose="020B0604020202020204" pitchFamily="34" charset="0"/>
+                <a:cs typeface="Arial" panose="020B0604020202020204" pitchFamily="34" charset="0"/>
+              </a:rPr>
+              <a:t>Your goal in this task is to buy as many fresh eggs from the egg farmer for your store as possible. You want to get a good variety of eggs but some of them are more sensitive and get rotten more easily. For good eggs you receive money, when you buy bad eggs you loose money.</a:t>
+            </a:r>
+          </a:p>
+          <a:p>
+            <a:endParaRPr lang="en-GB" sz="2200" dirty="0">
+              <a:solidFill>
+                <a:schemeClr val="bg1"/>
+              </a:solidFill>
+              <a:latin typeface="Arial" panose="020B0604020202020204" pitchFamily="34" charset="0"/>
+              <a:cs typeface="Arial" panose="020B0604020202020204" pitchFamily="34" charset="0"/>
+            </a:endParaRPr>
+          </a:p>
+          <a:p>
+            <a:r>
+              <a:rPr lang="en-GB" sz="2200" dirty="0">
+                <a:solidFill>
+                  <a:schemeClr val="bg1"/>
+                </a:solidFill>
+                <a:latin typeface="Arial" panose="020B0604020202020204" pitchFamily="34" charset="0"/>
+                <a:cs typeface="Arial" panose="020B0604020202020204" pitchFamily="34" charset="0"/>
+              </a:rPr>
+              <a:t>Because there are different sorts of eggs, you have to learn which ones are more likely to be rotten and which ones are more likely to stay fresh. </a:t>
+            </a:r>
+          </a:p>
+          <a:p>
+            <a:endParaRPr lang="en-GB" sz="2200" dirty="0">
+              <a:solidFill>
+                <a:schemeClr val="bg1"/>
+              </a:solidFill>
+              <a:latin typeface="Arial" panose="020B0604020202020204" pitchFamily="34" charset="0"/>
+              <a:cs typeface="Arial" panose="020B0604020202020204" pitchFamily="34" charset="0"/>
+            </a:endParaRPr>
+          </a:p>
+          <a:p>
+            <a:r>
+              <a:rPr lang="en-GB" sz="2200" dirty="0">
+                <a:solidFill>
+                  <a:schemeClr val="bg1"/>
+                </a:solidFill>
+                <a:latin typeface="Arial" panose="020B0604020202020204" pitchFamily="34" charset="0"/>
+                <a:cs typeface="Arial" panose="020B0604020202020204" pitchFamily="34" charset="0"/>
+              </a:rPr>
+              <a:t>Please note that the eggs in this task look like the faces from the previous task but this is a profit task. Had to use the same images in this task for technical reasons.</a:t>
+            </a:r>
+          </a:p>
+          <a:p>
+            <a:endParaRPr lang="en-GB" sz="2200" dirty="0">
+              <a:solidFill>
+                <a:schemeClr val="bg1"/>
+              </a:solidFill>
+              <a:latin typeface="Arial" panose="020B0604020202020204" pitchFamily="34" charset="0"/>
+              <a:cs typeface="Arial" panose="020B0604020202020204" pitchFamily="34" charset="0"/>
+            </a:endParaRPr>
+          </a:p>
+          <a:p>
+            <a:r>
+              <a:rPr lang="en-GB" sz="2200" dirty="0">
+                <a:solidFill>
+                  <a:schemeClr val="bg1"/>
+                </a:solidFill>
+                <a:latin typeface="Arial" panose="020B0604020202020204" pitchFamily="34" charset="0"/>
+                <a:cs typeface="Arial" panose="020B0604020202020204" pitchFamily="34" charset="0"/>
+              </a:rPr>
+              <a:t>Try to make as much profit as possible.</a:t>
+            </a:r>
+          </a:p>
+          <a:p>
+            <a:endParaRPr lang="en-GB" sz="2200" dirty="0">
+              <a:solidFill>
+                <a:schemeClr val="bg1"/>
+              </a:solidFill>
+              <a:latin typeface="Arial" panose="020B0604020202020204" pitchFamily="34" charset="0"/>
+              <a:cs typeface="Arial" panose="020B0604020202020204" pitchFamily="34" charset="0"/>
+            </a:endParaRPr>
+          </a:p>
+        </p:txBody>
+      </p:sp>
+    </p:spTree>
+    <p:extLst>
+      <p:ext uri="{BB962C8B-B14F-4D97-AF65-F5344CB8AC3E}">
+        <p14:creationId xmlns:p14="http://schemas.microsoft.com/office/powerpoint/2010/main" val="2976116893"/>
+      </p:ext>
+    </p:extLst>
+  </p:cSld>
+  <p:clrMapOvr>
+    <a:masterClrMapping/>
+  </p:clrMapOvr>
+</p:sld>
+</file>
+
+<file path=ppt/slides/slide30.xml><?xml version="1.0" encoding="utf-8"?>
 <p:sld xmlns:a="http://schemas.openxmlformats.org/drawingml/2006/main" xmlns:r="http://schemas.openxmlformats.org/officeDocument/2006/relationships" xmlns:p="http://schemas.openxmlformats.org/presentationml/2006/main">
   <p:cSld>
     <p:bg>
@@ -5009,7 +5254,7 @@
 </p:sld>
 </file>
 
-<file path=ppt/slides/slide3.xml><?xml version="1.0" encoding="utf-8"?>
+<file path=ppt/slides/slide31.xml><?xml version="1.0" encoding="utf-8"?>
 <p:sld xmlns:a="http://schemas.openxmlformats.org/drawingml/2006/main" xmlns:r="http://schemas.openxmlformats.org/officeDocument/2006/relationships" xmlns:p="http://schemas.openxmlformats.org/presentationml/2006/main">
   <p:cSld>
     <p:bg>
@@ -5036,182 +5281,6 @@
       </p:grpSpPr>
       <p:sp>
         <p:nvSpPr>
-          <p:cNvPr id="5" name="TextBox 4">
-            <a:extLst>
-              <a:ext uri="{FF2B5EF4-FFF2-40B4-BE49-F238E27FC236}">
-                <a16:creationId xmlns:a16="http://schemas.microsoft.com/office/drawing/2014/main" id="{5C3101FE-916F-7AC8-03CF-F8680EC21ADF}"/>
-              </a:ext>
-            </a:extLst>
-          </p:cNvPr>
-          <p:cNvSpPr txBox="1"/>
-          <p:nvPr/>
-        </p:nvSpPr>
-        <p:spPr>
-          <a:xfrm>
-            <a:off x="391886" y="130629"/>
-            <a:ext cx="11614067" cy="5232202"/>
-          </a:xfrm>
-          <a:prstGeom prst="rect">
-            <a:avLst/>
-          </a:prstGeom>
-          <a:noFill/>
-          <a:ln>
-            <a:noFill/>
-          </a:ln>
-        </p:spPr>
-        <p:txBody>
-          <a:bodyPr wrap="square" rtlCol="0">
-            <a:spAutoFit/>
-          </a:bodyPr>
-          <a:lstStyle/>
-          <a:p>
-            <a:pPr algn="ctr"/>
-            <a:r>
-              <a:rPr lang="en-CH" sz="2400" dirty="0">
-                <a:solidFill>
-                  <a:schemeClr val="bg1"/>
-                </a:solidFill>
-                <a:latin typeface="Arial" panose="020B0604020202020204" pitchFamily="34" charset="0"/>
-                <a:cs typeface="Arial" panose="020B0604020202020204" pitchFamily="34" charset="0"/>
-              </a:rPr>
-              <a:t>Welcome to the Egg task.</a:t>
-            </a:r>
-          </a:p>
-          <a:p>
-            <a:endParaRPr lang="en-CH" sz="2400" dirty="0">
-              <a:solidFill>
-                <a:schemeClr val="bg1"/>
-              </a:solidFill>
-              <a:latin typeface="Arial" panose="020B0604020202020204" pitchFamily="34" charset="0"/>
-              <a:cs typeface="Arial" panose="020B0604020202020204" pitchFamily="34" charset="0"/>
-            </a:endParaRPr>
-          </a:p>
-          <a:p>
-            <a:r>
-              <a:rPr lang="en-GB" sz="2200" dirty="0">
-                <a:solidFill>
-                  <a:schemeClr val="bg1"/>
-                </a:solidFill>
-                <a:latin typeface="Arial" panose="020B0604020202020204" pitchFamily="34" charset="0"/>
-                <a:cs typeface="Arial" panose="020B0604020202020204" pitchFamily="34" charset="0"/>
-              </a:rPr>
-              <a:t>Your goal in this task is to buy as many fresh eggs from the egg farmer for your store as possible. You want to get a good variety of eggs but some of them are more sensitive and get rotten more easily. For good eggs you receive money, when you buy bad eggs you loose money.</a:t>
-            </a:r>
-          </a:p>
-          <a:p>
-            <a:endParaRPr lang="en-GB" sz="2200" dirty="0">
-              <a:solidFill>
-                <a:schemeClr val="bg1"/>
-              </a:solidFill>
-              <a:latin typeface="Arial" panose="020B0604020202020204" pitchFamily="34" charset="0"/>
-              <a:cs typeface="Arial" panose="020B0604020202020204" pitchFamily="34" charset="0"/>
-            </a:endParaRPr>
-          </a:p>
-          <a:p>
-            <a:r>
-              <a:rPr lang="en-GB" sz="2200" dirty="0">
-                <a:solidFill>
-                  <a:schemeClr val="bg1"/>
-                </a:solidFill>
-                <a:latin typeface="Arial" panose="020B0604020202020204" pitchFamily="34" charset="0"/>
-                <a:cs typeface="Arial" panose="020B0604020202020204" pitchFamily="34" charset="0"/>
-              </a:rPr>
-              <a:t>Because there are different sorts of eggs, you have to learn which ones are more likely to be rotten and which ones are more likely to stay fresh. </a:t>
-            </a:r>
-          </a:p>
-          <a:p>
-            <a:endParaRPr lang="en-GB" sz="2200" dirty="0">
-              <a:solidFill>
-                <a:schemeClr val="bg1"/>
-              </a:solidFill>
-              <a:latin typeface="Arial" panose="020B0604020202020204" pitchFamily="34" charset="0"/>
-              <a:cs typeface="Arial" panose="020B0604020202020204" pitchFamily="34" charset="0"/>
-            </a:endParaRPr>
-          </a:p>
-          <a:p>
-            <a:r>
-              <a:rPr lang="en-GB" sz="2200" dirty="0">
-                <a:solidFill>
-                  <a:schemeClr val="bg1"/>
-                </a:solidFill>
-                <a:latin typeface="Arial" panose="020B0604020202020204" pitchFamily="34" charset="0"/>
-                <a:cs typeface="Arial" panose="020B0604020202020204" pitchFamily="34" charset="0"/>
-              </a:rPr>
-              <a:t>Please note that the eggs in this task look like the faces from the previous task but this is a profit task. Had to use the same images in this task for technical reasons.</a:t>
-            </a:r>
-          </a:p>
-          <a:p>
-            <a:endParaRPr lang="en-GB" sz="2200" dirty="0">
-              <a:solidFill>
-                <a:schemeClr val="bg1"/>
-              </a:solidFill>
-              <a:latin typeface="Arial" panose="020B0604020202020204" pitchFamily="34" charset="0"/>
-              <a:cs typeface="Arial" panose="020B0604020202020204" pitchFamily="34" charset="0"/>
-            </a:endParaRPr>
-          </a:p>
-          <a:p>
-            <a:r>
-              <a:rPr lang="en-GB" sz="2200" dirty="0">
-                <a:solidFill>
-                  <a:schemeClr val="bg1"/>
-                </a:solidFill>
-                <a:latin typeface="Arial" panose="020B0604020202020204" pitchFamily="34" charset="0"/>
-                <a:cs typeface="Arial" panose="020B0604020202020204" pitchFamily="34" charset="0"/>
-              </a:rPr>
-              <a:t>Try to make as much profit as possible.</a:t>
-            </a:r>
-          </a:p>
-          <a:p>
-            <a:endParaRPr lang="en-GB" sz="2200" dirty="0">
-              <a:solidFill>
-                <a:schemeClr val="bg1"/>
-              </a:solidFill>
-              <a:latin typeface="Arial" panose="020B0604020202020204" pitchFamily="34" charset="0"/>
-              <a:cs typeface="Arial" panose="020B0604020202020204" pitchFamily="34" charset="0"/>
-            </a:endParaRPr>
-          </a:p>
-        </p:txBody>
-      </p:sp>
-    </p:spTree>
-    <p:extLst>
-      <p:ext uri="{BB962C8B-B14F-4D97-AF65-F5344CB8AC3E}">
-        <p14:creationId xmlns:p14="http://schemas.microsoft.com/office/powerpoint/2010/main" val="2976116893"/>
-      </p:ext>
-    </p:extLst>
-  </p:cSld>
-  <p:clrMapOvr>
-    <a:masterClrMapping/>
-  </p:clrMapOvr>
-</p:sld>
-</file>
-
-<file path=ppt/slides/slide30.xml><?xml version="1.0" encoding="utf-8"?>
-<p:sld xmlns:a="http://schemas.openxmlformats.org/drawingml/2006/main" xmlns:r="http://schemas.openxmlformats.org/officeDocument/2006/relationships" xmlns:p="http://schemas.openxmlformats.org/presentationml/2006/main">
-  <p:cSld>
-    <p:bg>
-      <p:bgPr>
-        <a:solidFill>
-          <a:srgbClr val="5C5C5C"/>
-        </a:solidFill>
-        <a:effectLst/>
-      </p:bgPr>
-    </p:bg>
-    <p:spTree>
-      <p:nvGrpSpPr>
-        <p:cNvPr id="1" name=""/>
-        <p:cNvGrpSpPr/>
-        <p:nvPr/>
-      </p:nvGrpSpPr>
-      <p:grpSpPr>
-        <a:xfrm>
-          <a:off x="0" y="0"/>
-          <a:ext cx="0" cy="0"/>
-          <a:chOff x="0" y="0"/>
-          <a:chExt cx="0" cy="0"/>
-        </a:xfrm>
-      </p:grpSpPr>
-      <p:sp>
-        <p:nvSpPr>
           <p:cNvPr id="6" name="TextBox 5">
             <a:extLst>
               <a:ext uri="{FF2B5EF4-FFF2-40B4-BE49-F238E27FC236}">
@@ -5265,7 +5334,7 @@
 </p:sld>
 </file>
 
-<file path=ppt/slides/slide31.xml><?xml version="1.0" encoding="utf-8"?>
+<file path=ppt/slides/slide32.xml><?xml version="1.0" encoding="utf-8"?>
 <p:sld xmlns:a="http://schemas.openxmlformats.org/drawingml/2006/main" xmlns:r="http://schemas.openxmlformats.org/officeDocument/2006/relationships" xmlns:p="http://schemas.openxmlformats.org/presentationml/2006/main">
   <p:cSld>
     <p:bg>
@@ -5586,8 +5655,8 @@
         </p:blipFill>
         <p:spPr>
           <a:xfrm>
-            <a:off x="3501517" y="1449000"/>
-            <a:ext cx="5188966" cy="3960000"/>
+            <a:off x="4680827" y="2349000"/>
+            <a:ext cx="2830345" cy="2160000"/>
           </a:xfrm>
           <a:prstGeom prst="rect">
             <a:avLst/>
@@ -5620,7 +5689,13 @@
     </p:bg>
     <p:spTree>
       <p:nvGrpSpPr>
-        <p:cNvPr id="1" name=""/>
+        <p:cNvPr id="1" name="">
+          <a:extLst>
+            <a:ext uri="{FF2B5EF4-FFF2-40B4-BE49-F238E27FC236}">
+              <a16:creationId xmlns:a16="http://schemas.microsoft.com/office/drawing/2014/main" id="{DCE88E35-1585-7753-4AAA-0A7FAD850364}"/>
+            </a:ext>
+          </a:extLst>
+        </p:cNvPr>
         <p:cNvGrpSpPr/>
         <p:nvPr/>
       </p:nvGrpSpPr>
@@ -5637,7 +5712,7 @@
           <p:cNvPr id="3" name="Picture 2">
             <a:extLst>
               <a:ext uri="{FF2B5EF4-FFF2-40B4-BE49-F238E27FC236}">
-                <a16:creationId xmlns:a16="http://schemas.microsoft.com/office/drawing/2014/main" id="{08526774-AD3D-A2BF-8B22-289424073E47}"/>
+                <a16:creationId xmlns:a16="http://schemas.microsoft.com/office/drawing/2014/main" id="{7EB2FB4D-C64D-9D3E-1D86-97A662A6A574}"/>
               </a:ext>
             </a:extLst>
           </p:cNvPr>
@@ -5654,8 +5729,8 @@
         </p:blipFill>
         <p:spPr>
           <a:xfrm>
-            <a:off x="3501517" y="1449000"/>
-            <a:ext cx="5188966" cy="3960000"/>
+            <a:off x="5016000" y="2349000"/>
+            <a:ext cx="2160000" cy="2160000"/>
           </a:xfrm>
           <a:prstGeom prst="rect">
             <a:avLst/>
@@ -5665,7 +5740,7 @@
     </p:spTree>
     <p:extLst>
       <p:ext uri="{BB962C8B-B14F-4D97-AF65-F5344CB8AC3E}">
-        <p14:creationId xmlns:p14="http://schemas.microsoft.com/office/powerpoint/2010/main" val="4139463847"/>
+        <p14:creationId xmlns:p14="http://schemas.microsoft.com/office/powerpoint/2010/main" val="2568164730"/>
       </p:ext>
     </p:extLst>
   </p:cSld>
@@ -5705,7 +5780,7 @@
           <p:cNvPr id="3" name="Picture 2">
             <a:extLst>
               <a:ext uri="{FF2B5EF4-FFF2-40B4-BE49-F238E27FC236}">
-                <a16:creationId xmlns:a16="http://schemas.microsoft.com/office/drawing/2014/main" id="{02C3729A-FF3F-F995-3345-DEEDC1FC84C1}"/>
+                <a16:creationId xmlns:a16="http://schemas.microsoft.com/office/drawing/2014/main" id="{08526774-AD3D-A2BF-8B22-289424073E47}"/>
               </a:ext>
             </a:extLst>
           </p:cNvPr>
@@ -5733,7 +5808,7 @@
     </p:spTree>
     <p:extLst>
       <p:ext uri="{BB962C8B-B14F-4D97-AF65-F5344CB8AC3E}">
-        <p14:creationId xmlns:p14="http://schemas.microsoft.com/office/powerpoint/2010/main" val="1313142258"/>
+        <p14:creationId xmlns:p14="http://schemas.microsoft.com/office/powerpoint/2010/main" val="4139463847"/>
       </p:ext>
     </p:extLst>
   </p:cSld>
@@ -5770,10 +5845,10 @@
       </p:grpSpPr>
       <p:pic>
         <p:nvPicPr>
-          <p:cNvPr id="4" name="Picture 3">
-            <a:extLst>
-              <a:ext uri="{FF2B5EF4-FFF2-40B4-BE49-F238E27FC236}">
-                <a16:creationId xmlns:a16="http://schemas.microsoft.com/office/drawing/2014/main" id="{BF22FE1A-67F2-9A08-251F-880432C4BF90}"/>
+          <p:cNvPr id="3" name="Picture 2">
+            <a:extLst>
+              <a:ext uri="{FF2B5EF4-FFF2-40B4-BE49-F238E27FC236}">
+                <a16:creationId xmlns:a16="http://schemas.microsoft.com/office/drawing/2014/main" id="{02C3729A-FF3F-F995-3345-DEEDC1FC84C1}"/>
               </a:ext>
             </a:extLst>
           </p:cNvPr>
@@ -5801,7 +5876,7 @@
     </p:spTree>
     <p:extLst>
       <p:ext uri="{BB962C8B-B14F-4D97-AF65-F5344CB8AC3E}">
-        <p14:creationId xmlns:p14="http://schemas.microsoft.com/office/powerpoint/2010/main" val="3262247840"/>
+        <p14:creationId xmlns:p14="http://schemas.microsoft.com/office/powerpoint/2010/main" val="1313142258"/>
       </p:ext>
     </p:extLst>
   </p:cSld>
@@ -5838,10 +5913,10 @@
       </p:grpSpPr>
       <p:pic>
         <p:nvPicPr>
-          <p:cNvPr id="6" name="Picture 5">
-            <a:extLst>
-              <a:ext uri="{FF2B5EF4-FFF2-40B4-BE49-F238E27FC236}">
-                <a16:creationId xmlns:a16="http://schemas.microsoft.com/office/drawing/2014/main" id="{44A62FE8-2D8D-89A6-318D-1514870111D0}"/>
+          <p:cNvPr id="4" name="Picture 3">
+            <a:extLst>
+              <a:ext uri="{FF2B5EF4-FFF2-40B4-BE49-F238E27FC236}">
+                <a16:creationId xmlns:a16="http://schemas.microsoft.com/office/drawing/2014/main" id="{BF22FE1A-67F2-9A08-251F-880432C4BF90}"/>
               </a:ext>
             </a:extLst>
           </p:cNvPr>
@@ -5869,7 +5944,7 @@
     </p:spTree>
     <p:extLst>
       <p:ext uri="{BB962C8B-B14F-4D97-AF65-F5344CB8AC3E}">
-        <p14:creationId xmlns:p14="http://schemas.microsoft.com/office/powerpoint/2010/main" val="3402998468"/>
+        <p14:creationId xmlns:p14="http://schemas.microsoft.com/office/powerpoint/2010/main" val="3262247840"/>
       </p:ext>
     </p:extLst>
   </p:cSld>

</xml_diff>

<commit_message>
added more stimuli and finished parameter recovery and simulations.
</commit_message>
<xml_diff>
--- a/control_task/stimuli/originals_SAPC_Task.pptx
+++ b/control_task/stimuli/originals_SAPC_Task.pptx
@@ -12,31 +12,39 @@
     <p:sldId id="3519" r:id="rId6"/>
     <p:sldId id="3528" r:id="rId7"/>
     <p:sldId id="3480" r:id="rId8"/>
-    <p:sldId id="3482" r:id="rId9"/>
-    <p:sldId id="3484" r:id="rId10"/>
-    <p:sldId id="3486" r:id="rId11"/>
-    <p:sldId id="3521" r:id="rId12"/>
-    <p:sldId id="3523" r:id="rId13"/>
-    <p:sldId id="3525" r:id="rId14"/>
-    <p:sldId id="3527" r:id="rId15"/>
-    <p:sldId id="283" r:id="rId16"/>
-    <p:sldId id="3503" r:id="rId17"/>
-    <p:sldId id="3504" r:id="rId18"/>
-    <p:sldId id="3505" r:id="rId19"/>
-    <p:sldId id="3506" r:id="rId20"/>
-    <p:sldId id="3507" r:id="rId21"/>
-    <p:sldId id="3508" r:id="rId22"/>
-    <p:sldId id="3509" r:id="rId23"/>
-    <p:sldId id="3513" r:id="rId24"/>
-    <p:sldId id="3510" r:id="rId25"/>
-    <p:sldId id="3512" r:id="rId26"/>
-    <p:sldId id="3517" r:id="rId27"/>
-    <p:sldId id="3514" r:id="rId28"/>
-    <p:sldId id="3515" r:id="rId29"/>
-    <p:sldId id="3516" r:id="rId30"/>
-    <p:sldId id="3518" r:id="rId31"/>
-    <p:sldId id="3476" r:id="rId32"/>
-    <p:sldId id="3477" r:id="rId33"/>
+    <p:sldId id="3529" r:id="rId9"/>
+    <p:sldId id="3482" r:id="rId10"/>
+    <p:sldId id="3530" r:id="rId11"/>
+    <p:sldId id="3484" r:id="rId12"/>
+    <p:sldId id="3531" r:id="rId13"/>
+    <p:sldId id="3486" r:id="rId14"/>
+    <p:sldId id="3532" r:id="rId15"/>
+    <p:sldId id="3521" r:id="rId16"/>
+    <p:sldId id="3533" r:id="rId17"/>
+    <p:sldId id="3523" r:id="rId18"/>
+    <p:sldId id="3534" r:id="rId19"/>
+    <p:sldId id="3525" r:id="rId20"/>
+    <p:sldId id="3535" r:id="rId21"/>
+    <p:sldId id="3536" r:id="rId22"/>
+    <p:sldId id="3527" r:id="rId23"/>
+    <p:sldId id="283" r:id="rId24"/>
+    <p:sldId id="3503" r:id="rId25"/>
+    <p:sldId id="3504" r:id="rId26"/>
+    <p:sldId id="3505" r:id="rId27"/>
+    <p:sldId id="3506" r:id="rId28"/>
+    <p:sldId id="3507" r:id="rId29"/>
+    <p:sldId id="3508" r:id="rId30"/>
+    <p:sldId id="3509" r:id="rId31"/>
+    <p:sldId id="3513" r:id="rId32"/>
+    <p:sldId id="3510" r:id="rId33"/>
+    <p:sldId id="3512" r:id="rId34"/>
+    <p:sldId id="3517" r:id="rId35"/>
+    <p:sldId id="3514" r:id="rId36"/>
+    <p:sldId id="3515" r:id="rId37"/>
+    <p:sldId id="3516" r:id="rId38"/>
+    <p:sldId id="3518" r:id="rId39"/>
+    <p:sldId id="3476" r:id="rId40"/>
+    <p:sldId id="3477" r:id="rId41"/>
   </p:sldIdLst>
   <p:sldSz cx="12192000" cy="6858000"/>
   <p:notesSz cx="6858000" cy="9144000"/>
@@ -292,7 +300,7 @@
           <a:p>
             <a:fld id="{9B916260-F45C-B647-88A4-C91F6BA5DC4E}" type="datetimeFigureOut">
               <a:rPr lang="en-CH" smtClean="0"/>
-              <a:t>03.10.24</a:t>
+              <a:t>04.10.24</a:t>
             </a:fld>
             <a:endParaRPr lang="en-CH"/>
           </a:p>
@@ -492,7 +500,7 @@
           <a:p>
             <a:fld id="{9B916260-F45C-B647-88A4-C91F6BA5DC4E}" type="datetimeFigureOut">
               <a:rPr lang="en-CH" smtClean="0"/>
-              <a:t>03.10.24</a:t>
+              <a:t>04.10.24</a:t>
             </a:fld>
             <a:endParaRPr lang="en-CH"/>
           </a:p>
@@ -702,7 +710,7 @@
           <a:p>
             <a:fld id="{9B916260-F45C-B647-88A4-C91F6BA5DC4E}" type="datetimeFigureOut">
               <a:rPr lang="en-CH" smtClean="0"/>
-              <a:t>03.10.24</a:t>
+              <a:t>04.10.24</a:t>
             </a:fld>
             <a:endParaRPr lang="en-CH"/>
           </a:p>
@@ -902,7 +910,7 @@
           <a:p>
             <a:fld id="{9B916260-F45C-B647-88A4-C91F6BA5DC4E}" type="datetimeFigureOut">
               <a:rPr lang="en-CH" smtClean="0"/>
-              <a:t>03.10.24</a:t>
+              <a:t>04.10.24</a:t>
             </a:fld>
             <a:endParaRPr lang="en-CH"/>
           </a:p>
@@ -1178,7 +1186,7 @@
           <a:p>
             <a:fld id="{9B916260-F45C-B647-88A4-C91F6BA5DC4E}" type="datetimeFigureOut">
               <a:rPr lang="en-CH" smtClean="0"/>
-              <a:t>03.10.24</a:t>
+              <a:t>04.10.24</a:t>
             </a:fld>
             <a:endParaRPr lang="en-CH"/>
           </a:p>
@@ -1446,7 +1454,7 @@
           <a:p>
             <a:fld id="{9B916260-F45C-B647-88A4-C91F6BA5DC4E}" type="datetimeFigureOut">
               <a:rPr lang="en-CH" smtClean="0"/>
-              <a:t>03.10.24</a:t>
+              <a:t>04.10.24</a:t>
             </a:fld>
             <a:endParaRPr lang="en-CH"/>
           </a:p>
@@ -1861,7 +1869,7 @@
           <a:p>
             <a:fld id="{9B916260-F45C-B647-88A4-C91F6BA5DC4E}" type="datetimeFigureOut">
               <a:rPr lang="en-CH" smtClean="0"/>
-              <a:t>03.10.24</a:t>
+              <a:t>04.10.24</a:t>
             </a:fld>
             <a:endParaRPr lang="en-CH"/>
           </a:p>
@@ -2003,7 +2011,7 @@
           <a:p>
             <a:fld id="{9B916260-F45C-B647-88A4-C91F6BA5DC4E}" type="datetimeFigureOut">
               <a:rPr lang="en-CH" smtClean="0"/>
-              <a:t>03.10.24</a:t>
+              <a:t>04.10.24</a:t>
             </a:fld>
             <a:endParaRPr lang="en-CH"/>
           </a:p>
@@ -2116,7 +2124,7 @@
           <a:p>
             <a:fld id="{9B916260-F45C-B647-88A4-C91F6BA5DC4E}" type="datetimeFigureOut">
               <a:rPr lang="en-CH" smtClean="0"/>
-              <a:t>03.10.24</a:t>
+              <a:t>04.10.24</a:t>
             </a:fld>
             <a:endParaRPr lang="en-CH"/>
           </a:p>
@@ -2429,7 +2437,7 @@
           <a:p>
             <a:fld id="{9B916260-F45C-B647-88A4-C91F6BA5DC4E}" type="datetimeFigureOut">
               <a:rPr lang="en-CH" smtClean="0"/>
-              <a:t>03.10.24</a:t>
+              <a:t>04.10.24</a:t>
             </a:fld>
             <a:endParaRPr lang="en-CH"/>
           </a:p>
@@ -2718,7 +2726,7 @@
           <a:p>
             <a:fld id="{9B916260-F45C-B647-88A4-C91F6BA5DC4E}" type="datetimeFigureOut">
               <a:rPr lang="en-CH" smtClean="0"/>
-              <a:t>03.10.24</a:t>
+              <a:t>04.10.24</a:t>
             </a:fld>
             <a:endParaRPr lang="en-CH"/>
           </a:p>
@@ -2961,7 +2969,7 @@
           <a:p>
             <a:fld id="{9B916260-F45C-B647-88A4-C91F6BA5DC4E}" type="datetimeFigureOut">
               <a:rPr lang="en-CH" smtClean="0"/>
-              <a:t>03.10.24</a:t>
+              <a:t>04.10.24</a:t>
             </a:fld>
             <a:endParaRPr lang="en-CH"/>
           </a:p>
@@ -3469,6 +3477,222 @@
     <p:bg>
       <p:bgPr>
         <a:solidFill>
+          <a:srgbClr val="646464"/>
+        </a:solidFill>
+        <a:effectLst/>
+      </p:bgPr>
+    </p:bg>
+    <p:spTree>
+      <p:nvGrpSpPr>
+        <p:cNvPr id="1" name="">
+          <a:extLst>
+            <a:ext uri="{FF2B5EF4-FFF2-40B4-BE49-F238E27FC236}">
+              <a16:creationId xmlns:a16="http://schemas.microsoft.com/office/drawing/2014/main" id="{7E73C008-EA6C-219A-4A92-0E78211D8684}"/>
+            </a:ext>
+          </a:extLst>
+        </p:cNvPr>
+        <p:cNvGrpSpPr/>
+        <p:nvPr/>
+      </p:nvGrpSpPr>
+      <p:grpSpPr>
+        <a:xfrm>
+          <a:off x="0" y="0"/>
+          <a:ext cx="0" cy="0"/>
+          <a:chOff x="0" y="0"/>
+          <a:chExt cx="0" cy="0"/>
+        </a:xfrm>
+      </p:grpSpPr>
+      <p:pic>
+        <p:nvPicPr>
+          <p:cNvPr id="3" name="Picture 2">
+            <a:extLst>
+              <a:ext uri="{FF2B5EF4-FFF2-40B4-BE49-F238E27FC236}">
+                <a16:creationId xmlns:a16="http://schemas.microsoft.com/office/drawing/2014/main" id="{BFC71AF6-76E8-DCAA-2D2A-E060EBF5D907}"/>
+              </a:ext>
+            </a:extLst>
+          </p:cNvPr>
+          <p:cNvPicPr>
+            <a:picLocks noChangeAspect="1"/>
+          </p:cNvPicPr>
+          <p:nvPr/>
+        </p:nvPicPr>
+        <p:blipFill>
+          <a:blip r:embed="rId2"/>
+          <a:stretch>
+            <a:fillRect/>
+          </a:stretch>
+        </p:blipFill>
+        <p:spPr>
+          <a:xfrm>
+            <a:off x="5016000" y="2349000"/>
+            <a:ext cx="2160000" cy="2160000"/>
+          </a:xfrm>
+          <a:prstGeom prst="rect">
+            <a:avLst/>
+          </a:prstGeom>
+        </p:spPr>
+      </p:pic>
+    </p:spTree>
+    <p:extLst>
+      <p:ext uri="{BB962C8B-B14F-4D97-AF65-F5344CB8AC3E}">
+        <p14:creationId xmlns:p14="http://schemas.microsoft.com/office/powerpoint/2010/main" val="1937959015"/>
+      </p:ext>
+    </p:extLst>
+  </p:cSld>
+  <p:clrMapOvr>
+    <a:masterClrMapping/>
+  </p:clrMapOvr>
+</p:sld>
+</file>
+
+<file path=ppt/slides/slide11.xml><?xml version="1.0" encoding="utf-8"?>
+<p:sld xmlns:a="http://schemas.openxmlformats.org/drawingml/2006/main" xmlns:r="http://schemas.openxmlformats.org/officeDocument/2006/relationships" xmlns:p="http://schemas.openxmlformats.org/presentationml/2006/main">
+  <p:cSld>
+    <p:bg>
+      <p:bgPr>
+        <a:solidFill>
+          <a:srgbClr val="5C5C5C"/>
+        </a:solidFill>
+        <a:effectLst/>
+      </p:bgPr>
+    </p:bg>
+    <p:spTree>
+      <p:nvGrpSpPr>
+        <p:cNvPr id="1" name=""/>
+        <p:cNvGrpSpPr/>
+        <p:nvPr/>
+      </p:nvGrpSpPr>
+      <p:grpSpPr>
+        <a:xfrm>
+          <a:off x="0" y="0"/>
+          <a:ext cx="0" cy="0"/>
+          <a:chOff x="0" y="0"/>
+          <a:chExt cx="0" cy="0"/>
+        </a:xfrm>
+      </p:grpSpPr>
+      <p:pic>
+        <p:nvPicPr>
+          <p:cNvPr id="4" name="Picture 3">
+            <a:extLst>
+              <a:ext uri="{FF2B5EF4-FFF2-40B4-BE49-F238E27FC236}">
+                <a16:creationId xmlns:a16="http://schemas.microsoft.com/office/drawing/2014/main" id="{BF22FE1A-67F2-9A08-251F-880432C4BF90}"/>
+              </a:ext>
+            </a:extLst>
+          </p:cNvPr>
+          <p:cNvPicPr>
+            <a:picLocks noChangeAspect="1"/>
+          </p:cNvPicPr>
+          <p:nvPr/>
+        </p:nvPicPr>
+        <p:blipFill>
+          <a:blip r:embed="rId2"/>
+          <a:stretch>
+            <a:fillRect/>
+          </a:stretch>
+        </p:blipFill>
+        <p:spPr>
+          <a:xfrm>
+            <a:off x="3501517" y="1449000"/>
+            <a:ext cx="5188966" cy="3960000"/>
+          </a:xfrm>
+          <a:prstGeom prst="rect">
+            <a:avLst/>
+          </a:prstGeom>
+        </p:spPr>
+      </p:pic>
+    </p:spTree>
+    <p:extLst>
+      <p:ext uri="{BB962C8B-B14F-4D97-AF65-F5344CB8AC3E}">
+        <p14:creationId xmlns:p14="http://schemas.microsoft.com/office/powerpoint/2010/main" val="3262247840"/>
+      </p:ext>
+    </p:extLst>
+  </p:cSld>
+  <p:clrMapOvr>
+    <a:masterClrMapping/>
+  </p:clrMapOvr>
+</p:sld>
+</file>
+
+<file path=ppt/slides/slide12.xml><?xml version="1.0" encoding="utf-8"?>
+<p:sld xmlns:a="http://schemas.openxmlformats.org/drawingml/2006/main" xmlns:r="http://schemas.openxmlformats.org/officeDocument/2006/relationships" xmlns:p="http://schemas.openxmlformats.org/presentationml/2006/main">
+  <p:cSld>
+    <p:bg>
+      <p:bgPr>
+        <a:solidFill>
+          <a:srgbClr val="646464"/>
+        </a:solidFill>
+        <a:effectLst/>
+      </p:bgPr>
+    </p:bg>
+    <p:spTree>
+      <p:nvGrpSpPr>
+        <p:cNvPr id="1" name="">
+          <a:extLst>
+            <a:ext uri="{FF2B5EF4-FFF2-40B4-BE49-F238E27FC236}">
+              <a16:creationId xmlns:a16="http://schemas.microsoft.com/office/drawing/2014/main" id="{D8D7E8FC-63CD-D038-66EE-469580598299}"/>
+            </a:ext>
+          </a:extLst>
+        </p:cNvPr>
+        <p:cNvGrpSpPr/>
+        <p:nvPr/>
+      </p:nvGrpSpPr>
+      <p:grpSpPr>
+        <a:xfrm>
+          <a:off x="0" y="0"/>
+          <a:ext cx="0" cy="0"/>
+          <a:chOff x="0" y="0"/>
+          <a:chExt cx="0" cy="0"/>
+        </a:xfrm>
+      </p:grpSpPr>
+      <p:pic>
+        <p:nvPicPr>
+          <p:cNvPr id="4" name="Picture 3">
+            <a:extLst>
+              <a:ext uri="{FF2B5EF4-FFF2-40B4-BE49-F238E27FC236}">
+                <a16:creationId xmlns:a16="http://schemas.microsoft.com/office/drawing/2014/main" id="{9F39331A-F7CF-58F5-D744-0DBAB092BE4E}"/>
+              </a:ext>
+            </a:extLst>
+          </p:cNvPr>
+          <p:cNvPicPr>
+            <a:picLocks noChangeAspect="1"/>
+          </p:cNvPicPr>
+          <p:nvPr/>
+        </p:nvPicPr>
+        <p:blipFill>
+          <a:blip r:embed="rId2"/>
+          <a:stretch>
+            <a:fillRect/>
+          </a:stretch>
+        </p:blipFill>
+        <p:spPr>
+          <a:xfrm>
+            <a:off x="5016000" y="2349000"/>
+            <a:ext cx="2160000" cy="2160000"/>
+          </a:xfrm>
+          <a:prstGeom prst="rect">
+            <a:avLst/>
+          </a:prstGeom>
+        </p:spPr>
+      </p:pic>
+    </p:spTree>
+    <p:extLst>
+      <p:ext uri="{BB962C8B-B14F-4D97-AF65-F5344CB8AC3E}">
+        <p14:creationId xmlns:p14="http://schemas.microsoft.com/office/powerpoint/2010/main" val="3059369653"/>
+      </p:ext>
+    </p:extLst>
+  </p:cSld>
+  <p:clrMapOvr>
+    <a:masterClrMapping/>
+  </p:clrMapOvr>
+</p:sld>
+</file>
+
+<file path=ppt/slides/slide13.xml><?xml version="1.0" encoding="utf-8"?>
+<p:sld xmlns:a="http://schemas.openxmlformats.org/drawingml/2006/main" xmlns:r="http://schemas.openxmlformats.org/officeDocument/2006/relationships" xmlns:p="http://schemas.openxmlformats.org/presentationml/2006/main">
+  <p:cSld>
+    <p:bg>
+      <p:bgPr>
+        <a:solidFill>
           <a:srgbClr val="5C5C5C"/>
         </a:solidFill>
         <a:effectLst/>
@@ -3531,7 +3755,81 @@
 </p:sld>
 </file>
 
-<file path=ppt/slides/slide11.xml><?xml version="1.0" encoding="utf-8"?>
+<file path=ppt/slides/slide14.xml><?xml version="1.0" encoding="utf-8"?>
+<p:sld xmlns:a="http://schemas.openxmlformats.org/drawingml/2006/main" xmlns:r="http://schemas.openxmlformats.org/officeDocument/2006/relationships" xmlns:p="http://schemas.openxmlformats.org/presentationml/2006/main">
+  <p:cSld>
+    <p:bg>
+      <p:bgPr>
+        <a:solidFill>
+          <a:srgbClr val="646464"/>
+        </a:solidFill>
+        <a:effectLst/>
+      </p:bgPr>
+    </p:bg>
+    <p:spTree>
+      <p:nvGrpSpPr>
+        <p:cNvPr id="1" name="">
+          <a:extLst>
+            <a:ext uri="{FF2B5EF4-FFF2-40B4-BE49-F238E27FC236}">
+              <a16:creationId xmlns:a16="http://schemas.microsoft.com/office/drawing/2014/main" id="{1A2B71C8-8CB2-B05B-4707-637A9E9C93E1}"/>
+            </a:ext>
+          </a:extLst>
+        </p:cNvPr>
+        <p:cNvGrpSpPr/>
+        <p:nvPr/>
+      </p:nvGrpSpPr>
+      <p:grpSpPr>
+        <a:xfrm>
+          <a:off x="0" y="0"/>
+          <a:ext cx="0" cy="0"/>
+          <a:chOff x="0" y="0"/>
+          <a:chExt cx="0" cy="0"/>
+        </a:xfrm>
+      </p:grpSpPr>
+      <p:pic>
+        <p:nvPicPr>
+          <p:cNvPr id="3" name="Picture 2">
+            <a:extLst>
+              <a:ext uri="{FF2B5EF4-FFF2-40B4-BE49-F238E27FC236}">
+                <a16:creationId xmlns:a16="http://schemas.microsoft.com/office/drawing/2014/main" id="{895CD17B-CCDF-EACC-9373-5C0B9CA6EEB6}"/>
+              </a:ext>
+            </a:extLst>
+          </p:cNvPr>
+          <p:cNvPicPr>
+            <a:picLocks noChangeAspect="1"/>
+          </p:cNvPicPr>
+          <p:nvPr/>
+        </p:nvPicPr>
+        <p:blipFill>
+          <a:blip r:embed="rId2"/>
+          <a:stretch>
+            <a:fillRect/>
+          </a:stretch>
+        </p:blipFill>
+        <p:spPr>
+          <a:xfrm>
+            <a:off x="5016000" y="2349000"/>
+            <a:ext cx="2160000" cy="2160000"/>
+          </a:xfrm>
+          <a:prstGeom prst="rect">
+            <a:avLst/>
+          </a:prstGeom>
+        </p:spPr>
+      </p:pic>
+    </p:spTree>
+    <p:extLst>
+      <p:ext uri="{BB962C8B-B14F-4D97-AF65-F5344CB8AC3E}">
+        <p14:creationId xmlns:p14="http://schemas.microsoft.com/office/powerpoint/2010/main" val="353043780"/>
+      </p:ext>
+    </p:extLst>
+  </p:cSld>
+  <p:clrMapOvr>
+    <a:masterClrMapping/>
+  </p:clrMapOvr>
+</p:sld>
+</file>
+
+<file path=ppt/slides/slide15.xml><?xml version="1.0" encoding="utf-8"?>
 <p:sld xmlns:a="http://schemas.openxmlformats.org/drawingml/2006/main" xmlns:r="http://schemas.openxmlformats.org/officeDocument/2006/relationships" xmlns:p="http://schemas.openxmlformats.org/presentationml/2006/main">
   <p:cSld>
     <p:bg>
@@ -3605,7 +3903,81 @@
 </p:sld>
 </file>
 
-<file path=ppt/slides/slide12.xml><?xml version="1.0" encoding="utf-8"?>
+<file path=ppt/slides/slide16.xml><?xml version="1.0" encoding="utf-8"?>
+<p:sld xmlns:a="http://schemas.openxmlformats.org/drawingml/2006/main" xmlns:r="http://schemas.openxmlformats.org/officeDocument/2006/relationships" xmlns:p="http://schemas.openxmlformats.org/presentationml/2006/main">
+  <p:cSld>
+    <p:bg>
+      <p:bgPr>
+        <a:solidFill>
+          <a:srgbClr val="646464"/>
+        </a:solidFill>
+        <a:effectLst/>
+      </p:bgPr>
+    </p:bg>
+    <p:spTree>
+      <p:nvGrpSpPr>
+        <p:cNvPr id="1" name="">
+          <a:extLst>
+            <a:ext uri="{FF2B5EF4-FFF2-40B4-BE49-F238E27FC236}">
+              <a16:creationId xmlns:a16="http://schemas.microsoft.com/office/drawing/2014/main" id="{2D9BAF64-2F31-E8F9-2AB8-FE37FA865D2B}"/>
+            </a:ext>
+          </a:extLst>
+        </p:cNvPr>
+        <p:cNvGrpSpPr/>
+        <p:nvPr/>
+      </p:nvGrpSpPr>
+      <p:grpSpPr>
+        <a:xfrm>
+          <a:off x="0" y="0"/>
+          <a:ext cx="0" cy="0"/>
+          <a:chOff x="0" y="0"/>
+          <a:chExt cx="0" cy="0"/>
+        </a:xfrm>
+      </p:grpSpPr>
+      <p:pic>
+        <p:nvPicPr>
+          <p:cNvPr id="4" name="Picture 3">
+            <a:extLst>
+              <a:ext uri="{FF2B5EF4-FFF2-40B4-BE49-F238E27FC236}">
+                <a16:creationId xmlns:a16="http://schemas.microsoft.com/office/drawing/2014/main" id="{8024FB6E-28BD-5B5F-A7B0-2F31636F9BD7}"/>
+              </a:ext>
+            </a:extLst>
+          </p:cNvPr>
+          <p:cNvPicPr>
+            <a:picLocks noChangeAspect="1"/>
+          </p:cNvPicPr>
+          <p:nvPr/>
+        </p:nvPicPr>
+        <p:blipFill>
+          <a:blip r:embed="rId2"/>
+          <a:stretch>
+            <a:fillRect/>
+          </a:stretch>
+        </p:blipFill>
+        <p:spPr>
+          <a:xfrm>
+            <a:off x="5016000" y="2349000"/>
+            <a:ext cx="2160000" cy="2160000"/>
+          </a:xfrm>
+          <a:prstGeom prst="rect">
+            <a:avLst/>
+          </a:prstGeom>
+        </p:spPr>
+      </p:pic>
+    </p:spTree>
+    <p:extLst>
+      <p:ext uri="{BB962C8B-B14F-4D97-AF65-F5344CB8AC3E}">
+        <p14:creationId xmlns:p14="http://schemas.microsoft.com/office/powerpoint/2010/main" val="160271785"/>
+      </p:ext>
+    </p:extLst>
+  </p:cSld>
+  <p:clrMapOvr>
+    <a:masterClrMapping/>
+  </p:clrMapOvr>
+</p:sld>
+</file>
+
+<file path=ppt/slides/slide17.xml><?xml version="1.0" encoding="utf-8"?>
 <p:sld xmlns:a="http://schemas.openxmlformats.org/drawingml/2006/main" xmlns:r="http://schemas.openxmlformats.org/officeDocument/2006/relationships" xmlns:p="http://schemas.openxmlformats.org/presentationml/2006/main">
   <p:cSld>
     <p:bg>
@@ -3679,7 +4051,81 @@
 </p:sld>
 </file>
 
-<file path=ppt/slides/slide13.xml><?xml version="1.0" encoding="utf-8"?>
+<file path=ppt/slides/slide18.xml><?xml version="1.0" encoding="utf-8"?>
+<p:sld xmlns:a="http://schemas.openxmlformats.org/drawingml/2006/main" xmlns:r="http://schemas.openxmlformats.org/officeDocument/2006/relationships" xmlns:p="http://schemas.openxmlformats.org/presentationml/2006/main">
+  <p:cSld>
+    <p:bg>
+      <p:bgPr>
+        <a:solidFill>
+          <a:srgbClr val="646464"/>
+        </a:solidFill>
+        <a:effectLst/>
+      </p:bgPr>
+    </p:bg>
+    <p:spTree>
+      <p:nvGrpSpPr>
+        <p:cNvPr id="1" name="">
+          <a:extLst>
+            <a:ext uri="{FF2B5EF4-FFF2-40B4-BE49-F238E27FC236}">
+              <a16:creationId xmlns:a16="http://schemas.microsoft.com/office/drawing/2014/main" id="{1E1F802D-02B9-65F8-6F94-4303786E7154}"/>
+            </a:ext>
+          </a:extLst>
+        </p:cNvPr>
+        <p:cNvGrpSpPr/>
+        <p:nvPr/>
+      </p:nvGrpSpPr>
+      <p:grpSpPr>
+        <a:xfrm>
+          <a:off x="0" y="0"/>
+          <a:ext cx="0" cy="0"/>
+          <a:chOff x="0" y="0"/>
+          <a:chExt cx="0" cy="0"/>
+        </a:xfrm>
+      </p:grpSpPr>
+      <p:pic>
+        <p:nvPicPr>
+          <p:cNvPr id="3" name="Picture 2">
+            <a:extLst>
+              <a:ext uri="{FF2B5EF4-FFF2-40B4-BE49-F238E27FC236}">
+                <a16:creationId xmlns:a16="http://schemas.microsoft.com/office/drawing/2014/main" id="{88574946-1596-0B04-E64A-E83E19BDD032}"/>
+              </a:ext>
+            </a:extLst>
+          </p:cNvPr>
+          <p:cNvPicPr>
+            <a:picLocks noChangeAspect="1"/>
+          </p:cNvPicPr>
+          <p:nvPr/>
+        </p:nvPicPr>
+        <p:blipFill>
+          <a:blip r:embed="rId2"/>
+          <a:stretch>
+            <a:fillRect/>
+          </a:stretch>
+        </p:blipFill>
+        <p:spPr>
+          <a:xfrm>
+            <a:off x="5016000" y="2349000"/>
+            <a:ext cx="2160000" cy="2160000"/>
+          </a:xfrm>
+          <a:prstGeom prst="rect">
+            <a:avLst/>
+          </a:prstGeom>
+        </p:spPr>
+      </p:pic>
+    </p:spTree>
+    <p:extLst>
+      <p:ext uri="{BB962C8B-B14F-4D97-AF65-F5344CB8AC3E}">
+        <p14:creationId xmlns:p14="http://schemas.microsoft.com/office/powerpoint/2010/main" val="1439036244"/>
+      </p:ext>
+    </p:extLst>
+  </p:cSld>
+  <p:clrMapOvr>
+    <a:masterClrMapping/>
+  </p:clrMapOvr>
+</p:sld>
+</file>
+
+<file path=ppt/slides/slide19.xml><?xml version="1.0" encoding="utf-8"?>
 <p:sld xmlns:a="http://schemas.openxmlformats.org/drawingml/2006/main" xmlns:r="http://schemas.openxmlformats.org/officeDocument/2006/relationships" xmlns:p="http://schemas.openxmlformats.org/presentationml/2006/main">
   <p:cSld>
     <p:bg>
@@ -3753,7 +4199,234 @@
 </p:sld>
 </file>
 
-<file path=ppt/slides/slide14.xml><?xml version="1.0" encoding="utf-8"?>
+<file path=ppt/slides/slide2.xml><?xml version="1.0" encoding="utf-8"?>
+<p:sld xmlns:a="http://schemas.openxmlformats.org/drawingml/2006/main" xmlns:r="http://schemas.openxmlformats.org/officeDocument/2006/relationships" xmlns:p="http://schemas.openxmlformats.org/presentationml/2006/main">
+  <p:cSld>
+    <p:spTree>
+      <p:nvGrpSpPr>
+        <p:cNvPr id="1" name=""/>
+        <p:cNvGrpSpPr/>
+        <p:nvPr/>
+      </p:nvGrpSpPr>
+      <p:grpSpPr>
+        <a:xfrm>
+          <a:off x="0" y="0"/>
+          <a:ext cx="0" cy="0"/>
+          <a:chOff x="0" y="0"/>
+          <a:chExt cx="0" cy="0"/>
+        </a:xfrm>
+      </p:grpSpPr>
+      <p:sp>
+        <p:nvSpPr>
+          <p:cNvPr id="2" name="Title 1">
+            <a:extLst>
+              <a:ext uri="{FF2B5EF4-FFF2-40B4-BE49-F238E27FC236}">
+                <a16:creationId xmlns:a16="http://schemas.microsoft.com/office/drawing/2014/main" id="{0A1FA53E-25A0-0960-0FCC-4CC105416AC1}"/>
+              </a:ext>
+            </a:extLst>
+          </p:cNvPr>
+          <p:cNvSpPr>
+            <a:spLocks noGrp="1"/>
+          </p:cNvSpPr>
+          <p:nvPr>
+            <p:ph type="title"/>
+          </p:nvPr>
+        </p:nvSpPr>
+        <p:spPr>
+          <a:xfrm>
+            <a:off x="410688" y="365125"/>
+            <a:ext cx="10943112" cy="584901"/>
+          </a:xfrm>
+        </p:spPr>
+        <p:txBody>
+          <a:bodyPr>
+            <a:normAutofit/>
+          </a:bodyPr>
+          <a:lstStyle/>
+          <a:p>
+            <a:r>
+              <a:rPr lang="en-CH" sz="2800" b="1" dirty="0">
+                <a:latin typeface="Avenir Book" panose="02000503020000020003" pitchFamily="2" charset="0"/>
+              </a:rPr>
+              <a:t>Practice Task Slides (12 trials)</a:t>
+            </a:r>
+          </a:p>
+        </p:txBody>
+      </p:sp>
+    </p:spTree>
+    <p:extLst>
+      <p:ext uri="{BB962C8B-B14F-4D97-AF65-F5344CB8AC3E}">
+        <p14:creationId xmlns:p14="http://schemas.microsoft.com/office/powerpoint/2010/main" val="2739542140"/>
+      </p:ext>
+    </p:extLst>
+  </p:cSld>
+  <p:clrMapOvr>
+    <a:masterClrMapping/>
+  </p:clrMapOvr>
+</p:sld>
+</file>
+
+<file path=ppt/slides/slide20.xml><?xml version="1.0" encoding="utf-8"?>
+<p:sld xmlns:a="http://schemas.openxmlformats.org/drawingml/2006/main" xmlns:r="http://schemas.openxmlformats.org/officeDocument/2006/relationships" xmlns:p="http://schemas.openxmlformats.org/presentationml/2006/main">
+  <p:cSld>
+    <p:bg>
+      <p:bgPr>
+        <a:solidFill>
+          <a:srgbClr val="646464"/>
+        </a:solidFill>
+        <a:effectLst/>
+      </p:bgPr>
+    </p:bg>
+    <p:spTree>
+      <p:nvGrpSpPr>
+        <p:cNvPr id="1" name="">
+          <a:extLst>
+            <a:ext uri="{FF2B5EF4-FFF2-40B4-BE49-F238E27FC236}">
+              <a16:creationId xmlns:a16="http://schemas.microsoft.com/office/drawing/2014/main" id="{443C470D-9A5B-91DA-318A-6C272308FB5F}"/>
+            </a:ext>
+          </a:extLst>
+        </p:cNvPr>
+        <p:cNvGrpSpPr/>
+        <p:nvPr/>
+      </p:nvGrpSpPr>
+      <p:grpSpPr>
+        <a:xfrm>
+          <a:off x="0" y="0"/>
+          <a:ext cx="0" cy="0"/>
+          <a:chOff x="0" y="0"/>
+          <a:chExt cx="0" cy="0"/>
+        </a:xfrm>
+      </p:grpSpPr>
+      <p:pic>
+        <p:nvPicPr>
+          <p:cNvPr id="4" name="Picture 3">
+            <a:extLst>
+              <a:ext uri="{FF2B5EF4-FFF2-40B4-BE49-F238E27FC236}">
+                <a16:creationId xmlns:a16="http://schemas.microsoft.com/office/drawing/2014/main" id="{375BE7D7-F3BE-901E-88FB-AB6C3CFABC09}"/>
+              </a:ext>
+            </a:extLst>
+          </p:cNvPr>
+          <p:cNvPicPr>
+            <a:picLocks noChangeAspect="1"/>
+          </p:cNvPicPr>
+          <p:nvPr/>
+        </p:nvPicPr>
+        <p:blipFill>
+          <a:blip r:embed="rId2"/>
+          <a:stretch>
+            <a:fillRect/>
+          </a:stretch>
+        </p:blipFill>
+        <p:spPr>
+          <a:xfrm>
+            <a:off x="5016000" y="2349000"/>
+            <a:ext cx="2160000" cy="2160000"/>
+          </a:xfrm>
+          <a:prstGeom prst="rect">
+            <a:avLst/>
+          </a:prstGeom>
+        </p:spPr>
+      </p:pic>
+    </p:spTree>
+    <p:extLst>
+      <p:ext uri="{BB962C8B-B14F-4D97-AF65-F5344CB8AC3E}">
+        <p14:creationId xmlns:p14="http://schemas.microsoft.com/office/powerpoint/2010/main" val="1011469499"/>
+      </p:ext>
+    </p:extLst>
+  </p:cSld>
+  <p:clrMapOvr>
+    <a:masterClrMapping/>
+  </p:clrMapOvr>
+</p:sld>
+</file>
+
+<file path=ppt/slides/slide21.xml><?xml version="1.0" encoding="utf-8"?>
+<p:sld xmlns:a="http://schemas.openxmlformats.org/drawingml/2006/main" xmlns:r="http://schemas.openxmlformats.org/officeDocument/2006/relationships" xmlns:p="http://schemas.openxmlformats.org/presentationml/2006/main">
+  <p:cSld>
+    <p:bg>
+      <p:bgPr>
+        <a:solidFill>
+          <a:srgbClr val="646464"/>
+        </a:solidFill>
+        <a:effectLst/>
+      </p:bgPr>
+    </p:bg>
+    <p:spTree>
+      <p:nvGrpSpPr>
+        <p:cNvPr id="1" name="">
+          <a:extLst>
+            <a:ext uri="{FF2B5EF4-FFF2-40B4-BE49-F238E27FC236}">
+              <a16:creationId xmlns:a16="http://schemas.microsoft.com/office/drawing/2014/main" id="{1B9A2577-7FBA-BB3B-2C15-F4DD42A49C42}"/>
+            </a:ext>
+          </a:extLst>
+        </p:cNvPr>
+        <p:cNvGrpSpPr/>
+        <p:nvPr/>
+      </p:nvGrpSpPr>
+      <p:grpSpPr>
+        <a:xfrm>
+          <a:off x="0" y="0"/>
+          <a:ext cx="0" cy="0"/>
+          <a:chOff x="0" y="0"/>
+          <a:chExt cx="0" cy="0"/>
+        </a:xfrm>
+      </p:grpSpPr>
+      <p:pic>
+        <p:nvPicPr>
+          <p:cNvPr id="4" name="Picture 3">
+            <a:extLst>
+              <a:ext uri="{FF2B5EF4-FFF2-40B4-BE49-F238E27FC236}">
+                <a16:creationId xmlns:a16="http://schemas.microsoft.com/office/drawing/2014/main" id="{02CE0ED7-958D-26E5-1945-9B81A34057E7}"/>
+              </a:ext>
+            </a:extLst>
+          </p:cNvPr>
+          <p:cNvPicPr>
+            <a:picLocks noChangeAspect="1"/>
+          </p:cNvPicPr>
+          <p:nvPr/>
+        </p:nvPicPr>
+        <p:blipFill>
+          <a:blip r:embed="rId2">
+            <a:extLst>
+              <a:ext uri="{BEBA8EAE-BF5A-486C-A8C5-ECC9F3942E4B}">
+                <a14:imgProps xmlns:a14="http://schemas.microsoft.com/office/drawing/2010/main">
+                  <a14:imgLayer r:embed="rId3">
+                    <a14:imgEffect>
+                      <a14:artisticChalkSketch/>
+                    </a14:imgEffect>
+                  </a14:imgLayer>
+                </a14:imgProps>
+              </a:ext>
+            </a:extLst>
+          </a:blip>
+          <a:stretch>
+            <a:fillRect/>
+          </a:stretch>
+        </p:blipFill>
+        <p:spPr>
+          <a:xfrm>
+            <a:off x="4584450" y="2349000"/>
+            <a:ext cx="3023100" cy="2160000"/>
+          </a:xfrm>
+          <a:prstGeom prst="rect">
+            <a:avLst/>
+          </a:prstGeom>
+        </p:spPr>
+      </p:pic>
+    </p:spTree>
+    <p:extLst>
+      <p:ext uri="{BB962C8B-B14F-4D97-AF65-F5344CB8AC3E}">
+        <p14:creationId xmlns:p14="http://schemas.microsoft.com/office/powerpoint/2010/main" val="572961673"/>
+      </p:ext>
+    </p:extLst>
+  </p:cSld>
+  <p:clrMapOvr>
+    <a:masterClrMapping/>
+  </p:clrMapOvr>
+</p:sld>
+</file>
+
+<file path=ppt/slides/slide22.xml><?xml version="1.0" encoding="utf-8"?>
 <p:sld xmlns:a="http://schemas.openxmlformats.org/drawingml/2006/main" xmlns:r="http://schemas.openxmlformats.org/officeDocument/2006/relationships" xmlns:p="http://schemas.openxmlformats.org/presentationml/2006/main">
   <p:cSld>
     <p:bg>
@@ -3833,7 +4506,7 @@
 </p:sld>
 </file>
 
-<file path=ppt/slides/slide15.xml><?xml version="1.0" encoding="utf-8"?>
+<file path=ppt/slides/slide23.xml><?xml version="1.0" encoding="utf-8"?>
 <p:sld xmlns:a="http://schemas.openxmlformats.org/drawingml/2006/main" xmlns:r="http://schemas.openxmlformats.org/officeDocument/2006/relationships" xmlns:p="http://schemas.openxmlformats.org/presentationml/2006/main">
   <p:cSld>
     <p:bg>
@@ -3901,7 +4574,7 @@
 </p:sld>
 </file>
 
-<file path=ppt/slides/slide16.xml><?xml version="1.0" encoding="utf-8"?>
+<file path=ppt/slides/slide24.xml><?xml version="1.0" encoding="utf-8"?>
 <p:sld xmlns:a="http://schemas.openxmlformats.org/drawingml/2006/main" xmlns:r="http://schemas.openxmlformats.org/officeDocument/2006/relationships" xmlns:p="http://schemas.openxmlformats.org/presentationml/2006/main">
   <p:cSld>
     <p:bg>
@@ -3975,7 +4648,7 @@
 </p:sld>
 </file>
 
-<file path=ppt/slides/slide17.xml><?xml version="1.0" encoding="utf-8"?>
+<file path=ppt/slides/slide25.xml><?xml version="1.0" encoding="utf-8"?>
 <p:sld xmlns:a="http://schemas.openxmlformats.org/drawingml/2006/main" xmlns:r="http://schemas.openxmlformats.org/officeDocument/2006/relationships" xmlns:p="http://schemas.openxmlformats.org/presentationml/2006/main">
   <p:cSld>
     <p:bg>
@@ -4049,7 +4722,7 @@
 </p:sld>
 </file>
 
-<file path=ppt/slides/slide18.xml><?xml version="1.0" encoding="utf-8"?>
+<file path=ppt/slides/slide26.xml><?xml version="1.0" encoding="utf-8"?>
 <p:sld xmlns:a="http://schemas.openxmlformats.org/drawingml/2006/main" xmlns:r="http://schemas.openxmlformats.org/officeDocument/2006/relationships" xmlns:p="http://schemas.openxmlformats.org/presentationml/2006/main">
   <p:cSld>
     <p:bg>
@@ -4123,7 +4796,7 @@
 </p:sld>
 </file>
 
-<file path=ppt/slides/slide19.xml><?xml version="1.0" encoding="utf-8"?>
+<file path=ppt/slides/slide27.xml><?xml version="1.0" encoding="utf-8"?>
 <p:sld xmlns:a="http://schemas.openxmlformats.org/drawingml/2006/main" xmlns:r="http://schemas.openxmlformats.org/officeDocument/2006/relationships" xmlns:p="http://schemas.openxmlformats.org/presentationml/2006/main">
   <p:cSld>
     <p:bg>
@@ -4197,74 +4870,7 @@
 </p:sld>
 </file>
 
-<file path=ppt/slides/slide2.xml><?xml version="1.0" encoding="utf-8"?>
-<p:sld xmlns:a="http://schemas.openxmlformats.org/drawingml/2006/main" xmlns:r="http://schemas.openxmlformats.org/officeDocument/2006/relationships" xmlns:p="http://schemas.openxmlformats.org/presentationml/2006/main">
-  <p:cSld>
-    <p:spTree>
-      <p:nvGrpSpPr>
-        <p:cNvPr id="1" name=""/>
-        <p:cNvGrpSpPr/>
-        <p:nvPr/>
-      </p:nvGrpSpPr>
-      <p:grpSpPr>
-        <a:xfrm>
-          <a:off x="0" y="0"/>
-          <a:ext cx="0" cy="0"/>
-          <a:chOff x="0" y="0"/>
-          <a:chExt cx="0" cy="0"/>
-        </a:xfrm>
-      </p:grpSpPr>
-      <p:sp>
-        <p:nvSpPr>
-          <p:cNvPr id="2" name="Title 1">
-            <a:extLst>
-              <a:ext uri="{FF2B5EF4-FFF2-40B4-BE49-F238E27FC236}">
-                <a16:creationId xmlns:a16="http://schemas.microsoft.com/office/drawing/2014/main" id="{0A1FA53E-25A0-0960-0FCC-4CC105416AC1}"/>
-              </a:ext>
-            </a:extLst>
-          </p:cNvPr>
-          <p:cNvSpPr>
-            <a:spLocks noGrp="1"/>
-          </p:cNvSpPr>
-          <p:nvPr>
-            <p:ph type="title"/>
-          </p:nvPr>
-        </p:nvSpPr>
-        <p:spPr>
-          <a:xfrm>
-            <a:off x="410688" y="365125"/>
-            <a:ext cx="10943112" cy="584901"/>
-          </a:xfrm>
-        </p:spPr>
-        <p:txBody>
-          <a:bodyPr>
-            <a:normAutofit/>
-          </a:bodyPr>
-          <a:lstStyle/>
-          <a:p>
-            <a:r>
-              <a:rPr lang="en-CH" sz="2800" b="1" dirty="0">
-                <a:latin typeface="Avenir Book" panose="02000503020000020003" pitchFamily="2" charset="0"/>
-              </a:rPr>
-              <a:t>Practice Task Slides (12 trials)</a:t>
-            </a:r>
-          </a:p>
-        </p:txBody>
-      </p:sp>
-    </p:spTree>
-    <p:extLst>
-      <p:ext uri="{BB962C8B-B14F-4D97-AF65-F5344CB8AC3E}">
-        <p14:creationId xmlns:p14="http://schemas.microsoft.com/office/powerpoint/2010/main" val="2739542140"/>
-      </p:ext>
-    </p:extLst>
-  </p:cSld>
-  <p:clrMapOvr>
-    <a:masterClrMapping/>
-  </p:clrMapOvr>
-</p:sld>
-</file>
-
-<file path=ppt/slides/slide20.xml><?xml version="1.0" encoding="utf-8"?>
+<file path=ppt/slides/slide28.xml><?xml version="1.0" encoding="utf-8"?>
 <p:sld xmlns:a="http://schemas.openxmlformats.org/drawingml/2006/main" xmlns:r="http://schemas.openxmlformats.org/officeDocument/2006/relationships" xmlns:p="http://schemas.openxmlformats.org/presentationml/2006/main">
   <p:cSld>
     <p:bg>
@@ -4338,7 +4944,7 @@
 </p:sld>
 </file>
 
-<file path=ppt/slides/slide21.xml><?xml version="1.0" encoding="utf-8"?>
+<file path=ppt/slides/slide29.xml><?xml version="1.0" encoding="utf-8"?>
 <p:sld xmlns:a="http://schemas.openxmlformats.org/drawingml/2006/main" xmlns:r="http://schemas.openxmlformats.org/officeDocument/2006/relationships" xmlns:p="http://schemas.openxmlformats.org/presentationml/2006/main">
   <p:cSld>
     <p:bg>
@@ -4412,7 +5018,162 @@
 </p:sld>
 </file>
 
-<file path=ppt/slides/slide22.xml><?xml version="1.0" encoding="utf-8"?>
+<file path=ppt/slides/slide3.xml><?xml version="1.0" encoding="utf-8"?>
+<p:sld xmlns:a="http://schemas.openxmlformats.org/drawingml/2006/main" xmlns:r="http://schemas.openxmlformats.org/officeDocument/2006/relationships" xmlns:p="http://schemas.openxmlformats.org/presentationml/2006/main">
+  <p:cSld>
+    <p:bg>
+      <p:bgPr>
+        <a:solidFill>
+          <a:srgbClr val="5C5C5C"/>
+        </a:solidFill>
+        <a:effectLst/>
+      </p:bgPr>
+    </p:bg>
+    <p:spTree>
+      <p:nvGrpSpPr>
+        <p:cNvPr id="1" name=""/>
+        <p:cNvGrpSpPr/>
+        <p:nvPr/>
+      </p:nvGrpSpPr>
+      <p:grpSpPr>
+        <a:xfrm>
+          <a:off x="0" y="0"/>
+          <a:ext cx="0" cy="0"/>
+          <a:chOff x="0" y="0"/>
+          <a:chExt cx="0" cy="0"/>
+        </a:xfrm>
+      </p:grpSpPr>
+      <p:sp>
+        <p:nvSpPr>
+          <p:cNvPr id="5" name="TextBox 4">
+            <a:extLst>
+              <a:ext uri="{FF2B5EF4-FFF2-40B4-BE49-F238E27FC236}">
+                <a16:creationId xmlns:a16="http://schemas.microsoft.com/office/drawing/2014/main" id="{5C3101FE-916F-7AC8-03CF-F8680EC21ADF}"/>
+              </a:ext>
+            </a:extLst>
+          </p:cNvPr>
+          <p:cNvSpPr txBox="1"/>
+          <p:nvPr/>
+        </p:nvSpPr>
+        <p:spPr>
+          <a:xfrm>
+            <a:off x="391886" y="130629"/>
+            <a:ext cx="11614067" cy="4216539"/>
+          </a:xfrm>
+          <a:prstGeom prst="rect">
+            <a:avLst/>
+          </a:prstGeom>
+          <a:noFill/>
+          <a:ln>
+            <a:noFill/>
+          </a:ln>
+        </p:spPr>
+        <p:txBody>
+          <a:bodyPr wrap="square" rtlCol="0">
+            <a:spAutoFit/>
+          </a:bodyPr>
+          <a:lstStyle/>
+          <a:p>
+            <a:pPr algn="ctr"/>
+            <a:r>
+              <a:rPr lang="en-CH" sz="2400" dirty="0">
+                <a:solidFill>
+                  <a:schemeClr val="bg1"/>
+                </a:solidFill>
+                <a:latin typeface="Arial" panose="020B0604020202020204" pitchFamily="34" charset="0"/>
+                <a:cs typeface="Arial" panose="020B0604020202020204" pitchFamily="34" charset="0"/>
+              </a:rPr>
+              <a:t>Welcome to the Egg task.</a:t>
+            </a:r>
+          </a:p>
+          <a:p>
+            <a:endParaRPr lang="en-CH" sz="2400" dirty="0">
+              <a:solidFill>
+                <a:schemeClr val="bg1"/>
+              </a:solidFill>
+              <a:latin typeface="Arial" panose="020B0604020202020204" pitchFamily="34" charset="0"/>
+              <a:cs typeface="Arial" panose="020B0604020202020204" pitchFamily="34" charset="0"/>
+            </a:endParaRPr>
+          </a:p>
+          <a:p>
+            <a:r>
+              <a:rPr lang="en-GB" sz="2200" dirty="0">
+                <a:solidFill>
+                  <a:schemeClr val="bg1"/>
+                </a:solidFill>
+                <a:latin typeface="Arial" panose="020B0604020202020204" pitchFamily="34" charset="0"/>
+                <a:cs typeface="Arial" panose="020B0604020202020204" pitchFamily="34" charset="0"/>
+              </a:rPr>
+              <a:t>Your goal in this task is to buy as many fresh eggs from the egg farmer for your store as possible. You want to get a good variety of eggs but some of them are more sensitive and get rotten more easily. For good eggs you receive money, when you buy bad eggs you loose money.</a:t>
+            </a:r>
+          </a:p>
+          <a:p>
+            <a:endParaRPr lang="en-GB" sz="2200" dirty="0">
+              <a:solidFill>
+                <a:schemeClr val="bg1"/>
+              </a:solidFill>
+              <a:latin typeface="Arial" panose="020B0604020202020204" pitchFamily="34" charset="0"/>
+              <a:cs typeface="Arial" panose="020B0604020202020204" pitchFamily="34" charset="0"/>
+            </a:endParaRPr>
+          </a:p>
+          <a:p>
+            <a:r>
+              <a:rPr lang="en-GB" sz="2200" dirty="0">
+                <a:solidFill>
+                  <a:schemeClr val="bg1"/>
+                </a:solidFill>
+                <a:latin typeface="Arial" panose="020B0604020202020204" pitchFamily="34" charset="0"/>
+                <a:cs typeface="Arial" panose="020B0604020202020204" pitchFamily="34" charset="0"/>
+              </a:rPr>
+              <a:t>Because there are different sorts of eggs, you have to learn which ones are more likely to be rotten and which ones are more likely to stay fresh. </a:t>
+            </a:r>
+          </a:p>
+          <a:p>
+            <a:endParaRPr lang="en-GB" sz="2200" dirty="0">
+              <a:solidFill>
+                <a:schemeClr val="bg1"/>
+              </a:solidFill>
+              <a:latin typeface="Arial" panose="020B0604020202020204" pitchFamily="34" charset="0"/>
+              <a:cs typeface="Arial" panose="020B0604020202020204" pitchFamily="34" charset="0"/>
+            </a:endParaRPr>
+          </a:p>
+          <a:p>
+            <a:r>
+              <a:rPr lang="en-GB" sz="2200" dirty="0">
+                <a:solidFill>
+                  <a:schemeClr val="bg1"/>
+                </a:solidFill>
+                <a:latin typeface="Arial" panose="020B0604020202020204" pitchFamily="34" charset="0"/>
+                <a:cs typeface="Arial" panose="020B0604020202020204" pitchFamily="34" charset="0"/>
+              </a:rPr>
+              <a:t>Try to make as much profit as possible.</a:t>
+            </a:r>
+          </a:p>
+          <a:p>
+            <a:endParaRPr lang="en-GB" sz="2200" dirty="0">
+              <a:solidFill>
+                <a:schemeClr val="bg1"/>
+              </a:solidFill>
+              <a:latin typeface="Arial" panose="020B0604020202020204" pitchFamily="34" charset="0"/>
+              <a:cs typeface="Arial" panose="020B0604020202020204" pitchFamily="34" charset="0"/>
+            </a:endParaRPr>
+          </a:p>
+        </p:txBody>
+      </p:sp>
+    </p:spTree>
+    <p:extLst>
+      <p:ext uri="{BB962C8B-B14F-4D97-AF65-F5344CB8AC3E}">
+        <p14:creationId xmlns:p14="http://schemas.microsoft.com/office/powerpoint/2010/main" val="2976116893"/>
+      </p:ext>
+    </p:extLst>
+  </p:cSld>
+  <p:clrMapOvr>
+    <a:masterClrMapping/>
+  </p:clrMapOvr>
+</p:sld>
+</file>
+
+<file path=ppt/slides/slide30.xml><?xml version="1.0" encoding="utf-8"?>
 <p:sld xmlns:a="http://schemas.openxmlformats.org/drawingml/2006/main" xmlns:r="http://schemas.openxmlformats.org/officeDocument/2006/relationships" xmlns:p="http://schemas.openxmlformats.org/presentationml/2006/main">
   <p:cSld>
     <p:bg>
@@ -4486,7 +5247,7 @@
 </p:sld>
 </file>
 
-<file path=ppt/slides/slide23.xml><?xml version="1.0" encoding="utf-8"?>
+<file path=ppt/slides/slide31.xml><?xml version="1.0" encoding="utf-8"?>
 <p:sld xmlns:a="http://schemas.openxmlformats.org/drawingml/2006/main" xmlns:r="http://schemas.openxmlformats.org/officeDocument/2006/relationships" xmlns:p="http://schemas.openxmlformats.org/presentationml/2006/main">
   <p:cSld>
     <p:bg>
@@ -4560,7 +5321,7 @@
 </p:sld>
 </file>
 
-<file path=ppt/slides/slide24.xml><?xml version="1.0" encoding="utf-8"?>
+<file path=ppt/slides/slide32.xml><?xml version="1.0" encoding="utf-8"?>
 <p:sld xmlns:a="http://schemas.openxmlformats.org/drawingml/2006/main" xmlns:r="http://schemas.openxmlformats.org/officeDocument/2006/relationships" xmlns:p="http://schemas.openxmlformats.org/presentationml/2006/main">
   <p:cSld>
     <p:bg>
@@ -4634,7 +5395,7 @@
 </p:sld>
 </file>
 
-<file path=ppt/slides/slide25.xml><?xml version="1.0" encoding="utf-8"?>
+<file path=ppt/slides/slide33.xml><?xml version="1.0" encoding="utf-8"?>
 <p:sld xmlns:a="http://schemas.openxmlformats.org/drawingml/2006/main" xmlns:r="http://schemas.openxmlformats.org/officeDocument/2006/relationships" xmlns:p="http://schemas.openxmlformats.org/presentationml/2006/main">
   <p:cSld>
     <p:bg>
@@ -4708,7 +5469,7 @@
 </p:sld>
 </file>
 
-<file path=ppt/slides/slide26.xml><?xml version="1.0" encoding="utf-8"?>
+<file path=ppt/slides/slide34.xml><?xml version="1.0" encoding="utf-8"?>
 <p:sld xmlns:a="http://schemas.openxmlformats.org/drawingml/2006/main" xmlns:r="http://schemas.openxmlformats.org/officeDocument/2006/relationships" xmlns:p="http://schemas.openxmlformats.org/presentationml/2006/main">
   <p:cSld>
     <p:bg>
@@ -4782,7 +5543,7 @@
 </p:sld>
 </file>
 
-<file path=ppt/slides/slide27.xml><?xml version="1.0" encoding="utf-8"?>
+<file path=ppt/slides/slide35.xml><?xml version="1.0" encoding="utf-8"?>
 <p:sld xmlns:a="http://schemas.openxmlformats.org/drawingml/2006/main" xmlns:r="http://schemas.openxmlformats.org/officeDocument/2006/relationships" xmlns:p="http://schemas.openxmlformats.org/presentationml/2006/main">
   <p:cSld>
     <p:bg>
@@ -4856,7 +5617,7 @@
 </p:sld>
 </file>
 
-<file path=ppt/slides/slide28.xml><?xml version="1.0" encoding="utf-8"?>
+<file path=ppt/slides/slide36.xml><?xml version="1.0" encoding="utf-8"?>
 <p:sld xmlns:a="http://schemas.openxmlformats.org/drawingml/2006/main" xmlns:r="http://schemas.openxmlformats.org/officeDocument/2006/relationships" xmlns:p="http://schemas.openxmlformats.org/presentationml/2006/main">
   <p:cSld>
     <p:bg>
@@ -4930,7 +5691,7 @@
 </p:sld>
 </file>
 
-<file path=ppt/slides/slide29.xml><?xml version="1.0" encoding="utf-8"?>
+<file path=ppt/slides/slide37.xml><?xml version="1.0" encoding="utf-8"?>
 <p:sld xmlns:a="http://schemas.openxmlformats.org/drawingml/2006/main" xmlns:r="http://schemas.openxmlformats.org/officeDocument/2006/relationships" xmlns:p="http://schemas.openxmlformats.org/presentationml/2006/main">
   <p:cSld>
     <p:bg>
@@ -5004,183 +5765,7 @@
 </p:sld>
 </file>
 
-<file path=ppt/slides/slide3.xml><?xml version="1.0" encoding="utf-8"?>
-<p:sld xmlns:a="http://schemas.openxmlformats.org/drawingml/2006/main" xmlns:r="http://schemas.openxmlformats.org/officeDocument/2006/relationships" xmlns:p="http://schemas.openxmlformats.org/presentationml/2006/main">
-  <p:cSld>
-    <p:bg>
-      <p:bgPr>
-        <a:solidFill>
-          <a:srgbClr val="5C5C5C"/>
-        </a:solidFill>
-        <a:effectLst/>
-      </p:bgPr>
-    </p:bg>
-    <p:spTree>
-      <p:nvGrpSpPr>
-        <p:cNvPr id="1" name=""/>
-        <p:cNvGrpSpPr/>
-        <p:nvPr/>
-      </p:nvGrpSpPr>
-      <p:grpSpPr>
-        <a:xfrm>
-          <a:off x="0" y="0"/>
-          <a:ext cx="0" cy="0"/>
-          <a:chOff x="0" y="0"/>
-          <a:chExt cx="0" cy="0"/>
-        </a:xfrm>
-      </p:grpSpPr>
-      <p:sp>
-        <p:nvSpPr>
-          <p:cNvPr id="5" name="TextBox 4">
-            <a:extLst>
-              <a:ext uri="{FF2B5EF4-FFF2-40B4-BE49-F238E27FC236}">
-                <a16:creationId xmlns:a16="http://schemas.microsoft.com/office/drawing/2014/main" id="{5C3101FE-916F-7AC8-03CF-F8680EC21ADF}"/>
-              </a:ext>
-            </a:extLst>
-          </p:cNvPr>
-          <p:cNvSpPr txBox="1"/>
-          <p:nvPr/>
-        </p:nvSpPr>
-        <p:spPr>
-          <a:xfrm>
-            <a:off x="391886" y="130629"/>
-            <a:ext cx="11614067" cy="5232202"/>
-          </a:xfrm>
-          <a:prstGeom prst="rect">
-            <a:avLst/>
-          </a:prstGeom>
-          <a:noFill/>
-          <a:ln>
-            <a:noFill/>
-          </a:ln>
-        </p:spPr>
-        <p:txBody>
-          <a:bodyPr wrap="square" rtlCol="0">
-            <a:spAutoFit/>
-          </a:bodyPr>
-          <a:lstStyle/>
-          <a:p>
-            <a:pPr algn="ctr"/>
-            <a:r>
-              <a:rPr lang="en-CH" sz="2400" dirty="0">
-                <a:solidFill>
-                  <a:schemeClr val="bg1"/>
-                </a:solidFill>
-                <a:latin typeface="Arial" panose="020B0604020202020204" pitchFamily="34" charset="0"/>
-                <a:cs typeface="Arial" panose="020B0604020202020204" pitchFamily="34" charset="0"/>
-              </a:rPr>
-              <a:t>Welcome to the Egg task.</a:t>
-            </a:r>
-          </a:p>
-          <a:p>
-            <a:endParaRPr lang="en-CH" sz="2400" dirty="0">
-              <a:solidFill>
-                <a:schemeClr val="bg1"/>
-              </a:solidFill>
-              <a:latin typeface="Arial" panose="020B0604020202020204" pitchFamily="34" charset="0"/>
-              <a:cs typeface="Arial" panose="020B0604020202020204" pitchFamily="34" charset="0"/>
-            </a:endParaRPr>
-          </a:p>
-          <a:p>
-            <a:r>
-              <a:rPr lang="en-GB" sz="2200" dirty="0">
-                <a:solidFill>
-                  <a:schemeClr val="bg1"/>
-                </a:solidFill>
-                <a:latin typeface="Arial" panose="020B0604020202020204" pitchFamily="34" charset="0"/>
-                <a:cs typeface="Arial" panose="020B0604020202020204" pitchFamily="34" charset="0"/>
-              </a:rPr>
-              <a:t>Your goal in this task is to buy as many fresh eggs from the egg farmer for your store as possible. You want to get a good variety of eggs but some of them are more sensitive and get rotten more easily. For good eggs you receive money, when you buy bad eggs you loose money.</a:t>
-            </a:r>
-          </a:p>
-          <a:p>
-            <a:endParaRPr lang="en-GB" sz="2200" dirty="0">
-              <a:solidFill>
-                <a:schemeClr val="bg1"/>
-              </a:solidFill>
-              <a:latin typeface="Arial" panose="020B0604020202020204" pitchFamily="34" charset="0"/>
-              <a:cs typeface="Arial" panose="020B0604020202020204" pitchFamily="34" charset="0"/>
-            </a:endParaRPr>
-          </a:p>
-          <a:p>
-            <a:r>
-              <a:rPr lang="en-GB" sz="2200" dirty="0">
-                <a:solidFill>
-                  <a:schemeClr val="bg1"/>
-                </a:solidFill>
-                <a:latin typeface="Arial" panose="020B0604020202020204" pitchFamily="34" charset="0"/>
-                <a:cs typeface="Arial" panose="020B0604020202020204" pitchFamily="34" charset="0"/>
-              </a:rPr>
-              <a:t>Because there are different sorts of eggs, you have to learn which ones are more likely to be rotten and which ones are more likely to stay fresh. </a:t>
-            </a:r>
-          </a:p>
-          <a:p>
-            <a:endParaRPr lang="en-GB" sz="2200" dirty="0">
-              <a:solidFill>
-                <a:schemeClr val="bg1"/>
-              </a:solidFill>
-              <a:latin typeface="Arial" panose="020B0604020202020204" pitchFamily="34" charset="0"/>
-              <a:cs typeface="Arial" panose="020B0604020202020204" pitchFamily="34" charset="0"/>
-            </a:endParaRPr>
-          </a:p>
-          <a:p>
-            <a:r>
-              <a:rPr lang="en-GB" sz="2200" dirty="0">
-                <a:solidFill>
-                  <a:schemeClr val="bg1"/>
-                </a:solidFill>
-                <a:latin typeface="Arial" panose="020B0604020202020204" pitchFamily="34" charset="0"/>
-                <a:cs typeface="Arial" panose="020B0604020202020204" pitchFamily="34" charset="0"/>
-              </a:rPr>
-              <a:t>Please note that the eggs in this task look like the faces from the previous task but this is a profit task. Had to use the same images in this task for technical reasons.</a:t>
-            </a:r>
-          </a:p>
-          <a:p>
-            <a:endParaRPr lang="en-GB" sz="2200" dirty="0">
-              <a:solidFill>
-                <a:schemeClr val="bg1"/>
-              </a:solidFill>
-              <a:latin typeface="Arial" panose="020B0604020202020204" pitchFamily="34" charset="0"/>
-              <a:cs typeface="Arial" panose="020B0604020202020204" pitchFamily="34" charset="0"/>
-            </a:endParaRPr>
-          </a:p>
-          <a:p>
-            <a:r>
-              <a:rPr lang="en-GB" sz="2200" dirty="0">
-                <a:solidFill>
-                  <a:schemeClr val="bg1"/>
-                </a:solidFill>
-                <a:latin typeface="Arial" panose="020B0604020202020204" pitchFamily="34" charset="0"/>
-                <a:cs typeface="Arial" panose="020B0604020202020204" pitchFamily="34" charset="0"/>
-              </a:rPr>
-              <a:t>Try to make as much profit as possible.</a:t>
-            </a:r>
-          </a:p>
-          <a:p>
-            <a:endParaRPr lang="en-GB" sz="2200" dirty="0">
-              <a:solidFill>
-                <a:schemeClr val="bg1"/>
-              </a:solidFill>
-              <a:latin typeface="Arial" panose="020B0604020202020204" pitchFamily="34" charset="0"/>
-              <a:cs typeface="Arial" panose="020B0604020202020204" pitchFamily="34" charset="0"/>
-            </a:endParaRPr>
-          </a:p>
-        </p:txBody>
-      </p:sp>
-    </p:spTree>
-    <p:extLst>
-      <p:ext uri="{BB962C8B-B14F-4D97-AF65-F5344CB8AC3E}">
-        <p14:creationId xmlns:p14="http://schemas.microsoft.com/office/powerpoint/2010/main" val="2976116893"/>
-      </p:ext>
-    </p:extLst>
-  </p:cSld>
-  <p:clrMapOvr>
-    <a:masterClrMapping/>
-  </p:clrMapOvr>
-</p:sld>
-</file>
-
-<file path=ppt/slides/slide30.xml><?xml version="1.0" encoding="utf-8"?>
+<file path=ppt/slides/slide38.xml><?xml version="1.0" encoding="utf-8"?>
 <p:sld xmlns:a="http://schemas.openxmlformats.org/drawingml/2006/main" xmlns:r="http://schemas.openxmlformats.org/officeDocument/2006/relationships" xmlns:p="http://schemas.openxmlformats.org/presentationml/2006/main">
   <p:cSld>
     <p:bg>
@@ -5254,7 +5839,7 @@
 </p:sld>
 </file>
 
-<file path=ppt/slides/slide31.xml><?xml version="1.0" encoding="utf-8"?>
+<file path=ppt/slides/slide39.xml><?xml version="1.0" encoding="utf-8"?>
 <p:sld xmlns:a="http://schemas.openxmlformats.org/drawingml/2006/main" xmlns:r="http://schemas.openxmlformats.org/officeDocument/2006/relationships" xmlns:p="http://schemas.openxmlformats.org/presentationml/2006/main">
   <p:cSld>
     <p:bg>
@@ -5325,86 +5910,6 @@
     <p:extLst>
       <p:ext uri="{BB962C8B-B14F-4D97-AF65-F5344CB8AC3E}">
         <p14:creationId xmlns:p14="http://schemas.microsoft.com/office/powerpoint/2010/main" val="1062932709"/>
-      </p:ext>
-    </p:extLst>
-  </p:cSld>
-  <p:clrMapOvr>
-    <a:masterClrMapping/>
-  </p:clrMapOvr>
-</p:sld>
-</file>
-
-<file path=ppt/slides/slide32.xml><?xml version="1.0" encoding="utf-8"?>
-<p:sld xmlns:a="http://schemas.openxmlformats.org/drawingml/2006/main" xmlns:r="http://schemas.openxmlformats.org/officeDocument/2006/relationships" xmlns:p="http://schemas.openxmlformats.org/presentationml/2006/main">
-  <p:cSld>
-    <p:bg>
-      <p:bgPr>
-        <a:solidFill>
-          <a:srgbClr val="5C5C5C"/>
-        </a:solidFill>
-        <a:effectLst/>
-      </p:bgPr>
-    </p:bg>
-    <p:spTree>
-      <p:nvGrpSpPr>
-        <p:cNvPr id="1" name=""/>
-        <p:cNvGrpSpPr/>
-        <p:nvPr/>
-      </p:nvGrpSpPr>
-      <p:grpSpPr>
-        <a:xfrm>
-          <a:off x="0" y="0"/>
-          <a:ext cx="0" cy="0"/>
-          <a:chOff x="0" y="0"/>
-          <a:chExt cx="0" cy="0"/>
-        </a:xfrm>
-      </p:grpSpPr>
-      <p:sp>
-        <p:nvSpPr>
-          <p:cNvPr id="2" name="TextBox 1">
-            <a:extLst>
-              <a:ext uri="{FF2B5EF4-FFF2-40B4-BE49-F238E27FC236}">
-                <a16:creationId xmlns:a16="http://schemas.microsoft.com/office/drawing/2014/main" id="{A2F27E21-B004-68AF-2485-A4D06B57CE76}"/>
-              </a:ext>
-            </a:extLst>
-          </p:cNvPr>
-          <p:cNvSpPr txBox="1"/>
-          <p:nvPr/>
-        </p:nvSpPr>
-        <p:spPr>
-          <a:xfrm>
-            <a:off x="373853" y="3013501"/>
-            <a:ext cx="11444287" cy="830997"/>
-          </a:xfrm>
-          <a:prstGeom prst="rect">
-            <a:avLst/>
-          </a:prstGeom>
-          <a:noFill/>
-        </p:spPr>
-        <p:txBody>
-          <a:bodyPr wrap="square" rtlCol="0">
-            <a:spAutoFit/>
-          </a:bodyPr>
-          <a:lstStyle/>
-          <a:p>
-            <a:pPr algn="ctr"/>
-            <a:r>
-              <a:rPr lang="en-CH" sz="4800" dirty="0">
-                <a:solidFill>
-                  <a:schemeClr val="bg1"/>
-                </a:solidFill>
-                <a:latin typeface="Arial" panose="020B0604020202020204" pitchFamily="34" charset="0"/>
-                <a:cs typeface="Arial" panose="020B0604020202020204" pitchFamily="34" charset="0"/>
-              </a:rPr>
-              <a:t>- 1</a:t>
-            </a:r>
-          </a:p>
-        </p:txBody>
-      </p:sp>
-    </p:spTree>
-    <p:extLst>
-      <p:ext uri="{BB962C8B-B14F-4D97-AF65-F5344CB8AC3E}">
-        <p14:creationId xmlns:p14="http://schemas.microsoft.com/office/powerpoint/2010/main" val="386870888"/>
       </p:ext>
     </p:extLst>
   </p:cSld>
@@ -5599,6 +6104,86 @@
     <p:extLst>
       <p:ext uri="{BB962C8B-B14F-4D97-AF65-F5344CB8AC3E}">
         <p14:creationId xmlns:p14="http://schemas.microsoft.com/office/powerpoint/2010/main" val="2986080870"/>
+      </p:ext>
+    </p:extLst>
+  </p:cSld>
+  <p:clrMapOvr>
+    <a:masterClrMapping/>
+  </p:clrMapOvr>
+</p:sld>
+</file>
+
+<file path=ppt/slides/slide40.xml><?xml version="1.0" encoding="utf-8"?>
+<p:sld xmlns:a="http://schemas.openxmlformats.org/drawingml/2006/main" xmlns:r="http://schemas.openxmlformats.org/officeDocument/2006/relationships" xmlns:p="http://schemas.openxmlformats.org/presentationml/2006/main">
+  <p:cSld>
+    <p:bg>
+      <p:bgPr>
+        <a:solidFill>
+          <a:srgbClr val="5C5C5C"/>
+        </a:solidFill>
+        <a:effectLst/>
+      </p:bgPr>
+    </p:bg>
+    <p:spTree>
+      <p:nvGrpSpPr>
+        <p:cNvPr id="1" name=""/>
+        <p:cNvGrpSpPr/>
+        <p:nvPr/>
+      </p:nvGrpSpPr>
+      <p:grpSpPr>
+        <a:xfrm>
+          <a:off x="0" y="0"/>
+          <a:ext cx="0" cy="0"/>
+          <a:chOff x="0" y="0"/>
+          <a:chExt cx="0" cy="0"/>
+        </a:xfrm>
+      </p:grpSpPr>
+      <p:sp>
+        <p:nvSpPr>
+          <p:cNvPr id="2" name="TextBox 1">
+            <a:extLst>
+              <a:ext uri="{FF2B5EF4-FFF2-40B4-BE49-F238E27FC236}">
+                <a16:creationId xmlns:a16="http://schemas.microsoft.com/office/drawing/2014/main" id="{A2F27E21-B004-68AF-2485-A4D06B57CE76}"/>
+              </a:ext>
+            </a:extLst>
+          </p:cNvPr>
+          <p:cNvSpPr txBox="1"/>
+          <p:nvPr/>
+        </p:nvSpPr>
+        <p:spPr>
+          <a:xfrm>
+            <a:off x="373853" y="3013501"/>
+            <a:ext cx="11444287" cy="830997"/>
+          </a:xfrm>
+          <a:prstGeom prst="rect">
+            <a:avLst/>
+          </a:prstGeom>
+          <a:noFill/>
+        </p:spPr>
+        <p:txBody>
+          <a:bodyPr wrap="square" rtlCol="0">
+            <a:spAutoFit/>
+          </a:bodyPr>
+          <a:lstStyle/>
+          <a:p>
+            <a:pPr algn="ctr"/>
+            <a:r>
+              <a:rPr lang="en-CH" sz="4800" dirty="0">
+                <a:solidFill>
+                  <a:schemeClr val="bg1"/>
+                </a:solidFill>
+                <a:latin typeface="Arial" panose="020B0604020202020204" pitchFamily="34" charset="0"/>
+                <a:cs typeface="Arial" panose="020B0604020202020204" pitchFamily="34" charset="0"/>
+              </a:rPr>
+              <a:t>- 1</a:t>
+            </a:r>
+          </a:p>
+        </p:txBody>
+      </p:sp>
+    </p:spTree>
+    <p:extLst>
+      <p:ext uri="{BB962C8B-B14F-4D97-AF65-F5344CB8AC3E}">
+        <p14:creationId xmlns:p14="http://schemas.microsoft.com/office/powerpoint/2010/main" val="386870888"/>
       </p:ext>
     </p:extLst>
   </p:cSld>
@@ -5682,7 +6267,7 @@
     <p:bg>
       <p:bgPr>
         <a:solidFill>
-          <a:srgbClr val="5C5C5C"/>
+          <a:srgbClr val="646464"/>
         </a:solidFill>
         <a:effectLst/>
       </p:bgPr>
@@ -5824,14 +6409,20 @@
     <p:bg>
       <p:bgPr>
         <a:solidFill>
-          <a:srgbClr val="5C5C5C"/>
+          <a:srgbClr val="646464"/>
         </a:solidFill>
         <a:effectLst/>
       </p:bgPr>
     </p:bg>
     <p:spTree>
       <p:nvGrpSpPr>
-        <p:cNvPr id="1" name=""/>
+        <p:cNvPr id="1" name="">
+          <a:extLst>
+            <a:ext uri="{FF2B5EF4-FFF2-40B4-BE49-F238E27FC236}">
+              <a16:creationId xmlns:a16="http://schemas.microsoft.com/office/drawing/2014/main" id="{8E821182-6885-2416-A668-D4183C90ACD1}"/>
+            </a:ext>
+          </a:extLst>
+        </p:cNvPr>
         <p:cNvGrpSpPr/>
         <p:nvPr/>
       </p:nvGrpSpPr>
@@ -5845,10 +6436,10 @@
       </p:grpSpPr>
       <p:pic>
         <p:nvPicPr>
-          <p:cNvPr id="3" name="Picture 2">
-            <a:extLst>
-              <a:ext uri="{FF2B5EF4-FFF2-40B4-BE49-F238E27FC236}">
-                <a16:creationId xmlns:a16="http://schemas.microsoft.com/office/drawing/2014/main" id="{02C3729A-FF3F-F995-3345-DEEDC1FC84C1}"/>
+          <p:cNvPr id="4" name="Picture 3">
+            <a:extLst>
+              <a:ext uri="{FF2B5EF4-FFF2-40B4-BE49-F238E27FC236}">
+                <a16:creationId xmlns:a16="http://schemas.microsoft.com/office/drawing/2014/main" id="{8AB7B542-2D53-49EB-869E-3A95B8434C64}"/>
               </a:ext>
             </a:extLst>
           </p:cNvPr>
@@ -5865,8 +6456,8 @@
         </p:blipFill>
         <p:spPr>
           <a:xfrm>
-            <a:off x="3501517" y="1449000"/>
-            <a:ext cx="5188966" cy="3960000"/>
+            <a:off x="5016000" y="2349000"/>
+            <a:ext cx="2160000" cy="2160000"/>
           </a:xfrm>
           <a:prstGeom prst="rect">
             <a:avLst/>
@@ -5876,7 +6467,7 @@
     </p:spTree>
     <p:extLst>
       <p:ext uri="{BB962C8B-B14F-4D97-AF65-F5344CB8AC3E}">
-        <p14:creationId xmlns:p14="http://schemas.microsoft.com/office/powerpoint/2010/main" val="1313142258"/>
+        <p14:creationId xmlns:p14="http://schemas.microsoft.com/office/powerpoint/2010/main" val="1808002623"/>
       </p:ext>
     </p:extLst>
   </p:cSld>
@@ -5913,10 +6504,10 @@
       </p:grpSpPr>
       <p:pic>
         <p:nvPicPr>
-          <p:cNvPr id="4" name="Picture 3">
-            <a:extLst>
-              <a:ext uri="{FF2B5EF4-FFF2-40B4-BE49-F238E27FC236}">
-                <a16:creationId xmlns:a16="http://schemas.microsoft.com/office/drawing/2014/main" id="{BF22FE1A-67F2-9A08-251F-880432C4BF90}"/>
+          <p:cNvPr id="3" name="Picture 2">
+            <a:extLst>
+              <a:ext uri="{FF2B5EF4-FFF2-40B4-BE49-F238E27FC236}">
+                <a16:creationId xmlns:a16="http://schemas.microsoft.com/office/drawing/2014/main" id="{02C3729A-FF3F-F995-3345-DEEDC1FC84C1}"/>
               </a:ext>
             </a:extLst>
           </p:cNvPr>
@@ -5944,7 +6535,7 @@
     </p:spTree>
     <p:extLst>
       <p:ext uri="{BB962C8B-B14F-4D97-AF65-F5344CB8AC3E}">
-        <p14:creationId xmlns:p14="http://schemas.microsoft.com/office/powerpoint/2010/main" val="3262247840"/>
+        <p14:creationId xmlns:p14="http://schemas.microsoft.com/office/powerpoint/2010/main" val="1313142258"/>
       </p:ext>
     </p:extLst>
   </p:cSld>

</xml_diff>

<commit_message>
added and extracted stimuli with face-eggs
</commit_message>
<xml_diff>
--- a/control_task/stimuli/originals_SAPC_Task.pptx
+++ b/control_task/stimuli/originals_SAPC_Task.pptx
@@ -11,40 +11,41 @@
     <p:sldId id="3497" r:id="rId5"/>
     <p:sldId id="3519" r:id="rId6"/>
     <p:sldId id="3528" r:id="rId7"/>
-    <p:sldId id="3480" r:id="rId8"/>
-    <p:sldId id="3529" r:id="rId9"/>
-    <p:sldId id="3482" r:id="rId10"/>
-    <p:sldId id="3530" r:id="rId11"/>
-    <p:sldId id="3484" r:id="rId12"/>
-    <p:sldId id="3531" r:id="rId13"/>
-    <p:sldId id="3486" r:id="rId14"/>
-    <p:sldId id="3532" r:id="rId15"/>
-    <p:sldId id="3521" r:id="rId16"/>
-    <p:sldId id="3533" r:id="rId17"/>
-    <p:sldId id="3523" r:id="rId18"/>
-    <p:sldId id="3534" r:id="rId19"/>
-    <p:sldId id="3525" r:id="rId20"/>
-    <p:sldId id="3535" r:id="rId21"/>
-    <p:sldId id="3536" r:id="rId22"/>
-    <p:sldId id="3527" r:id="rId23"/>
-    <p:sldId id="283" r:id="rId24"/>
-    <p:sldId id="3503" r:id="rId25"/>
-    <p:sldId id="3504" r:id="rId26"/>
-    <p:sldId id="3505" r:id="rId27"/>
-    <p:sldId id="3506" r:id="rId28"/>
-    <p:sldId id="3507" r:id="rId29"/>
-    <p:sldId id="3508" r:id="rId30"/>
-    <p:sldId id="3509" r:id="rId31"/>
-    <p:sldId id="3513" r:id="rId32"/>
-    <p:sldId id="3510" r:id="rId33"/>
-    <p:sldId id="3512" r:id="rId34"/>
-    <p:sldId id="3517" r:id="rId35"/>
-    <p:sldId id="3514" r:id="rId36"/>
-    <p:sldId id="3515" r:id="rId37"/>
-    <p:sldId id="3516" r:id="rId38"/>
-    <p:sldId id="3518" r:id="rId39"/>
-    <p:sldId id="3476" r:id="rId40"/>
-    <p:sldId id="3477" r:id="rId41"/>
+    <p:sldId id="3551" r:id="rId8"/>
+    <p:sldId id="3543" r:id="rId9"/>
+    <p:sldId id="3480" r:id="rId10"/>
+    <p:sldId id="3529" r:id="rId11"/>
+    <p:sldId id="3550" r:id="rId12"/>
+    <p:sldId id="3537" r:id="rId13"/>
+    <p:sldId id="3482" r:id="rId14"/>
+    <p:sldId id="3530" r:id="rId15"/>
+    <p:sldId id="3549" r:id="rId16"/>
+    <p:sldId id="3542" r:id="rId17"/>
+    <p:sldId id="3484" r:id="rId18"/>
+    <p:sldId id="3531" r:id="rId19"/>
+    <p:sldId id="3548" r:id="rId20"/>
+    <p:sldId id="3541" r:id="rId21"/>
+    <p:sldId id="3486" r:id="rId22"/>
+    <p:sldId id="3532" r:id="rId23"/>
+    <p:sldId id="3547" r:id="rId24"/>
+    <p:sldId id="3540" r:id="rId25"/>
+    <p:sldId id="3521" r:id="rId26"/>
+    <p:sldId id="3539" r:id="rId27"/>
+    <p:sldId id="3546" r:id="rId28"/>
+    <p:sldId id="3533" r:id="rId29"/>
+    <p:sldId id="3523" r:id="rId30"/>
+    <p:sldId id="3538" r:id="rId31"/>
+    <p:sldId id="3545" r:id="rId32"/>
+    <p:sldId id="3534" r:id="rId33"/>
+    <p:sldId id="3525" r:id="rId34"/>
+    <p:sldId id="3536" r:id="rId35"/>
+    <p:sldId id="3544" r:id="rId36"/>
+    <p:sldId id="3535" r:id="rId37"/>
+    <p:sldId id="3552" r:id="rId38"/>
+    <p:sldId id="3553" r:id="rId39"/>
+    <p:sldId id="3527" r:id="rId40"/>
+    <p:sldId id="3476" r:id="rId41"/>
+    <p:sldId id="3477" r:id="rId42"/>
   </p:sldIdLst>
   <p:sldSz cx="12192000" cy="6858000"/>
   <p:notesSz cx="6858000" cy="9144000"/>
@@ -300,7 +301,7 @@
           <a:p>
             <a:fld id="{9B916260-F45C-B647-88A4-C91F6BA5DC4E}" type="datetimeFigureOut">
               <a:rPr lang="en-CH" smtClean="0"/>
-              <a:t>04.10.24</a:t>
+              <a:t>14.10.24</a:t>
             </a:fld>
             <a:endParaRPr lang="en-CH"/>
           </a:p>
@@ -500,7 +501,7 @@
           <a:p>
             <a:fld id="{9B916260-F45C-B647-88A4-C91F6BA5DC4E}" type="datetimeFigureOut">
               <a:rPr lang="en-CH" smtClean="0"/>
-              <a:t>04.10.24</a:t>
+              <a:t>14.10.24</a:t>
             </a:fld>
             <a:endParaRPr lang="en-CH"/>
           </a:p>
@@ -710,7 +711,7 @@
           <a:p>
             <a:fld id="{9B916260-F45C-B647-88A4-C91F6BA5DC4E}" type="datetimeFigureOut">
               <a:rPr lang="en-CH" smtClean="0"/>
-              <a:t>04.10.24</a:t>
+              <a:t>14.10.24</a:t>
             </a:fld>
             <a:endParaRPr lang="en-CH"/>
           </a:p>
@@ -910,7 +911,7 @@
           <a:p>
             <a:fld id="{9B916260-F45C-B647-88A4-C91F6BA5DC4E}" type="datetimeFigureOut">
               <a:rPr lang="en-CH" smtClean="0"/>
-              <a:t>04.10.24</a:t>
+              <a:t>14.10.24</a:t>
             </a:fld>
             <a:endParaRPr lang="en-CH"/>
           </a:p>
@@ -1186,7 +1187,7 @@
           <a:p>
             <a:fld id="{9B916260-F45C-B647-88A4-C91F6BA5DC4E}" type="datetimeFigureOut">
               <a:rPr lang="en-CH" smtClean="0"/>
-              <a:t>04.10.24</a:t>
+              <a:t>14.10.24</a:t>
             </a:fld>
             <a:endParaRPr lang="en-CH"/>
           </a:p>
@@ -1454,7 +1455,7 @@
           <a:p>
             <a:fld id="{9B916260-F45C-B647-88A4-C91F6BA5DC4E}" type="datetimeFigureOut">
               <a:rPr lang="en-CH" smtClean="0"/>
-              <a:t>04.10.24</a:t>
+              <a:t>14.10.24</a:t>
             </a:fld>
             <a:endParaRPr lang="en-CH"/>
           </a:p>
@@ -1869,7 +1870,7 @@
           <a:p>
             <a:fld id="{9B916260-F45C-B647-88A4-C91F6BA5DC4E}" type="datetimeFigureOut">
               <a:rPr lang="en-CH" smtClean="0"/>
-              <a:t>04.10.24</a:t>
+              <a:t>14.10.24</a:t>
             </a:fld>
             <a:endParaRPr lang="en-CH"/>
           </a:p>
@@ -2011,7 +2012,7 @@
           <a:p>
             <a:fld id="{9B916260-F45C-B647-88A4-C91F6BA5DC4E}" type="datetimeFigureOut">
               <a:rPr lang="en-CH" smtClean="0"/>
-              <a:t>04.10.24</a:t>
+              <a:t>14.10.24</a:t>
             </a:fld>
             <a:endParaRPr lang="en-CH"/>
           </a:p>
@@ -2124,7 +2125,7 @@
           <a:p>
             <a:fld id="{9B916260-F45C-B647-88A4-C91F6BA5DC4E}" type="datetimeFigureOut">
               <a:rPr lang="en-CH" smtClean="0"/>
-              <a:t>04.10.24</a:t>
+              <a:t>14.10.24</a:t>
             </a:fld>
             <a:endParaRPr lang="en-CH"/>
           </a:p>
@@ -2437,7 +2438,7 @@
           <a:p>
             <a:fld id="{9B916260-F45C-B647-88A4-C91F6BA5DC4E}" type="datetimeFigureOut">
               <a:rPr lang="en-CH" smtClean="0"/>
-              <a:t>04.10.24</a:t>
+              <a:t>14.10.24</a:t>
             </a:fld>
             <a:endParaRPr lang="en-CH"/>
           </a:p>
@@ -2726,7 +2727,7 @@
           <a:p>
             <a:fld id="{9B916260-F45C-B647-88A4-C91F6BA5DC4E}" type="datetimeFigureOut">
               <a:rPr lang="en-CH" smtClean="0"/>
-              <a:t>04.10.24</a:t>
+              <a:t>14.10.24</a:t>
             </a:fld>
             <a:endParaRPr lang="en-CH"/>
           </a:p>
@@ -2969,7 +2970,7 @@
           <a:p>
             <a:fld id="{9B916260-F45C-B647-88A4-C91F6BA5DC4E}" type="datetimeFigureOut">
               <a:rPr lang="en-CH" smtClean="0"/>
-              <a:t>04.10.24</a:t>
+              <a:t>14.10.24</a:t>
             </a:fld>
             <a:endParaRPr lang="en-CH"/>
           </a:p>
@@ -3487,7 +3488,7 @@
         <p:cNvPr id="1" name="">
           <a:extLst>
             <a:ext uri="{FF2B5EF4-FFF2-40B4-BE49-F238E27FC236}">
-              <a16:creationId xmlns:a16="http://schemas.microsoft.com/office/drawing/2014/main" id="{7E73C008-EA6C-219A-4A92-0E78211D8684}"/>
+              <a16:creationId xmlns:a16="http://schemas.microsoft.com/office/drawing/2014/main" id="{8E821182-6885-2416-A668-D4183C90ACD1}"/>
             </a:ext>
           </a:extLst>
         </p:cNvPr>
@@ -3504,10 +3505,10 @@
       </p:grpSpPr>
       <p:pic>
         <p:nvPicPr>
-          <p:cNvPr id="3" name="Picture 2">
-            <a:extLst>
-              <a:ext uri="{FF2B5EF4-FFF2-40B4-BE49-F238E27FC236}">
-                <a16:creationId xmlns:a16="http://schemas.microsoft.com/office/drawing/2014/main" id="{BFC71AF6-76E8-DCAA-2D2A-E060EBF5D907}"/>
+          <p:cNvPr id="8" name="Picture 7">
+            <a:extLst>
+              <a:ext uri="{FF2B5EF4-FFF2-40B4-BE49-F238E27FC236}">
+                <a16:creationId xmlns:a16="http://schemas.microsoft.com/office/drawing/2014/main" id="{CE12DB14-AE61-ACF4-2CA2-1D308FDDB5C6}"/>
               </a:ext>
             </a:extLst>
           </p:cNvPr>
@@ -3517,7 +3518,36 @@
           <p:nvPr/>
         </p:nvPicPr>
         <p:blipFill>
-          <a:blip r:embed="rId2"/>
+          <a:blip r:embed="rId2">
+            <a:extLst>
+              <a:ext uri="{BEBA8EAE-BF5A-486C-A8C5-ECC9F3942E4B}">
+                <a14:imgProps xmlns:a14="http://schemas.microsoft.com/office/drawing/2010/main">
+                  <a14:imgLayer r:embed="rId3">
+                    <a14:imgEffect>
+                      <a14:backgroundRemoval t="3233" b="98707" l="9914" r="89871">
+                        <a14:foregroundMark x1="41595" y1="8405" x2="41595" y2="8405"/>
+                        <a14:foregroundMark x1="50862" y1="3233" x2="50862" y2="3233"/>
+                        <a14:foregroundMark x1="35560" y1="26509" x2="39440" y2="30172"/>
+                        <a14:foregroundMark x1="24138" y1="32543" x2="33190" y2="33405"/>
+                        <a14:foregroundMark x1="33190" y1="33405" x2="40733" y2="36422"/>
+                        <a14:foregroundMark x1="40733" y1="36422" x2="42026" y2="37500"/>
+                        <a14:foregroundMark x1="61207" y1="25862" x2="72845" y2="30603"/>
+                        <a14:foregroundMark x1="72845" y1="30603" x2="80172" y2="36422"/>
+                        <a14:foregroundMark x1="60991" y1="38147" x2="60991" y2="38147"/>
+                        <a14:foregroundMark x1="62716" y1="35776" x2="62716" y2="35776"/>
+                        <a14:foregroundMark x1="65086" y1="75216" x2="65086" y2="75216"/>
+                        <a14:foregroundMark x1="53233" y1="76078" x2="53233" y2="76078"/>
+                        <a14:foregroundMark x1="51293" y1="80819" x2="51293" y2="80819"/>
+                        <a14:foregroundMark x1="49138" y1="97845" x2="49138" y2="97845"/>
+                        <a14:foregroundMark x1="57328" y1="98491" x2="57328" y2="98491"/>
+                        <a14:foregroundMark x1="59052" y1="98707" x2="59052" y2="98707"/>
+                      </a14:backgroundRemoval>
+                    </a14:imgEffect>
+                  </a14:imgLayer>
+                </a14:imgProps>
+              </a:ext>
+            </a:extLst>
+          </a:blip>
           <a:stretch>
             <a:fillRect/>
           </a:stretch>
@@ -3535,7 +3565,7 @@
     </p:spTree>
     <p:extLst>
       <p:ext uri="{BB962C8B-B14F-4D97-AF65-F5344CB8AC3E}">
-        <p14:creationId xmlns:p14="http://schemas.microsoft.com/office/powerpoint/2010/main" val="1937959015"/>
+        <p14:creationId xmlns:p14="http://schemas.microsoft.com/office/powerpoint/2010/main" val="1808002623"/>
       </p:ext>
     </p:extLst>
   </p:cSld>
@@ -3551,14 +3581,20 @@
     <p:bg>
       <p:bgPr>
         <a:solidFill>
-          <a:srgbClr val="5C5C5C"/>
+          <a:srgbClr val="646464"/>
         </a:solidFill>
         <a:effectLst/>
       </p:bgPr>
     </p:bg>
     <p:spTree>
       <p:nvGrpSpPr>
-        <p:cNvPr id="1" name=""/>
+        <p:cNvPr id="1" name="">
+          <a:extLst>
+            <a:ext uri="{FF2B5EF4-FFF2-40B4-BE49-F238E27FC236}">
+              <a16:creationId xmlns:a16="http://schemas.microsoft.com/office/drawing/2014/main" id="{7820790E-93AD-FE90-94F1-95139101BC74}"/>
+            </a:ext>
+          </a:extLst>
+        </p:cNvPr>
         <p:cNvGrpSpPr/>
         <p:nvPr/>
       </p:nvGrpSpPr>
@@ -3572,10 +3608,10 @@
       </p:grpSpPr>
       <p:pic>
         <p:nvPicPr>
-          <p:cNvPr id="4" name="Picture 3">
-            <a:extLst>
-              <a:ext uri="{FF2B5EF4-FFF2-40B4-BE49-F238E27FC236}">
-                <a16:creationId xmlns:a16="http://schemas.microsoft.com/office/drawing/2014/main" id="{BF22FE1A-67F2-9A08-251F-880432C4BF90}"/>
+          <p:cNvPr id="6" name="Picture 5">
+            <a:extLst>
+              <a:ext uri="{FF2B5EF4-FFF2-40B4-BE49-F238E27FC236}">
+                <a16:creationId xmlns:a16="http://schemas.microsoft.com/office/drawing/2014/main" id="{205BD9CD-EDCD-B9EB-EA91-2964B196B8CE}"/>
               </a:ext>
             </a:extLst>
           </p:cNvPr>
@@ -3585,15 +3621,38 @@
           <p:nvPr/>
         </p:nvPicPr>
         <p:blipFill>
-          <a:blip r:embed="rId2"/>
+          <a:blip r:embed="rId2">
+            <a:extLst>
+              <a:ext uri="{BEBA8EAE-BF5A-486C-A8C5-ECC9F3942E4B}">
+                <a14:imgProps xmlns:a14="http://schemas.microsoft.com/office/drawing/2010/main">
+                  <a14:imgLayer r:embed="rId3">
+                    <a14:imgEffect>
+                      <a14:backgroundRemoval t="2371" b="99353" l="9914" r="89871">
+                        <a14:foregroundMark x1="42457" y1="8621" x2="42457" y2="8621"/>
+                        <a14:foregroundMark x1="51724" y1="3664" x2="51724" y2="3664"/>
+                        <a14:foregroundMark x1="51293" y1="2371" x2="51293" y2="2371"/>
+                        <a14:foregroundMark x1="24784" y1="33621" x2="37716" y2="34914"/>
+                        <a14:foregroundMark x1="62284" y1="29741" x2="66379" y2="38147"/>
+                        <a14:foregroundMark x1="29741" y1="71552" x2="82543" y2="65086"/>
+                        <a14:foregroundMark x1="82543" y1="65086" x2="86207" y2="65517"/>
+                        <a14:foregroundMark x1="43319" y1="93750" x2="43319" y2="93750"/>
+                        <a14:foregroundMark x1="50862" y1="99353" x2="50862" y2="99353"/>
+                        <a14:foregroundMark x1="67241" y1="37284" x2="65948" y2="34052"/>
+                      </a14:backgroundRemoval>
+                    </a14:imgEffect>
+                  </a14:imgLayer>
+                </a14:imgProps>
+              </a:ext>
+            </a:extLst>
+          </a:blip>
           <a:stretch>
             <a:fillRect/>
           </a:stretch>
         </p:blipFill>
         <p:spPr>
           <a:xfrm>
-            <a:off x="3501517" y="1449000"/>
-            <a:ext cx="5188966" cy="3960000"/>
+            <a:off x="5016000" y="2349000"/>
+            <a:ext cx="2160000" cy="2160000"/>
           </a:xfrm>
           <a:prstGeom prst="rect">
             <a:avLst/>
@@ -3603,7 +3662,7 @@
     </p:spTree>
     <p:extLst>
       <p:ext uri="{BB962C8B-B14F-4D97-AF65-F5344CB8AC3E}">
-        <p14:creationId xmlns:p14="http://schemas.microsoft.com/office/powerpoint/2010/main" val="3262247840"/>
+        <p14:creationId xmlns:p14="http://schemas.microsoft.com/office/powerpoint/2010/main" val="4070380128"/>
       </p:ext>
     </p:extLst>
   </p:cSld>
@@ -3629,7 +3688,7 @@
         <p:cNvPr id="1" name="">
           <a:extLst>
             <a:ext uri="{FF2B5EF4-FFF2-40B4-BE49-F238E27FC236}">
-              <a16:creationId xmlns:a16="http://schemas.microsoft.com/office/drawing/2014/main" id="{D8D7E8FC-63CD-D038-66EE-469580598299}"/>
+              <a16:creationId xmlns:a16="http://schemas.microsoft.com/office/drawing/2014/main" id="{58A8B6D3-89A5-CD21-1B6E-17BBC44BFAE2}"/>
             </a:ext>
           </a:extLst>
         </p:cNvPr>
@@ -3646,10 +3705,10 @@
       </p:grpSpPr>
       <p:pic>
         <p:nvPicPr>
-          <p:cNvPr id="4" name="Picture 3">
-            <a:extLst>
-              <a:ext uri="{FF2B5EF4-FFF2-40B4-BE49-F238E27FC236}">
-                <a16:creationId xmlns:a16="http://schemas.microsoft.com/office/drawing/2014/main" id="{9F39331A-F7CF-58F5-D744-0DBAB092BE4E}"/>
+          <p:cNvPr id="3" name="Picture 2">
+            <a:extLst>
+              <a:ext uri="{FF2B5EF4-FFF2-40B4-BE49-F238E27FC236}">
+                <a16:creationId xmlns:a16="http://schemas.microsoft.com/office/drawing/2014/main" id="{6DDF6021-8188-CA6D-CEF3-D87BC4D07717}"/>
               </a:ext>
             </a:extLst>
           </p:cNvPr>
@@ -3677,7 +3736,7 @@
     </p:spTree>
     <p:extLst>
       <p:ext uri="{BB962C8B-B14F-4D97-AF65-F5344CB8AC3E}">
-        <p14:creationId xmlns:p14="http://schemas.microsoft.com/office/powerpoint/2010/main" val="3059369653"/>
+        <p14:creationId xmlns:p14="http://schemas.microsoft.com/office/powerpoint/2010/main" val="601063088"/>
       </p:ext>
     </p:extLst>
   </p:cSld>
@@ -3714,6 +3773,791 @@
       </p:grpSpPr>
       <p:pic>
         <p:nvPicPr>
+          <p:cNvPr id="3" name="Picture 2">
+            <a:extLst>
+              <a:ext uri="{FF2B5EF4-FFF2-40B4-BE49-F238E27FC236}">
+                <a16:creationId xmlns:a16="http://schemas.microsoft.com/office/drawing/2014/main" id="{02C3729A-FF3F-F995-3345-DEEDC1FC84C1}"/>
+              </a:ext>
+            </a:extLst>
+          </p:cNvPr>
+          <p:cNvPicPr>
+            <a:picLocks noChangeAspect="1"/>
+          </p:cNvPicPr>
+          <p:nvPr/>
+        </p:nvPicPr>
+        <p:blipFill>
+          <a:blip r:embed="rId2"/>
+          <a:stretch>
+            <a:fillRect/>
+          </a:stretch>
+        </p:blipFill>
+        <p:spPr>
+          <a:xfrm>
+            <a:off x="3501517" y="1449000"/>
+            <a:ext cx="5188966" cy="3960000"/>
+          </a:xfrm>
+          <a:prstGeom prst="rect">
+            <a:avLst/>
+          </a:prstGeom>
+        </p:spPr>
+      </p:pic>
+    </p:spTree>
+    <p:extLst>
+      <p:ext uri="{BB962C8B-B14F-4D97-AF65-F5344CB8AC3E}">
+        <p14:creationId xmlns:p14="http://schemas.microsoft.com/office/powerpoint/2010/main" val="1313142258"/>
+      </p:ext>
+    </p:extLst>
+  </p:cSld>
+  <p:clrMapOvr>
+    <a:masterClrMapping/>
+  </p:clrMapOvr>
+</p:sld>
+</file>
+
+<file path=ppt/slides/slide14.xml><?xml version="1.0" encoding="utf-8"?>
+<p:sld xmlns:a="http://schemas.openxmlformats.org/drawingml/2006/main" xmlns:r="http://schemas.openxmlformats.org/officeDocument/2006/relationships" xmlns:p="http://schemas.openxmlformats.org/presentationml/2006/main">
+  <p:cSld>
+    <p:bg>
+      <p:bgPr>
+        <a:solidFill>
+          <a:srgbClr val="646464"/>
+        </a:solidFill>
+        <a:effectLst/>
+      </p:bgPr>
+    </p:bg>
+    <p:spTree>
+      <p:nvGrpSpPr>
+        <p:cNvPr id="1" name="">
+          <a:extLst>
+            <a:ext uri="{FF2B5EF4-FFF2-40B4-BE49-F238E27FC236}">
+              <a16:creationId xmlns:a16="http://schemas.microsoft.com/office/drawing/2014/main" id="{7E73C008-EA6C-219A-4A92-0E78211D8684}"/>
+            </a:ext>
+          </a:extLst>
+        </p:cNvPr>
+        <p:cNvGrpSpPr/>
+        <p:nvPr/>
+      </p:nvGrpSpPr>
+      <p:grpSpPr>
+        <a:xfrm>
+          <a:off x="0" y="0"/>
+          <a:ext cx="0" cy="0"/>
+          <a:chOff x="0" y="0"/>
+          <a:chExt cx="0" cy="0"/>
+        </a:xfrm>
+      </p:grpSpPr>
+      <p:pic>
+        <p:nvPicPr>
+          <p:cNvPr id="8" name="Picture 7">
+            <a:extLst>
+              <a:ext uri="{FF2B5EF4-FFF2-40B4-BE49-F238E27FC236}">
+                <a16:creationId xmlns:a16="http://schemas.microsoft.com/office/drawing/2014/main" id="{44384C7C-92DF-AD79-80AA-33265FBC0FE0}"/>
+              </a:ext>
+            </a:extLst>
+          </p:cNvPr>
+          <p:cNvPicPr>
+            <a:picLocks noChangeAspect="1"/>
+          </p:cNvPicPr>
+          <p:nvPr/>
+        </p:nvPicPr>
+        <p:blipFill>
+          <a:blip r:embed="rId2">
+            <a:extLst>
+              <a:ext uri="{BEBA8EAE-BF5A-486C-A8C5-ECC9F3942E4B}">
+                <a14:imgProps xmlns:a14="http://schemas.microsoft.com/office/drawing/2010/main">
+                  <a14:imgLayer r:embed="rId3">
+                    <a14:imgEffect>
+                      <a14:backgroundRemoval t="1509" b="98276" l="9914" r="89871">
+                        <a14:foregroundMark x1="48491" y1="6250" x2="48491" y2="6250"/>
+                        <a14:foregroundMark x1="51078" y1="1509" x2="51078" y2="1509"/>
+                        <a14:foregroundMark x1="62069" y1="3879" x2="62069" y2="3879"/>
+                        <a14:foregroundMark x1="69181" y1="7759" x2="69181" y2="7759"/>
+                        <a14:foregroundMark x1="62500" y1="3879" x2="62500" y2="3879"/>
+                        <a14:foregroundMark x1="69612" y1="7759" x2="69612" y2="7759"/>
+                        <a14:foregroundMark x1="76940" y1="18103" x2="76940" y2="18103"/>
+                        <a14:foregroundMark x1="80819" y1="25862" x2="80819" y2="25862"/>
+                        <a14:foregroundMark x1="69397" y1="33621" x2="69397" y2="33621"/>
+                        <a14:foregroundMark x1="66379" y1="34267" x2="66379" y2="34267"/>
+                        <a14:foregroundMark x1="64440" y1="42672" x2="71336" y2="33836"/>
+                        <a14:foregroundMark x1="71336" y1="33836" x2="72629" y2="29310"/>
+                        <a14:foregroundMark x1="66164" y1="29957" x2="67026" y2="38362"/>
+                        <a14:foregroundMark x1="67026" y1="38362" x2="67026" y2="38578"/>
+                        <a14:foregroundMark x1="29526" y1="27586" x2="36853" y2="29310"/>
+                        <a14:foregroundMark x1="26940" y1="34267" x2="39224" y2="34914"/>
+                        <a14:foregroundMark x1="46767" y1="76509" x2="66164" y2="76293"/>
+                        <a14:foregroundMark x1="66164" y1="76293" x2="71552" y2="73491"/>
+                        <a14:foregroundMark x1="47845" y1="93103" x2="47845" y2="93103"/>
+                        <a14:foregroundMark x1="50216" y1="98276" x2="50216" y2="98276"/>
+                        <a14:foregroundMark x1="16164" y1="69397" x2="16164" y2="69397"/>
+                        <a14:foregroundMark x1="17241" y1="69828" x2="17241" y2="69828"/>
+                        <a14:foregroundMark x1="15302" y1="66379" x2="15302" y2="66379"/>
+                        <a14:foregroundMark x1="18750" y1="75862" x2="18750" y2="75862"/>
+                        <a14:foregroundMark x1="19397" y1="78448" x2="19397" y2="78448"/>
+                        <a14:foregroundMark x1="20690" y1="80603" x2="20690" y2="80603"/>
+                        <a14:foregroundMark x1="12931" y1="60560" x2="12931" y2="60560"/>
+                        <a14:foregroundMark x1="12931" y1="53017" x2="14655" y2="64009"/>
+                      </a14:backgroundRemoval>
+                    </a14:imgEffect>
+                  </a14:imgLayer>
+                </a14:imgProps>
+              </a:ext>
+            </a:extLst>
+          </a:blip>
+          <a:stretch>
+            <a:fillRect/>
+          </a:stretch>
+        </p:blipFill>
+        <p:spPr>
+          <a:xfrm>
+            <a:off x="5016000" y="2349000"/>
+            <a:ext cx="2160000" cy="2160000"/>
+          </a:xfrm>
+          <a:prstGeom prst="rect">
+            <a:avLst/>
+          </a:prstGeom>
+        </p:spPr>
+      </p:pic>
+    </p:spTree>
+    <p:extLst>
+      <p:ext uri="{BB962C8B-B14F-4D97-AF65-F5344CB8AC3E}">
+        <p14:creationId xmlns:p14="http://schemas.microsoft.com/office/powerpoint/2010/main" val="1937959015"/>
+      </p:ext>
+    </p:extLst>
+  </p:cSld>
+  <p:clrMapOvr>
+    <a:masterClrMapping/>
+  </p:clrMapOvr>
+</p:sld>
+</file>
+
+<file path=ppt/slides/slide15.xml><?xml version="1.0" encoding="utf-8"?>
+<p:sld xmlns:a="http://schemas.openxmlformats.org/drawingml/2006/main" xmlns:r="http://schemas.openxmlformats.org/officeDocument/2006/relationships" xmlns:p="http://schemas.openxmlformats.org/presentationml/2006/main">
+  <p:cSld>
+    <p:bg>
+      <p:bgPr>
+        <a:solidFill>
+          <a:srgbClr val="646464"/>
+        </a:solidFill>
+        <a:effectLst/>
+      </p:bgPr>
+    </p:bg>
+    <p:spTree>
+      <p:nvGrpSpPr>
+        <p:cNvPr id="1" name="">
+          <a:extLst>
+            <a:ext uri="{FF2B5EF4-FFF2-40B4-BE49-F238E27FC236}">
+              <a16:creationId xmlns:a16="http://schemas.microsoft.com/office/drawing/2014/main" id="{82D059D0-4D17-2530-DD1E-51E42936DA14}"/>
+            </a:ext>
+          </a:extLst>
+        </p:cNvPr>
+        <p:cNvGrpSpPr/>
+        <p:nvPr/>
+      </p:nvGrpSpPr>
+      <p:grpSpPr>
+        <a:xfrm>
+          <a:off x="0" y="0"/>
+          <a:ext cx="0" cy="0"/>
+          <a:chOff x="0" y="0"/>
+          <a:chExt cx="0" cy="0"/>
+        </a:xfrm>
+      </p:grpSpPr>
+      <p:pic>
+        <p:nvPicPr>
+          <p:cNvPr id="6" name="Picture 5">
+            <a:extLst>
+              <a:ext uri="{FF2B5EF4-FFF2-40B4-BE49-F238E27FC236}">
+                <a16:creationId xmlns:a16="http://schemas.microsoft.com/office/drawing/2014/main" id="{09641553-E848-E44C-F656-F0B287566D62}"/>
+              </a:ext>
+            </a:extLst>
+          </p:cNvPr>
+          <p:cNvPicPr>
+            <a:picLocks noChangeAspect="1"/>
+          </p:cNvPicPr>
+          <p:nvPr/>
+        </p:nvPicPr>
+        <p:blipFill>
+          <a:blip r:embed="rId2">
+            <a:extLst>
+              <a:ext uri="{BEBA8EAE-BF5A-486C-A8C5-ECC9F3942E4B}">
+                <a14:imgProps xmlns:a14="http://schemas.microsoft.com/office/drawing/2010/main">
+                  <a14:imgLayer r:embed="rId3">
+                    <a14:imgEffect>
+                      <a14:backgroundRemoval t="1940" b="98060" l="9914" r="89871">
+                        <a14:foregroundMark x1="45905" y1="5388" x2="45905" y2="5388"/>
+                        <a14:foregroundMark x1="52586" y1="1940" x2="52586" y2="1940"/>
+                        <a14:foregroundMark x1="34698" y1="26293" x2="31034" y2="38793"/>
+                        <a14:foregroundMark x1="27155" y1="32543" x2="29526" y2="35776"/>
+                        <a14:foregroundMark x1="61422" y1="25000" x2="71983" y2="36638"/>
+                        <a14:foregroundMark x1="62500" y1="32112" x2="62500" y2="32112"/>
+                        <a14:foregroundMark x1="71767" y1="64009" x2="71767" y2="64009"/>
+                        <a14:foregroundMark x1="13578" y1="43534" x2="15086" y2="61207"/>
+                        <a14:foregroundMark x1="15086" y1="61207" x2="19828" y2="77586"/>
+                        <a14:foregroundMark x1="12931" y1="54526" x2="18319" y2="75000"/>
+                        <a14:foregroundMark x1="42026" y1="93750" x2="42026" y2="93750"/>
+                        <a14:foregroundMark x1="51724" y1="98060" x2="51724" y2="98060"/>
+                        <a14:foregroundMark x1="76293" y1="82974" x2="80819" y2="74138"/>
+                        <a14:foregroundMark x1="86638" y1="50216" x2="86638" y2="59914"/>
+                        <a14:foregroundMark x1="80172" y1="78664" x2="80172" y2="78664"/>
+                        <a14:foregroundMark x1="80819" y1="76509" x2="80819" y2="76509"/>
+                        <a14:foregroundMark x1="81466" y1="76078" x2="81466" y2="76078"/>
+                        <a14:foregroundMark x1="78879" y1="81250" x2="78879" y2="81250"/>
+                        <a14:foregroundMark x1="78233" y1="81897" x2="78233" y2="81897"/>
+                        <a14:foregroundMark x1="74353" y1="85991" x2="83190" y2="70690"/>
+                        <a14:foregroundMark x1="81034" y1="78017" x2="82759" y2="73922"/>
+                        <a14:foregroundMark x1="86638" y1="48707" x2="86638" y2="65302"/>
+                        <a14:foregroundMark x1="86638" y1="65302" x2="83405" y2="73707"/>
+                        <a14:foregroundMark x1="84698" y1="52802" x2="84698" y2="52802"/>
+                        <a14:foregroundMark x1="86638" y1="64224" x2="87500" y2="50216"/>
+                        <a14:foregroundMark x1="82759" y1="48491" x2="82759" y2="48491"/>
+                        <a14:foregroundMark x1="86853" y1="51293" x2="86638" y2="43966"/>
+                        <a14:foregroundMark x1="85991" y1="41379" x2="87500" y2="48491"/>
+                        <a14:foregroundMark x1="87716" y1="49784" x2="87716" y2="49784"/>
+                        <a14:foregroundMark x1="87716" y1="46767" x2="86853" y2="38147"/>
+                        <a14:foregroundMark x1="81681" y1="38793" x2="81681" y2="38793"/>
+                      </a14:backgroundRemoval>
+                    </a14:imgEffect>
+                  </a14:imgLayer>
+                </a14:imgProps>
+              </a:ext>
+            </a:extLst>
+          </a:blip>
+          <a:stretch>
+            <a:fillRect/>
+          </a:stretch>
+        </p:blipFill>
+        <p:spPr>
+          <a:xfrm>
+            <a:off x="5016000" y="2349000"/>
+            <a:ext cx="2160000" cy="2160000"/>
+          </a:xfrm>
+          <a:prstGeom prst="rect">
+            <a:avLst/>
+          </a:prstGeom>
+        </p:spPr>
+      </p:pic>
+    </p:spTree>
+    <p:extLst>
+      <p:ext uri="{BB962C8B-B14F-4D97-AF65-F5344CB8AC3E}">
+        <p14:creationId xmlns:p14="http://schemas.microsoft.com/office/powerpoint/2010/main" val="2894037551"/>
+      </p:ext>
+    </p:extLst>
+  </p:cSld>
+  <p:clrMapOvr>
+    <a:masterClrMapping/>
+  </p:clrMapOvr>
+</p:sld>
+</file>
+
+<file path=ppt/slides/slide16.xml><?xml version="1.0" encoding="utf-8"?>
+<p:sld xmlns:a="http://schemas.openxmlformats.org/drawingml/2006/main" xmlns:r="http://schemas.openxmlformats.org/officeDocument/2006/relationships" xmlns:p="http://schemas.openxmlformats.org/presentationml/2006/main">
+  <p:cSld>
+    <p:bg>
+      <p:bgPr>
+        <a:solidFill>
+          <a:srgbClr val="646464"/>
+        </a:solidFill>
+        <a:effectLst/>
+      </p:bgPr>
+    </p:bg>
+    <p:spTree>
+      <p:nvGrpSpPr>
+        <p:cNvPr id="1" name="">
+          <a:extLst>
+            <a:ext uri="{FF2B5EF4-FFF2-40B4-BE49-F238E27FC236}">
+              <a16:creationId xmlns:a16="http://schemas.microsoft.com/office/drawing/2014/main" id="{70F74DA3-902E-8F45-EEBF-02D89452D9E6}"/>
+            </a:ext>
+          </a:extLst>
+        </p:cNvPr>
+        <p:cNvGrpSpPr/>
+        <p:nvPr/>
+      </p:nvGrpSpPr>
+      <p:grpSpPr>
+        <a:xfrm>
+          <a:off x="0" y="0"/>
+          <a:ext cx="0" cy="0"/>
+          <a:chOff x="0" y="0"/>
+          <a:chExt cx="0" cy="0"/>
+        </a:xfrm>
+      </p:grpSpPr>
+      <p:pic>
+        <p:nvPicPr>
+          <p:cNvPr id="4" name="Picture 3">
+            <a:extLst>
+              <a:ext uri="{FF2B5EF4-FFF2-40B4-BE49-F238E27FC236}">
+                <a16:creationId xmlns:a16="http://schemas.microsoft.com/office/drawing/2014/main" id="{72107E18-88AE-3EA0-674B-1203352DC734}"/>
+              </a:ext>
+            </a:extLst>
+          </p:cNvPr>
+          <p:cNvPicPr>
+            <a:picLocks noChangeAspect="1"/>
+          </p:cNvPicPr>
+          <p:nvPr/>
+        </p:nvPicPr>
+        <p:blipFill>
+          <a:blip r:embed="rId2"/>
+          <a:stretch>
+            <a:fillRect/>
+          </a:stretch>
+        </p:blipFill>
+        <p:spPr>
+          <a:xfrm>
+            <a:off x="5016000" y="2349000"/>
+            <a:ext cx="2160000" cy="2160000"/>
+          </a:xfrm>
+          <a:prstGeom prst="rect">
+            <a:avLst/>
+          </a:prstGeom>
+        </p:spPr>
+      </p:pic>
+    </p:spTree>
+    <p:extLst>
+      <p:ext uri="{BB962C8B-B14F-4D97-AF65-F5344CB8AC3E}">
+        <p14:creationId xmlns:p14="http://schemas.microsoft.com/office/powerpoint/2010/main" val="4143447299"/>
+      </p:ext>
+    </p:extLst>
+  </p:cSld>
+  <p:clrMapOvr>
+    <a:masterClrMapping/>
+  </p:clrMapOvr>
+</p:sld>
+</file>
+
+<file path=ppt/slides/slide17.xml><?xml version="1.0" encoding="utf-8"?>
+<p:sld xmlns:a="http://schemas.openxmlformats.org/drawingml/2006/main" xmlns:r="http://schemas.openxmlformats.org/officeDocument/2006/relationships" xmlns:p="http://schemas.openxmlformats.org/presentationml/2006/main">
+  <p:cSld>
+    <p:bg>
+      <p:bgPr>
+        <a:solidFill>
+          <a:srgbClr val="5C5C5C"/>
+        </a:solidFill>
+        <a:effectLst/>
+      </p:bgPr>
+    </p:bg>
+    <p:spTree>
+      <p:nvGrpSpPr>
+        <p:cNvPr id="1" name=""/>
+        <p:cNvGrpSpPr/>
+        <p:nvPr/>
+      </p:nvGrpSpPr>
+      <p:grpSpPr>
+        <a:xfrm>
+          <a:off x="0" y="0"/>
+          <a:ext cx="0" cy="0"/>
+          <a:chOff x="0" y="0"/>
+          <a:chExt cx="0" cy="0"/>
+        </a:xfrm>
+      </p:grpSpPr>
+      <p:pic>
+        <p:nvPicPr>
+          <p:cNvPr id="4" name="Picture 3">
+            <a:extLst>
+              <a:ext uri="{FF2B5EF4-FFF2-40B4-BE49-F238E27FC236}">
+                <a16:creationId xmlns:a16="http://schemas.microsoft.com/office/drawing/2014/main" id="{BF22FE1A-67F2-9A08-251F-880432C4BF90}"/>
+              </a:ext>
+            </a:extLst>
+          </p:cNvPr>
+          <p:cNvPicPr>
+            <a:picLocks noChangeAspect="1"/>
+          </p:cNvPicPr>
+          <p:nvPr/>
+        </p:nvPicPr>
+        <p:blipFill>
+          <a:blip r:embed="rId2"/>
+          <a:stretch>
+            <a:fillRect/>
+          </a:stretch>
+        </p:blipFill>
+        <p:spPr>
+          <a:xfrm>
+            <a:off x="3501517" y="1449000"/>
+            <a:ext cx="5188966" cy="3960000"/>
+          </a:xfrm>
+          <a:prstGeom prst="rect">
+            <a:avLst/>
+          </a:prstGeom>
+        </p:spPr>
+      </p:pic>
+    </p:spTree>
+    <p:extLst>
+      <p:ext uri="{BB962C8B-B14F-4D97-AF65-F5344CB8AC3E}">
+        <p14:creationId xmlns:p14="http://schemas.microsoft.com/office/powerpoint/2010/main" val="3262247840"/>
+      </p:ext>
+    </p:extLst>
+  </p:cSld>
+  <p:clrMapOvr>
+    <a:masterClrMapping/>
+  </p:clrMapOvr>
+</p:sld>
+</file>
+
+<file path=ppt/slides/slide18.xml><?xml version="1.0" encoding="utf-8"?>
+<p:sld xmlns:a="http://schemas.openxmlformats.org/drawingml/2006/main" xmlns:r="http://schemas.openxmlformats.org/officeDocument/2006/relationships" xmlns:p="http://schemas.openxmlformats.org/presentationml/2006/main">
+  <p:cSld>
+    <p:bg>
+      <p:bgPr>
+        <a:solidFill>
+          <a:srgbClr val="646464"/>
+        </a:solidFill>
+        <a:effectLst/>
+      </p:bgPr>
+    </p:bg>
+    <p:spTree>
+      <p:nvGrpSpPr>
+        <p:cNvPr id="1" name="">
+          <a:extLst>
+            <a:ext uri="{FF2B5EF4-FFF2-40B4-BE49-F238E27FC236}">
+              <a16:creationId xmlns:a16="http://schemas.microsoft.com/office/drawing/2014/main" id="{D8D7E8FC-63CD-D038-66EE-469580598299}"/>
+            </a:ext>
+          </a:extLst>
+        </p:cNvPr>
+        <p:cNvGrpSpPr/>
+        <p:nvPr/>
+      </p:nvGrpSpPr>
+      <p:grpSpPr>
+        <a:xfrm>
+          <a:off x="0" y="0"/>
+          <a:ext cx="0" cy="0"/>
+          <a:chOff x="0" y="0"/>
+          <a:chExt cx="0" cy="0"/>
+        </a:xfrm>
+      </p:grpSpPr>
+      <p:pic>
+        <p:nvPicPr>
+          <p:cNvPr id="8" name="Picture 7">
+            <a:extLst>
+              <a:ext uri="{FF2B5EF4-FFF2-40B4-BE49-F238E27FC236}">
+                <a16:creationId xmlns:a16="http://schemas.microsoft.com/office/drawing/2014/main" id="{801C20EF-972D-1CEE-8627-F99AF950B113}"/>
+              </a:ext>
+            </a:extLst>
+          </p:cNvPr>
+          <p:cNvPicPr>
+            <a:picLocks noChangeAspect="1"/>
+          </p:cNvPicPr>
+          <p:nvPr/>
+        </p:nvPicPr>
+        <p:blipFill>
+          <a:blip r:embed="rId2">
+            <a:extLst>
+              <a:ext uri="{BEBA8EAE-BF5A-486C-A8C5-ECC9F3942E4B}">
+                <a14:imgProps xmlns:a14="http://schemas.microsoft.com/office/drawing/2010/main">
+                  <a14:imgLayer r:embed="rId3">
+                    <a14:imgEffect>
+                      <a14:backgroundRemoval t="1940" b="97414" l="9914" r="89871">
+                        <a14:foregroundMark x1="49138" y1="7328" x2="49138" y2="7328"/>
+                        <a14:foregroundMark x1="51293" y1="1940" x2="51293" y2="1940"/>
+                        <a14:foregroundMark x1="33621" y1="35560" x2="33621" y2="35560"/>
+                        <a14:foregroundMark x1="67888" y1="34483" x2="67888" y2="34483"/>
+                        <a14:foregroundMark x1="13578" y1="38578" x2="13578" y2="38578"/>
+                        <a14:foregroundMark x1="12284" y1="44612" x2="12284" y2="44612"/>
+                        <a14:foregroundMark x1="59267" y1="76078" x2="59267" y2="76078"/>
+                        <a14:foregroundMark x1="50216" y1="80172" x2="50216" y2="80172"/>
+                        <a14:foregroundMark x1="49569" y1="92457" x2="49569" y2="92457"/>
+                        <a14:foregroundMark x1="49353" y1="97414" x2="49353" y2="97414"/>
+                        <a14:foregroundMark x1="69828" y1="90517" x2="69828" y2="90517"/>
+                        <a14:foregroundMark x1="71121" y1="90948" x2="71121" y2="90948"/>
+                        <a14:foregroundMark x1="70474" y1="91810" x2="70474" y2="91810"/>
+                        <a14:foregroundMark x1="69181" y1="92457" x2="69181" y2="92457"/>
+                      </a14:backgroundRemoval>
+                    </a14:imgEffect>
+                  </a14:imgLayer>
+                </a14:imgProps>
+              </a:ext>
+            </a:extLst>
+          </a:blip>
+          <a:stretch>
+            <a:fillRect/>
+          </a:stretch>
+        </p:blipFill>
+        <p:spPr>
+          <a:xfrm>
+            <a:off x="5016000" y="2349000"/>
+            <a:ext cx="2160000" cy="2160000"/>
+          </a:xfrm>
+          <a:prstGeom prst="rect">
+            <a:avLst/>
+          </a:prstGeom>
+        </p:spPr>
+      </p:pic>
+    </p:spTree>
+    <p:extLst>
+      <p:ext uri="{BB962C8B-B14F-4D97-AF65-F5344CB8AC3E}">
+        <p14:creationId xmlns:p14="http://schemas.microsoft.com/office/powerpoint/2010/main" val="3059369653"/>
+      </p:ext>
+    </p:extLst>
+  </p:cSld>
+  <p:clrMapOvr>
+    <a:masterClrMapping/>
+  </p:clrMapOvr>
+</p:sld>
+</file>
+
+<file path=ppt/slides/slide19.xml><?xml version="1.0" encoding="utf-8"?>
+<p:sld xmlns:a="http://schemas.openxmlformats.org/drawingml/2006/main" xmlns:r="http://schemas.openxmlformats.org/officeDocument/2006/relationships" xmlns:p="http://schemas.openxmlformats.org/presentationml/2006/main">
+  <p:cSld>
+    <p:bg>
+      <p:bgPr>
+        <a:solidFill>
+          <a:srgbClr val="646464"/>
+        </a:solidFill>
+        <a:effectLst/>
+      </p:bgPr>
+    </p:bg>
+    <p:spTree>
+      <p:nvGrpSpPr>
+        <p:cNvPr id="1" name="">
+          <a:extLst>
+            <a:ext uri="{FF2B5EF4-FFF2-40B4-BE49-F238E27FC236}">
+              <a16:creationId xmlns:a16="http://schemas.microsoft.com/office/drawing/2014/main" id="{D3D61EF2-15B2-5F37-7159-D4FEE4FE909A}"/>
+            </a:ext>
+          </a:extLst>
+        </p:cNvPr>
+        <p:cNvGrpSpPr/>
+        <p:nvPr/>
+      </p:nvGrpSpPr>
+      <p:grpSpPr>
+        <a:xfrm>
+          <a:off x="0" y="0"/>
+          <a:ext cx="0" cy="0"/>
+          <a:chOff x="0" y="0"/>
+          <a:chExt cx="0" cy="0"/>
+        </a:xfrm>
+      </p:grpSpPr>
+      <p:pic>
+        <p:nvPicPr>
+          <p:cNvPr id="6" name="Picture 5">
+            <a:extLst>
+              <a:ext uri="{FF2B5EF4-FFF2-40B4-BE49-F238E27FC236}">
+                <a16:creationId xmlns:a16="http://schemas.microsoft.com/office/drawing/2014/main" id="{F5575DBC-72A8-0A9C-3540-E8ED8DE5FE2F}"/>
+              </a:ext>
+            </a:extLst>
+          </p:cNvPr>
+          <p:cNvPicPr>
+            <a:picLocks noChangeAspect="1"/>
+          </p:cNvPicPr>
+          <p:nvPr/>
+        </p:nvPicPr>
+        <p:blipFill>
+          <a:blip r:embed="rId2">
+            <a:extLst>
+              <a:ext uri="{BEBA8EAE-BF5A-486C-A8C5-ECC9F3942E4B}">
+                <a14:imgProps xmlns:a14="http://schemas.microsoft.com/office/drawing/2010/main">
+                  <a14:imgLayer r:embed="rId3">
+                    <a14:imgEffect>
+                      <a14:backgroundRemoval t="2802" b="99353" l="9914" r="89871">
+                        <a14:foregroundMark x1="43750" y1="7328" x2="43750" y2="7328"/>
+                        <a14:foregroundMark x1="52155" y1="2802" x2="52155" y2="2802"/>
+                        <a14:foregroundMark x1="26724" y1="12069" x2="26724" y2="12069"/>
+                        <a14:foregroundMark x1="22629" y1="17888" x2="30603" y2="9914"/>
+                        <a14:foregroundMark x1="28448" y1="29310" x2="76940" y2="36853"/>
+                        <a14:foregroundMark x1="60560" y1="23060" x2="61853" y2="36422"/>
+                        <a14:foregroundMark x1="15086" y1="65086" x2="37931" y2="63147"/>
+                        <a14:foregroundMark x1="37931" y1="63147" x2="38147" y2="63147"/>
+                        <a14:foregroundMark x1="33190" y1="71552" x2="53879" y2="84052"/>
+                        <a14:foregroundMark x1="68103" y1="68534" x2="68103" y2="68534"/>
+                        <a14:foregroundMark x1="79957" y1="74784" x2="79957" y2="74784"/>
+                        <a14:foregroundMark x1="58836" y1="93319" x2="58836" y2="93319"/>
+                        <a14:foregroundMark x1="49138" y1="99353" x2="49138" y2="99353"/>
+                      </a14:backgroundRemoval>
+                    </a14:imgEffect>
+                  </a14:imgLayer>
+                </a14:imgProps>
+              </a:ext>
+            </a:extLst>
+          </a:blip>
+          <a:stretch>
+            <a:fillRect/>
+          </a:stretch>
+        </p:blipFill>
+        <p:spPr>
+          <a:xfrm>
+            <a:off x="5016000" y="2349000"/>
+            <a:ext cx="2160000" cy="2160000"/>
+          </a:xfrm>
+          <a:prstGeom prst="rect">
+            <a:avLst/>
+          </a:prstGeom>
+        </p:spPr>
+      </p:pic>
+    </p:spTree>
+    <p:extLst>
+      <p:ext uri="{BB962C8B-B14F-4D97-AF65-F5344CB8AC3E}">
+        <p14:creationId xmlns:p14="http://schemas.microsoft.com/office/powerpoint/2010/main" val="2797749492"/>
+      </p:ext>
+    </p:extLst>
+  </p:cSld>
+  <p:clrMapOvr>
+    <a:masterClrMapping/>
+  </p:clrMapOvr>
+</p:sld>
+</file>
+
+<file path=ppt/slides/slide2.xml><?xml version="1.0" encoding="utf-8"?>
+<p:sld xmlns:a="http://schemas.openxmlformats.org/drawingml/2006/main" xmlns:r="http://schemas.openxmlformats.org/officeDocument/2006/relationships" xmlns:p="http://schemas.openxmlformats.org/presentationml/2006/main">
+  <p:cSld>
+    <p:spTree>
+      <p:nvGrpSpPr>
+        <p:cNvPr id="1" name=""/>
+        <p:cNvGrpSpPr/>
+        <p:nvPr/>
+      </p:nvGrpSpPr>
+      <p:grpSpPr>
+        <a:xfrm>
+          <a:off x="0" y="0"/>
+          <a:ext cx="0" cy="0"/>
+          <a:chOff x="0" y="0"/>
+          <a:chExt cx="0" cy="0"/>
+        </a:xfrm>
+      </p:grpSpPr>
+      <p:sp>
+        <p:nvSpPr>
+          <p:cNvPr id="2" name="Title 1">
+            <a:extLst>
+              <a:ext uri="{FF2B5EF4-FFF2-40B4-BE49-F238E27FC236}">
+                <a16:creationId xmlns:a16="http://schemas.microsoft.com/office/drawing/2014/main" id="{0A1FA53E-25A0-0960-0FCC-4CC105416AC1}"/>
+              </a:ext>
+            </a:extLst>
+          </p:cNvPr>
+          <p:cNvSpPr>
+            <a:spLocks noGrp="1"/>
+          </p:cNvSpPr>
+          <p:nvPr>
+            <p:ph type="title"/>
+          </p:nvPr>
+        </p:nvSpPr>
+        <p:spPr>
+          <a:xfrm>
+            <a:off x="410688" y="365125"/>
+            <a:ext cx="10943112" cy="584901"/>
+          </a:xfrm>
+        </p:spPr>
+        <p:txBody>
+          <a:bodyPr>
+            <a:normAutofit/>
+          </a:bodyPr>
+          <a:lstStyle/>
+          <a:p>
+            <a:r>
+              <a:rPr lang="en-CH" sz="2800" b="1" dirty="0">
+                <a:latin typeface="Avenir Book" panose="02000503020000020003" pitchFamily="2" charset="0"/>
+              </a:rPr>
+              <a:t>Practice Task Slides (12 trials)</a:t>
+            </a:r>
+          </a:p>
+        </p:txBody>
+      </p:sp>
+    </p:spTree>
+    <p:extLst>
+      <p:ext uri="{BB962C8B-B14F-4D97-AF65-F5344CB8AC3E}">
+        <p14:creationId xmlns:p14="http://schemas.microsoft.com/office/powerpoint/2010/main" val="2739542140"/>
+      </p:ext>
+    </p:extLst>
+  </p:cSld>
+  <p:clrMapOvr>
+    <a:masterClrMapping/>
+  </p:clrMapOvr>
+</p:sld>
+</file>
+
+<file path=ppt/slides/slide20.xml><?xml version="1.0" encoding="utf-8"?>
+<p:sld xmlns:a="http://schemas.openxmlformats.org/drawingml/2006/main" xmlns:r="http://schemas.openxmlformats.org/officeDocument/2006/relationships" xmlns:p="http://schemas.openxmlformats.org/presentationml/2006/main">
+  <p:cSld>
+    <p:bg>
+      <p:bgPr>
+        <a:solidFill>
+          <a:srgbClr val="646464"/>
+        </a:solidFill>
+        <a:effectLst/>
+      </p:bgPr>
+    </p:bg>
+    <p:spTree>
+      <p:nvGrpSpPr>
+        <p:cNvPr id="1" name="">
+          <a:extLst>
+            <a:ext uri="{FF2B5EF4-FFF2-40B4-BE49-F238E27FC236}">
+              <a16:creationId xmlns:a16="http://schemas.microsoft.com/office/drawing/2014/main" id="{B6AADA2E-9EEF-897C-B947-DCE41F3287C9}"/>
+            </a:ext>
+          </a:extLst>
+        </p:cNvPr>
+        <p:cNvGrpSpPr/>
+        <p:nvPr/>
+      </p:nvGrpSpPr>
+      <p:grpSpPr>
+        <a:xfrm>
+          <a:off x="0" y="0"/>
+          <a:ext cx="0" cy="0"/>
+          <a:chOff x="0" y="0"/>
+          <a:chExt cx="0" cy="0"/>
+        </a:xfrm>
+      </p:grpSpPr>
+      <p:pic>
+        <p:nvPicPr>
+          <p:cNvPr id="3" name="Picture 2">
+            <a:extLst>
+              <a:ext uri="{FF2B5EF4-FFF2-40B4-BE49-F238E27FC236}">
+                <a16:creationId xmlns:a16="http://schemas.microsoft.com/office/drawing/2014/main" id="{3ED541FF-F030-2092-3ECD-32A6FFA1ADB2}"/>
+              </a:ext>
+            </a:extLst>
+          </p:cNvPr>
+          <p:cNvPicPr>
+            <a:picLocks noChangeAspect="1"/>
+          </p:cNvPicPr>
+          <p:nvPr/>
+        </p:nvPicPr>
+        <p:blipFill>
+          <a:blip r:embed="rId2"/>
+          <a:stretch>
+            <a:fillRect/>
+          </a:stretch>
+        </p:blipFill>
+        <p:spPr>
+          <a:xfrm>
+            <a:off x="5016000" y="2349000"/>
+            <a:ext cx="2160000" cy="2160000"/>
+          </a:xfrm>
+          <a:prstGeom prst="rect">
+            <a:avLst/>
+          </a:prstGeom>
+        </p:spPr>
+      </p:pic>
+    </p:spTree>
+    <p:extLst>
+      <p:ext uri="{BB962C8B-B14F-4D97-AF65-F5344CB8AC3E}">
+        <p14:creationId xmlns:p14="http://schemas.microsoft.com/office/powerpoint/2010/main" val="1758665041"/>
+      </p:ext>
+    </p:extLst>
+  </p:cSld>
+  <p:clrMapOvr>
+    <a:masterClrMapping/>
+  </p:clrMapOvr>
+</p:sld>
+</file>
+
+<file path=ppt/slides/slide21.xml><?xml version="1.0" encoding="utf-8"?>
+<p:sld xmlns:a="http://schemas.openxmlformats.org/drawingml/2006/main" xmlns:r="http://schemas.openxmlformats.org/officeDocument/2006/relationships" xmlns:p="http://schemas.openxmlformats.org/presentationml/2006/main">
+  <p:cSld>
+    <p:bg>
+      <p:bgPr>
+        <a:solidFill>
+          <a:srgbClr val="5C5C5C"/>
+        </a:solidFill>
+        <a:effectLst/>
+      </p:bgPr>
+    </p:bg>
+    <p:spTree>
+      <p:nvGrpSpPr>
+        <p:cNvPr id="1" name=""/>
+        <p:cNvGrpSpPr/>
+        <p:nvPr/>
+      </p:nvGrpSpPr>
+      <p:grpSpPr>
+        <a:xfrm>
+          <a:off x="0" y="0"/>
+          <a:ext cx="0" cy="0"/>
+          <a:chOff x="0" y="0"/>
+          <a:chExt cx="0" cy="0"/>
+        </a:xfrm>
+      </p:grpSpPr>
+      <p:pic>
+        <p:nvPicPr>
           <p:cNvPr id="6" name="Picture 5">
             <a:extLst>
               <a:ext uri="{FF2B5EF4-FFF2-40B4-BE49-F238E27FC236}">
@@ -3755,7 +4599,7 @@
 </p:sld>
 </file>
 
-<file path=ppt/slides/slide14.xml><?xml version="1.0" encoding="utf-8"?>
+<file path=ppt/slides/slide22.xml><?xml version="1.0" encoding="utf-8"?>
 <p:sld xmlns:a="http://schemas.openxmlformats.org/drawingml/2006/main" xmlns:r="http://schemas.openxmlformats.org/officeDocument/2006/relationships" xmlns:p="http://schemas.openxmlformats.org/presentationml/2006/main">
   <p:cSld>
     <p:bg>
@@ -3788,10 +4632,10 @@
       </p:grpSpPr>
       <p:pic>
         <p:nvPicPr>
-          <p:cNvPr id="3" name="Picture 2">
-            <a:extLst>
-              <a:ext uri="{FF2B5EF4-FFF2-40B4-BE49-F238E27FC236}">
-                <a16:creationId xmlns:a16="http://schemas.microsoft.com/office/drawing/2014/main" id="{895CD17B-CCDF-EACC-9373-5C0B9CA6EEB6}"/>
+          <p:cNvPr id="8" name="Picture 7">
+            <a:extLst>
+              <a:ext uri="{FF2B5EF4-FFF2-40B4-BE49-F238E27FC236}">
+                <a16:creationId xmlns:a16="http://schemas.microsoft.com/office/drawing/2014/main" id="{027D456D-4D64-29AE-5429-088F0430D437}"/>
               </a:ext>
             </a:extLst>
           </p:cNvPr>
@@ -3801,7 +4645,38 @@
           <p:nvPr/>
         </p:nvPicPr>
         <p:blipFill>
-          <a:blip r:embed="rId2"/>
+          <a:blip r:embed="rId2">
+            <a:extLst>
+              <a:ext uri="{BEBA8EAE-BF5A-486C-A8C5-ECC9F3942E4B}">
+                <a14:imgProps xmlns:a14="http://schemas.microsoft.com/office/drawing/2010/main">
+                  <a14:imgLayer r:embed="rId3">
+                    <a14:imgEffect>
+                      <a14:backgroundRemoval t="1509" b="99353" l="9914" r="89871">
+                        <a14:foregroundMark x1="43966" y1="8405" x2="43966" y2="8405"/>
+                        <a14:foregroundMark x1="51724" y1="1724" x2="51724" y2="1724"/>
+                        <a14:foregroundMark x1="31681" y1="30388" x2="39655" y2="32759"/>
+                        <a14:foregroundMark x1="39655" y1="32759" x2="45043" y2="36207"/>
+                        <a14:foregroundMark x1="60560" y1="29310" x2="69181" y2="31897"/>
+                        <a14:foregroundMark x1="69181" y1="31897" x2="74138" y2="36422"/>
+                        <a14:foregroundMark x1="48276" y1="61638" x2="48276" y2="61638"/>
+                        <a14:foregroundMark x1="51724" y1="75647" x2="51724" y2="75647"/>
+                        <a14:foregroundMark x1="62716" y1="76293" x2="62716" y2="76293"/>
+                        <a14:foregroundMark x1="53879" y1="92888" x2="53879" y2="92888"/>
+                        <a14:foregroundMark x1="51078" y1="97845" x2="51078" y2="97845"/>
+                        <a14:foregroundMark x1="46336" y1="98922" x2="46336" y2="98922"/>
+                        <a14:foregroundMark x1="49353" y1="99138" x2="49353" y2="99138"/>
+                        <a14:foregroundMark x1="57112" y1="99353" x2="57112" y2="99353"/>
+                        <a14:foregroundMark x1="60776" y1="98060" x2="60776" y2="98060"/>
+                        <a14:foregroundMark x1="58621" y1="98922" x2="58621" y2="98922"/>
+                        <a14:foregroundMark x1="40517" y1="98491" x2="40517" y2="98491"/>
+                        <a14:foregroundMark x1="41810" y1="98922" x2="41810" y2="98922"/>
+                      </a14:backgroundRemoval>
+                    </a14:imgEffect>
+                  </a14:imgLayer>
+                </a14:imgProps>
+              </a:ext>
+            </a:extLst>
+          </a:blip>
           <a:stretch>
             <a:fillRect/>
           </a:stretch>
@@ -3829,7 +4704,179 @@
 </p:sld>
 </file>
 
-<file path=ppt/slides/slide15.xml><?xml version="1.0" encoding="utf-8"?>
+<file path=ppt/slides/slide23.xml><?xml version="1.0" encoding="utf-8"?>
+<p:sld xmlns:a="http://schemas.openxmlformats.org/drawingml/2006/main" xmlns:r="http://schemas.openxmlformats.org/officeDocument/2006/relationships" xmlns:p="http://schemas.openxmlformats.org/presentationml/2006/main">
+  <p:cSld>
+    <p:bg>
+      <p:bgPr>
+        <a:solidFill>
+          <a:srgbClr val="646464"/>
+        </a:solidFill>
+        <a:effectLst/>
+      </p:bgPr>
+    </p:bg>
+    <p:spTree>
+      <p:nvGrpSpPr>
+        <p:cNvPr id="1" name="">
+          <a:extLst>
+            <a:ext uri="{FF2B5EF4-FFF2-40B4-BE49-F238E27FC236}">
+              <a16:creationId xmlns:a16="http://schemas.microsoft.com/office/drawing/2014/main" id="{520E3838-349C-1D8D-B34E-BD536F36F908}"/>
+            </a:ext>
+          </a:extLst>
+        </p:cNvPr>
+        <p:cNvGrpSpPr/>
+        <p:nvPr/>
+      </p:nvGrpSpPr>
+      <p:grpSpPr>
+        <a:xfrm>
+          <a:off x="0" y="0"/>
+          <a:ext cx="0" cy="0"/>
+          <a:chOff x="0" y="0"/>
+          <a:chExt cx="0" cy="0"/>
+        </a:xfrm>
+      </p:grpSpPr>
+      <p:pic>
+        <p:nvPicPr>
+          <p:cNvPr id="6" name="Picture 5">
+            <a:extLst>
+              <a:ext uri="{FF2B5EF4-FFF2-40B4-BE49-F238E27FC236}">
+                <a16:creationId xmlns:a16="http://schemas.microsoft.com/office/drawing/2014/main" id="{910BBA57-B3C7-0541-8726-47EB8C689CED}"/>
+              </a:ext>
+            </a:extLst>
+          </p:cNvPr>
+          <p:cNvPicPr>
+            <a:picLocks noChangeAspect="1"/>
+          </p:cNvPicPr>
+          <p:nvPr/>
+        </p:nvPicPr>
+        <p:blipFill>
+          <a:blip r:embed="rId2">
+            <a:extLst>
+              <a:ext uri="{BEBA8EAE-BF5A-486C-A8C5-ECC9F3942E4B}">
+                <a14:imgProps xmlns:a14="http://schemas.microsoft.com/office/drawing/2010/main">
+                  <a14:imgLayer r:embed="rId3">
+                    <a14:imgEffect>
+                      <a14:backgroundRemoval t="2371" b="99569" l="9914" r="89871">
+                        <a14:foregroundMark x1="29741" y1="27155" x2="57328" y2="6034"/>
+                        <a14:foregroundMark x1="46552" y1="2371" x2="46552" y2="2371"/>
+                        <a14:foregroundMark x1="27802" y1="30819" x2="34914" y2="42026"/>
+                        <a14:foregroundMark x1="35345" y1="29957" x2="34483" y2="36853"/>
+                        <a14:foregroundMark x1="58836" y1="33405" x2="78233" y2="35129"/>
+                        <a14:foregroundMark x1="63362" y1="31250" x2="71552" y2="32328"/>
+                        <a14:foregroundMark x1="71552" y1="32328" x2="71767" y2="32543"/>
+                        <a14:foregroundMark x1="42457" y1="94397" x2="42457" y2="94397"/>
+                        <a14:foregroundMark x1="48491" y1="98922" x2="48491" y2="98922"/>
+                        <a14:foregroundMark x1="37931" y1="96552" x2="37931" y2="96552"/>
+                        <a14:foregroundMark x1="34698" y1="95690" x2="45474" y2="99569"/>
+                      </a14:backgroundRemoval>
+                    </a14:imgEffect>
+                  </a14:imgLayer>
+                </a14:imgProps>
+              </a:ext>
+            </a:extLst>
+          </a:blip>
+          <a:stretch>
+            <a:fillRect/>
+          </a:stretch>
+        </p:blipFill>
+        <p:spPr>
+          <a:xfrm>
+            <a:off x="5016000" y="2349000"/>
+            <a:ext cx="2160000" cy="2160000"/>
+          </a:xfrm>
+          <a:prstGeom prst="rect">
+            <a:avLst/>
+          </a:prstGeom>
+        </p:spPr>
+      </p:pic>
+    </p:spTree>
+    <p:extLst>
+      <p:ext uri="{BB962C8B-B14F-4D97-AF65-F5344CB8AC3E}">
+        <p14:creationId xmlns:p14="http://schemas.microsoft.com/office/powerpoint/2010/main" val="3672932589"/>
+      </p:ext>
+    </p:extLst>
+  </p:cSld>
+  <p:clrMapOvr>
+    <a:masterClrMapping/>
+  </p:clrMapOvr>
+</p:sld>
+</file>
+
+<file path=ppt/slides/slide24.xml><?xml version="1.0" encoding="utf-8"?>
+<p:sld xmlns:a="http://schemas.openxmlformats.org/drawingml/2006/main" xmlns:r="http://schemas.openxmlformats.org/officeDocument/2006/relationships" xmlns:p="http://schemas.openxmlformats.org/presentationml/2006/main">
+  <p:cSld>
+    <p:bg>
+      <p:bgPr>
+        <a:solidFill>
+          <a:srgbClr val="646464"/>
+        </a:solidFill>
+        <a:effectLst/>
+      </p:bgPr>
+    </p:bg>
+    <p:spTree>
+      <p:nvGrpSpPr>
+        <p:cNvPr id="1" name="">
+          <a:extLst>
+            <a:ext uri="{FF2B5EF4-FFF2-40B4-BE49-F238E27FC236}">
+              <a16:creationId xmlns:a16="http://schemas.microsoft.com/office/drawing/2014/main" id="{DD0BDFBD-7EBF-454E-203D-B62A5928688D}"/>
+            </a:ext>
+          </a:extLst>
+        </p:cNvPr>
+        <p:cNvGrpSpPr/>
+        <p:nvPr/>
+      </p:nvGrpSpPr>
+      <p:grpSpPr>
+        <a:xfrm>
+          <a:off x="0" y="0"/>
+          <a:ext cx="0" cy="0"/>
+          <a:chOff x="0" y="0"/>
+          <a:chExt cx="0" cy="0"/>
+        </a:xfrm>
+      </p:grpSpPr>
+      <p:pic>
+        <p:nvPicPr>
+          <p:cNvPr id="4" name="Picture 3">
+            <a:extLst>
+              <a:ext uri="{FF2B5EF4-FFF2-40B4-BE49-F238E27FC236}">
+                <a16:creationId xmlns:a16="http://schemas.microsoft.com/office/drawing/2014/main" id="{869CC159-8960-3D56-4AB7-6F2DECF9BF82}"/>
+              </a:ext>
+            </a:extLst>
+          </p:cNvPr>
+          <p:cNvPicPr>
+            <a:picLocks noChangeAspect="1"/>
+          </p:cNvPicPr>
+          <p:nvPr/>
+        </p:nvPicPr>
+        <p:blipFill>
+          <a:blip r:embed="rId2"/>
+          <a:stretch>
+            <a:fillRect/>
+          </a:stretch>
+        </p:blipFill>
+        <p:spPr>
+          <a:xfrm>
+            <a:off x="5016000" y="2349000"/>
+            <a:ext cx="2160000" cy="2160000"/>
+          </a:xfrm>
+          <a:prstGeom prst="rect">
+            <a:avLst/>
+          </a:prstGeom>
+        </p:spPr>
+      </p:pic>
+    </p:spTree>
+    <p:extLst>
+      <p:ext uri="{BB962C8B-B14F-4D97-AF65-F5344CB8AC3E}">
+        <p14:creationId xmlns:p14="http://schemas.microsoft.com/office/powerpoint/2010/main" val="739740974"/>
+      </p:ext>
+    </p:extLst>
+  </p:cSld>
+  <p:clrMapOvr>
+    <a:masterClrMapping/>
+  </p:clrMapOvr>
+</p:sld>
+</file>
+
+<file path=ppt/slides/slide25.xml><?xml version="1.0" encoding="utf-8"?>
 <p:sld xmlns:a="http://schemas.openxmlformats.org/drawingml/2006/main" xmlns:r="http://schemas.openxmlformats.org/officeDocument/2006/relationships" xmlns:p="http://schemas.openxmlformats.org/presentationml/2006/main">
   <p:cSld>
     <p:bg>
@@ -3903,7 +4950,201 @@
 </p:sld>
 </file>
 
-<file path=ppt/slides/slide16.xml><?xml version="1.0" encoding="utf-8"?>
+<file path=ppt/slides/slide26.xml><?xml version="1.0" encoding="utf-8"?>
+<p:sld xmlns:a="http://schemas.openxmlformats.org/drawingml/2006/main" xmlns:r="http://schemas.openxmlformats.org/officeDocument/2006/relationships" xmlns:p="http://schemas.openxmlformats.org/presentationml/2006/main">
+  <p:cSld>
+    <p:bg>
+      <p:bgPr>
+        <a:solidFill>
+          <a:srgbClr val="646464"/>
+        </a:solidFill>
+        <a:effectLst/>
+      </p:bgPr>
+    </p:bg>
+    <p:spTree>
+      <p:nvGrpSpPr>
+        <p:cNvPr id="1" name="">
+          <a:extLst>
+            <a:ext uri="{FF2B5EF4-FFF2-40B4-BE49-F238E27FC236}">
+              <a16:creationId xmlns:a16="http://schemas.microsoft.com/office/drawing/2014/main" id="{3288ABD6-DBED-91FC-7FFD-D0A39C572FC6}"/>
+            </a:ext>
+          </a:extLst>
+        </p:cNvPr>
+        <p:cNvGrpSpPr/>
+        <p:nvPr/>
+      </p:nvGrpSpPr>
+      <p:grpSpPr>
+        <a:xfrm>
+          <a:off x="0" y="0"/>
+          <a:ext cx="0" cy="0"/>
+          <a:chOff x="0" y="0"/>
+          <a:chExt cx="0" cy="0"/>
+        </a:xfrm>
+      </p:grpSpPr>
+      <p:pic>
+        <p:nvPicPr>
+          <p:cNvPr id="6" name="Picture 5">
+            <a:extLst>
+              <a:ext uri="{FF2B5EF4-FFF2-40B4-BE49-F238E27FC236}">
+                <a16:creationId xmlns:a16="http://schemas.microsoft.com/office/drawing/2014/main" id="{E34070E5-F48F-D39E-E1C0-CA9E197CD7F5}"/>
+              </a:ext>
+            </a:extLst>
+          </p:cNvPr>
+          <p:cNvPicPr>
+            <a:picLocks noChangeAspect="1"/>
+          </p:cNvPicPr>
+          <p:nvPr/>
+        </p:nvPicPr>
+        <p:blipFill>
+          <a:blip r:embed="rId2">
+            <a:extLst>
+              <a:ext uri="{BEBA8EAE-BF5A-486C-A8C5-ECC9F3942E4B}">
+                <a14:imgProps xmlns:a14="http://schemas.microsoft.com/office/drawing/2010/main">
+                  <a14:imgLayer r:embed="rId3">
+                    <a14:imgEffect>
+                      <a14:backgroundRemoval t="2371" b="98922" l="9914" r="89871">
+                        <a14:foregroundMark x1="42026" y1="6681" x2="42026" y2="6681"/>
+                        <a14:foregroundMark x1="50862" y1="2586" x2="50862" y2="2586"/>
+                        <a14:foregroundMark x1="36422" y1="28448" x2="36422" y2="28448"/>
+                        <a14:foregroundMark x1="25000" y1="32974" x2="40517" y2="33405"/>
+                        <a14:foregroundMark x1="40517" y1="33405" x2="46767" y2="35560"/>
+                        <a14:foregroundMark x1="62716" y1="27155" x2="76078" y2="25216"/>
+                        <a14:foregroundMark x1="68966" y1="34052" x2="68966" y2="34052"/>
+                        <a14:foregroundMark x1="60776" y1="35991" x2="60776" y2="35991"/>
+                        <a14:foregroundMark x1="49569" y1="93966" x2="49569" y2="93966"/>
+                        <a14:foregroundMark x1="50216" y1="98922" x2="50216" y2="98922"/>
+                        <a14:foregroundMark x1="14871" y1="64655" x2="17888" y2="71336"/>
+                      </a14:backgroundRemoval>
+                    </a14:imgEffect>
+                  </a14:imgLayer>
+                </a14:imgProps>
+              </a:ext>
+            </a:extLst>
+          </a:blip>
+          <a:stretch>
+            <a:fillRect/>
+          </a:stretch>
+        </p:blipFill>
+        <p:spPr>
+          <a:xfrm>
+            <a:off x="5016000" y="2349000"/>
+            <a:ext cx="2160000" cy="2160000"/>
+          </a:xfrm>
+          <a:prstGeom prst="rect">
+            <a:avLst/>
+          </a:prstGeom>
+        </p:spPr>
+      </p:pic>
+    </p:spTree>
+    <p:extLst>
+      <p:ext uri="{BB962C8B-B14F-4D97-AF65-F5344CB8AC3E}">
+        <p14:creationId xmlns:p14="http://schemas.microsoft.com/office/powerpoint/2010/main" val="1816580976"/>
+      </p:ext>
+    </p:extLst>
+  </p:cSld>
+  <p:clrMapOvr>
+    <a:masterClrMapping/>
+  </p:clrMapOvr>
+</p:sld>
+</file>
+
+<file path=ppt/slides/slide27.xml><?xml version="1.0" encoding="utf-8"?>
+<p:sld xmlns:a="http://schemas.openxmlformats.org/drawingml/2006/main" xmlns:r="http://schemas.openxmlformats.org/officeDocument/2006/relationships" xmlns:p="http://schemas.openxmlformats.org/presentationml/2006/main">
+  <p:cSld>
+    <p:bg>
+      <p:bgPr>
+        <a:solidFill>
+          <a:srgbClr val="646464"/>
+        </a:solidFill>
+        <a:effectLst/>
+      </p:bgPr>
+    </p:bg>
+    <p:spTree>
+      <p:nvGrpSpPr>
+        <p:cNvPr id="1" name="">
+          <a:extLst>
+            <a:ext uri="{FF2B5EF4-FFF2-40B4-BE49-F238E27FC236}">
+              <a16:creationId xmlns:a16="http://schemas.microsoft.com/office/drawing/2014/main" id="{DF78DE55-6A31-C0E0-DD29-2E5720878882}"/>
+            </a:ext>
+          </a:extLst>
+        </p:cNvPr>
+        <p:cNvGrpSpPr/>
+        <p:nvPr/>
+      </p:nvGrpSpPr>
+      <p:grpSpPr>
+        <a:xfrm>
+          <a:off x="0" y="0"/>
+          <a:ext cx="0" cy="0"/>
+          <a:chOff x="0" y="0"/>
+          <a:chExt cx="0" cy="0"/>
+        </a:xfrm>
+      </p:grpSpPr>
+      <p:pic>
+        <p:nvPicPr>
+          <p:cNvPr id="4" name="Picture 3">
+            <a:extLst>
+              <a:ext uri="{FF2B5EF4-FFF2-40B4-BE49-F238E27FC236}">
+                <a16:creationId xmlns:a16="http://schemas.microsoft.com/office/drawing/2014/main" id="{1AC3FEF9-05EC-0E4B-04D5-231CF288F4A6}"/>
+              </a:ext>
+            </a:extLst>
+          </p:cNvPr>
+          <p:cNvPicPr>
+            <a:picLocks noChangeAspect="1"/>
+          </p:cNvPicPr>
+          <p:nvPr/>
+        </p:nvPicPr>
+        <p:blipFill>
+          <a:blip r:embed="rId2">
+            <a:extLst>
+              <a:ext uri="{BEBA8EAE-BF5A-486C-A8C5-ECC9F3942E4B}">
+                <a14:imgProps xmlns:a14="http://schemas.microsoft.com/office/drawing/2010/main">
+                  <a14:imgLayer r:embed="rId3">
+                    <a14:imgEffect>
+                      <a14:backgroundRemoval t="1940" b="98707" l="9914" r="89871">
+                        <a14:foregroundMark x1="41595" y1="7328" x2="53879" y2="1940"/>
+                        <a14:foregroundMark x1="68103" y1="42026" x2="60560" y2="20905"/>
+                        <a14:foregroundMark x1="60560" y1="20905" x2="60560" y2="20259"/>
+                        <a14:foregroundMark x1="71767" y1="24138" x2="72845" y2="38147"/>
+                        <a14:foregroundMark x1="74784" y1="37500" x2="71552" y2="30388"/>
+                        <a14:foregroundMark x1="26940" y1="27155" x2="44181" y2="42241"/>
+                        <a14:foregroundMark x1="44181" y1="42241" x2="43966" y2="42241"/>
+                        <a14:foregroundMark x1="49353" y1="93750" x2="49353" y2="93750"/>
+                        <a14:foregroundMark x1="49353" y1="98707" x2="49353" y2="98707"/>
+                      </a14:backgroundRemoval>
+                    </a14:imgEffect>
+                  </a14:imgLayer>
+                </a14:imgProps>
+              </a:ext>
+            </a:extLst>
+          </a:blip>
+          <a:stretch>
+            <a:fillRect/>
+          </a:stretch>
+        </p:blipFill>
+        <p:spPr>
+          <a:xfrm>
+            <a:off x="5016000" y="2188736"/>
+            <a:ext cx="2160000" cy="2160000"/>
+          </a:xfrm>
+          <a:prstGeom prst="rect">
+            <a:avLst/>
+          </a:prstGeom>
+        </p:spPr>
+      </p:pic>
+    </p:spTree>
+    <p:extLst>
+      <p:ext uri="{BB962C8B-B14F-4D97-AF65-F5344CB8AC3E}">
+        <p14:creationId xmlns:p14="http://schemas.microsoft.com/office/powerpoint/2010/main" val="3103987301"/>
+      </p:ext>
+    </p:extLst>
+  </p:cSld>
+  <p:clrMapOvr>
+    <a:masterClrMapping/>
+  </p:clrMapOvr>
+</p:sld>
+</file>
+
+<file path=ppt/slides/slide28.xml><?xml version="1.0" encoding="utf-8"?>
 <p:sld xmlns:a="http://schemas.openxmlformats.org/drawingml/2006/main" xmlns:r="http://schemas.openxmlformats.org/officeDocument/2006/relationships" xmlns:p="http://schemas.openxmlformats.org/presentationml/2006/main">
   <p:cSld>
     <p:bg>
@@ -3936,10 +5177,10 @@
       </p:grpSpPr>
       <p:pic>
         <p:nvPicPr>
-          <p:cNvPr id="4" name="Picture 3">
-            <a:extLst>
-              <a:ext uri="{FF2B5EF4-FFF2-40B4-BE49-F238E27FC236}">
-                <a16:creationId xmlns:a16="http://schemas.microsoft.com/office/drawing/2014/main" id="{8024FB6E-28BD-5B5F-A7B0-2F31636F9BD7}"/>
+          <p:cNvPr id="3" name="Picture 2">
+            <a:extLst>
+              <a:ext uri="{FF2B5EF4-FFF2-40B4-BE49-F238E27FC236}">
+                <a16:creationId xmlns:a16="http://schemas.microsoft.com/office/drawing/2014/main" id="{103FA0DA-143B-6F87-FC03-9C5897B4B908}"/>
               </a:ext>
             </a:extLst>
           </p:cNvPr>
@@ -3977,7 +5218,7 @@
 </p:sld>
 </file>
 
-<file path=ppt/slides/slide17.xml><?xml version="1.0" encoding="utf-8"?>
+<file path=ppt/slides/slide29.xml><?xml version="1.0" encoding="utf-8"?>
 <p:sld xmlns:a="http://schemas.openxmlformats.org/drawingml/2006/main" xmlns:r="http://schemas.openxmlformats.org/officeDocument/2006/relationships" xmlns:p="http://schemas.openxmlformats.org/presentationml/2006/main">
   <p:cSld>
     <p:bg>
@@ -4042,973 +5283,6 @@
     <p:extLst>
       <p:ext uri="{BB962C8B-B14F-4D97-AF65-F5344CB8AC3E}">
         <p14:creationId xmlns:p14="http://schemas.microsoft.com/office/powerpoint/2010/main" val="3723639791"/>
-      </p:ext>
-    </p:extLst>
-  </p:cSld>
-  <p:clrMapOvr>
-    <a:masterClrMapping/>
-  </p:clrMapOvr>
-</p:sld>
-</file>
-
-<file path=ppt/slides/slide18.xml><?xml version="1.0" encoding="utf-8"?>
-<p:sld xmlns:a="http://schemas.openxmlformats.org/drawingml/2006/main" xmlns:r="http://schemas.openxmlformats.org/officeDocument/2006/relationships" xmlns:p="http://schemas.openxmlformats.org/presentationml/2006/main">
-  <p:cSld>
-    <p:bg>
-      <p:bgPr>
-        <a:solidFill>
-          <a:srgbClr val="646464"/>
-        </a:solidFill>
-        <a:effectLst/>
-      </p:bgPr>
-    </p:bg>
-    <p:spTree>
-      <p:nvGrpSpPr>
-        <p:cNvPr id="1" name="">
-          <a:extLst>
-            <a:ext uri="{FF2B5EF4-FFF2-40B4-BE49-F238E27FC236}">
-              <a16:creationId xmlns:a16="http://schemas.microsoft.com/office/drawing/2014/main" id="{1E1F802D-02B9-65F8-6F94-4303786E7154}"/>
-            </a:ext>
-          </a:extLst>
-        </p:cNvPr>
-        <p:cNvGrpSpPr/>
-        <p:nvPr/>
-      </p:nvGrpSpPr>
-      <p:grpSpPr>
-        <a:xfrm>
-          <a:off x="0" y="0"/>
-          <a:ext cx="0" cy="0"/>
-          <a:chOff x="0" y="0"/>
-          <a:chExt cx="0" cy="0"/>
-        </a:xfrm>
-      </p:grpSpPr>
-      <p:pic>
-        <p:nvPicPr>
-          <p:cNvPr id="3" name="Picture 2">
-            <a:extLst>
-              <a:ext uri="{FF2B5EF4-FFF2-40B4-BE49-F238E27FC236}">
-                <a16:creationId xmlns:a16="http://schemas.microsoft.com/office/drawing/2014/main" id="{88574946-1596-0B04-E64A-E83E19BDD032}"/>
-              </a:ext>
-            </a:extLst>
-          </p:cNvPr>
-          <p:cNvPicPr>
-            <a:picLocks noChangeAspect="1"/>
-          </p:cNvPicPr>
-          <p:nvPr/>
-        </p:nvPicPr>
-        <p:blipFill>
-          <a:blip r:embed="rId2"/>
-          <a:stretch>
-            <a:fillRect/>
-          </a:stretch>
-        </p:blipFill>
-        <p:spPr>
-          <a:xfrm>
-            <a:off x="5016000" y="2349000"/>
-            <a:ext cx="2160000" cy="2160000"/>
-          </a:xfrm>
-          <a:prstGeom prst="rect">
-            <a:avLst/>
-          </a:prstGeom>
-        </p:spPr>
-      </p:pic>
-    </p:spTree>
-    <p:extLst>
-      <p:ext uri="{BB962C8B-B14F-4D97-AF65-F5344CB8AC3E}">
-        <p14:creationId xmlns:p14="http://schemas.microsoft.com/office/powerpoint/2010/main" val="1439036244"/>
-      </p:ext>
-    </p:extLst>
-  </p:cSld>
-  <p:clrMapOvr>
-    <a:masterClrMapping/>
-  </p:clrMapOvr>
-</p:sld>
-</file>
-
-<file path=ppt/slides/slide19.xml><?xml version="1.0" encoding="utf-8"?>
-<p:sld xmlns:a="http://schemas.openxmlformats.org/drawingml/2006/main" xmlns:r="http://schemas.openxmlformats.org/officeDocument/2006/relationships" xmlns:p="http://schemas.openxmlformats.org/presentationml/2006/main">
-  <p:cSld>
-    <p:bg>
-      <p:bgPr>
-        <a:solidFill>
-          <a:srgbClr val="5C5C5C"/>
-        </a:solidFill>
-        <a:effectLst/>
-      </p:bgPr>
-    </p:bg>
-    <p:spTree>
-      <p:nvGrpSpPr>
-        <p:cNvPr id="1" name="">
-          <a:extLst>
-            <a:ext uri="{FF2B5EF4-FFF2-40B4-BE49-F238E27FC236}">
-              <a16:creationId xmlns:a16="http://schemas.microsoft.com/office/drawing/2014/main" id="{F3F2F404-A47E-A10E-83A1-6BDE7975BF7F}"/>
-            </a:ext>
-          </a:extLst>
-        </p:cNvPr>
-        <p:cNvGrpSpPr/>
-        <p:nvPr/>
-      </p:nvGrpSpPr>
-      <p:grpSpPr>
-        <a:xfrm>
-          <a:off x="0" y="0"/>
-          <a:ext cx="0" cy="0"/>
-          <a:chOff x="0" y="0"/>
-          <a:chExt cx="0" cy="0"/>
-        </a:xfrm>
-      </p:grpSpPr>
-      <p:pic>
-        <p:nvPicPr>
-          <p:cNvPr id="3" name="Picture 2">
-            <a:extLst>
-              <a:ext uri="{FF2B5EF4-FFF2-40B4-BE49-F238E27FC236}">
-                <a16:creationId xmlns:a16="http://schemas.microsoft.com/office/drawing/2014/main" id="{D4FA992D-5DF9-8C9A-88EB-4B32614E1F0F}"/>
-              </a:ext>
-            </a:extLst>
-          </p:cNvPr>
-          <p:cNvPicPr>
-            <a:picLocks noChangeAspect="1"/>
-          </p:cNvPicPr>
-          <p:nvPr/>
-        </p:nvPicPr>
-        <p:blipFill>
-          <a:blip r:embed="rId2"/>
-          <a:stretch>
-            <a:fillRect/>
-          </a:stretch>
-        </p:blipFill>
-        <p:spPr>
-          <a:xfrm>
-            <a:off x="3501517" y="1449000"/>
-            <a:ext cx="5188966" cy="3960000"/>
-          </a:xfrm>
-          <a:prstGeom prst="rect">
-            <a:avLst/>
-          </a:prstGeom>
-        </p:spPr>
-      </p:pic>
-    </p:spTree>
-    <p:extLst>
-      <p:ext uri="{BB962C8B-B14F-4D97-AF65-F5344CB8AC3E}">
-        <p14:creationId xmlns:p14="http://schemas.microsoft.com/office/powerpoint/2010/main" val="167649608"/>
-      </p:ext>
-    </p:extLst>
-  </p:cSld>
-  <p:clrMapOvr>
-    <a:masterClrMapping/>
-  </p:clrMapOvr>
-</p:sld>
-</file>
-
-<file path=ppt/slides/slide2.xml><?xml version="1.0" encoding="utf-8"?>
-<p:sld xmlns:a="http://schemas.openxmlformats.org/drawingml/2006/main" xmlns:r="http://schemas.openxmlformats.org/officeDocument/2006/relationships" xmlns:p="http://schemas.openxmlformats.org/presentationml/2006/main">
-  <p:cSld>
-    <p:spTree>
-      <p:nvGrpSpPr>
-        <p:cNvPr id="1" name=""/>
-        <p:cNvGrpSpPr/>
-        <p:nvPr/>
-      </p:nvGrpSpPr>
-      <p:grpSpPr>
-        <a:xfrm>
-          <a:off x="0" y="0"/>
-          <a:ext cx="0" cy="0"/>
-          <a:chOff x="0" y="0"/>
-          <a:chExt cx="0" cy="0"/>
-        </a:xfrm>
-      </p:grpSpPr>
-      <p:sp>
-        <p:nvSpPr>
-          <p:cNvPr id="2" name="Title 1">
-            <a:extLst>
-              <a:ext uri="{FF2B5EF4-FFF2-40B4-BE49-F238E27FC236}">
-                <a16:creationId xmlns:a16="http://schemas.microsoft.com/office/drawing/2014/main" id="{0A1FA53E-25A0-0960-0FCC-4CC105416AC1}"/>
-              </a:ext>
-            </a:extLst>
-          </p:cNvPr>
-          <p:cNvSpPr>
-            <a:spLocks noGrp="1"/>
-          </p:cNvSpPr>
-          <p:nvPr>
-            <p:ph type="title"/>
-          </p:nvPr>
-        </p:nvSpPr>
-        <p:spPr>
-          <a:xfrm>
-            <a:off x="410688" y="365125"/>
-            <a:ext cx="10943112" cy="584901"/>
-          </a:xfrm>
-        </p:spPr>
-        <p:txBody>
-          <a:bodyPr>
-            <a:normAutofit/>
-          </a:bodyPr>
-          <a:lstStyle/>
-          <a:p>
-            <a:r>
-              <a:rPr lang="en-CH" sz="2800" b="1" dirty="0">
-                <a:latin typeface="Avenir Book" panose="02000503020000020003" pitchFamily="2" charset="0"/>
-              </a:rPr>
-              <a:t>Practice Task Slides (12 trials)</a:t>
-            </a:r>
-          </a:p>
-        </p:txBody>
-      </p:sp>
-    </p:spTree>
-    <p:extLst>
-      <p:ext uri="{BB962C8B-B14F-4D97-AF65-F5344CB8AC3E}">
-        <p14:creationId xmlns:p14="http://schemas.microsoft.com/office/powerpoint/2010/main" val="2739542140"/>
-      </p:ext>
-    </p:extLst>
-  </p:cSld>
-  <p:clrMapOvr>
-    <a:masterClrMapping/>
-  </p:clrMapOvr>
-</p:sld>
-</file>
-
-<file path=ppt/slides/slide20.xml><?xml version="1.0" encoding="utf-8"?>
-<p:sld xmlns:a="http://schemas.openxmlformats.org/drawingml/2006/main" xmlns:r="http://schemas.openxmlformats.org/officeDocument/2006/relationships" xmlns:p="http://schemas.openxmlformats.org/presentationml/2006/main">
-  <p:cSld>
-    <p:bg>
-      <p:bgPr>
-        <a:solidFill>
-          <a:srgbClr val="646464"/>
-        </a:solidFill>
-        <a:effectLst/>
-      </p:bgPr>
-    </p:bg>
-    <p:spTree>
-      <p:nvGrpSpPr>
-        <p:cNvPr id="1" name="">
-          <a:extLst>
-            <a:ext uri="{FF2B5EF4-FFF2-40B4-BE49-F238E27FC236}">
-              <a16:creationId xmlns:a16="http://schemas.microsoft.com/office/drawing/2014/main" id="{443C470D-9A5B-91DA-318A-6C272308FB5F}"/>
-            </a:ext>
-          </a:extLst>
-        </p:cNvPr>
-        <p:cNvGrpSpPr/>
-        <p:nvPr/>
-      </p:nvGrpSpPr>
-      <p:grpSpPr>
-        <a:xfrm>
-          <a:off x="0" y="0"/>
-          <a:ext cx="0" cy="0"/>
-          <a:chOff x="0" y="0"/>
-          <a:chExt cx="0" cy="0"/>
-        </a:xfrm>
-      </p:grpSpPr>
-      <p:pic>
-        <p:nvPicPr>
-          <p:cNvPr id="4" name="Picture 3">
-            <a:extLst>
-              <a:ext uri="{FF2B5EF4-FFF2-40B4-BE49-F238E27FC236}">
-                <a16:creationId xmlns:a16="http://schemas.microsoft.com/office/drawing/2014/main" id="{375BE7D7-F3BE-901E-88FB-AB6C3CFABC09}"/>
-              </a:ext>
-            </a:extLst>
-          </p:cNvPr>
-          <p:cNvPicPr>
-            <a:picLocks noChangeAspect="1"/>
-          </p:cNvPicPr>
-          <p:nvPr/>
-        </p:nvPicPr>
-        <p:blipFill>
-          <a:blip r:embed="rId2"/>
-          <a:stretch>
-            <a:fillRect/>
-          </a:stretch>
-        </p:blipFill>
-        <p:spPr>
-          <a:xfrm>
-            <a:off x="5016000" y="2349000"/>
-            <a:ext cx="2160000" cy="2160000"/>
-          </a:xfrm>
-          <a:prstGeom prst="rect">
-            <a:avLst/>
-          </a:prstGeom>
-        </p:spPr>
-      </p:pic>
-    </p:spTree>
-    <p:extLst>
-      <p:ext uri="{BB962C8B-B14F-4D97-AF65-F5344CB8AC3E}">
-        <p14:creationId xmlns:p14="http://schemas.microsoft.com/office/powerpoint/2010/main" val="1011469499"/>
-      </p:ext>
-    </p:extLst>
-  </p:cSld>
-  <p:clrMapOvr>
-    <a:masterClrMapping/>
-  </p:clrMapOvr>
-</p:sld>
-</file>
-
-<file path=ppt/slides/slide21.xml><?xml version="1.0" encoding="utf-8"?>
-<p:sld xmlns:a="http://schemas.openxmlformats.org/drawingml/2006/main" xmlns:r="http://schemas.openxmlformats.org/officeDocument/2006/relationships" xmlns:p="http://schemas.openxmlformats.org/presentationml/2006/main">
-  <p:cSld>
-    <p:bg>
-      <p:bgPr>
-        <a:solidFill>
-          <a:srgbClr val="646464"/>
-        </a:solidFill>
-        <a:effectLst/>
-      </p:bgPr>
-    </p:bg>
-    <p:spTree>
-      <p:nvGrpSpPr>
-        <p:cNvPr id="1" name="">
-          <a:extLst>
-            <a:ext uri="{FF2B5EF4-FFF2-40B4-BE49-F238E27FC236}">
-              <a16:creationId xmlns:a16="http://schemas.microsoft.com/office/drawing/2014/main" id="{1B9A2577-7FBA-BB3B-2C15-F4DD42A49C42}"/>
-            </a:ext>
-          </a:extLst>
-        </p:cNvPr>
-        <p:cNvGrpSpPr/>
-        <p:nvPr/>
-      </p:nvGrpSpPr>
-      <p:grpSpPr>
-        <a:xfrm>
-          <a:off x="0" y="0"/>
-          <a:ext cx="0" cy="0"/>
-          <a:chOff x="0" y="0"/>
-          <a:chExt cx="0" cy="0"/>
-        </a:xfrm>
-      </p:grpSpPr>
-      <p:pic>
-        <p:nvPicPr>
-          <p:cNvPr id="4" name="Picture 3">
-            <a:extLst>
-              <a:ext uri="{FF2B5EF4-FFF2-40B4-BE49-F238E27FC236}">
-                <a16:creationId xmlns:a16="http://schemas.microsoft.com/office/drawing/2014/main" id="{02CE0ED7-958D-26E5-1945-9B81A34057E7}"/>
-              </a:ext>
-            </a:extLst>
-          </p:cNvPr>
-          <p:cNvPicPr>
-            <a:picLocks noChangeAspect="1"/>
-          </p:cNvPicPr>
-          <p:nvPr/>
-        </p:nvPicPr>
-        <p:blipFill>
-          <a:blip r:embed="rId2">
-            <a:extLst>
-              <a:ext uri="{BEBA8EAE-BF5A-486C-A8C5-ECC9F3942E4B}">
-                <a14:imgProps xmlns:a14="http://schemas.microsoft.com/office/drawing/2010/main">
-                  <a14:imgLayer r:embed="rId3">
-                    <a14:imgEffect>
-                      <a14:artisticChalkSketch/>
-                    </a14:imgEffect>
-                  </a14:imgLayer>
-                </a14:imgProps>
-              </a:ext>
-            </a:extLst>
-          </a:blip>
-          <a:stretch>
-            <a:fillRect/>
-          </a:stretch>
-        </p:blipFill>
-        <p:spPr>
-          <a:xfrm>
-            <a:off x="4584450" y="2349000"/>
-            <a:ext cx="3023100" cy="2160000"/>
-          </a:xfrm>
-          <a:prstGeom prst="rect">
-            <a:avLst/>
-          </a:prstGeom>
-        </p:spPr>
-      </p:pic>
-    </p:spTree>
-    <p:extLst>
-      <p:ext uri="{BB962C8B-B14F-4D97-AF65-F5344CB8AC3E}">
-        <p14:creationId xmlns:p14="http://schemas.microsoft.com/office/powerpoint/2010/main" val="572961673"/>
-      </p:ext>
-    </p:extLst>
-  </p:cSld>
-  <p:clrMapOvr>
-    <a:masterClrMapping/>
-  </p:clrMapOvr>
-</p:sld>
-</file>
-
-<file path=ppt/slides/slide22.xml><?xml version="1.0" encoding="utf-8"?>
-<p:sld xmlns:a="http://schemas.openxmlformats.org/drawingml/2006/main" xmlns:r="http://schemas.openxmlformats.org/officeDocument/2006/relationships" xmlns:p="http://schemas.openxmlformats.org/presentationml/2006/main">
-  <p:cSld>
-    <p:bg>
-      <p:bgPr>
-        <a:solidFill>
-          <a:srgbClr val="5C5C5C"/>
-        </a:solidFill>
-        <a:effectLst/>
-      </p:bgPr>
-    </p:bg>
-    <p:spTree>
-      <p:nvGrpSpPr>
-        <p:cNvPr id="1" name=""/>
-        <p:cNvGrpSpPr/>
-        <p:nvPr/>
-      </p:nvGrpSpPr>
-      <p:grpSpPr>
-        <a:xfrm>
-          <a:off x="0" y="0"/>
-          <a:ext cx="0" cy="0"/>
-          <a:chOff x="0" y="0"/>
-          <a:chExt cx="0" cy="0"/>
-        </a:xfrm>
-      </p:grpSpPr>
-      <p:sp>
-        <p:nvSpPr>
-          <p:cNvPr id="5" name="TextBox 4">
-            <a:extLst>
-              <a:ext uri="{FF2B5EF4-FFF2-40B4-BE49-F238E27FC236}">
-                <a16:creationId xmlns:a16="http://schemas.microsoft.com/office/drawing/2014/main" id="{5C3101FE-916F-7AC8-03CF-F8680EC21ADF}"/>
-              </a:ext>
-            </a:extLst>
-          </p:cNvPr>
-          <p:cNvSpPr txBox="1"/>
-          <p:nvPr/>
-        </p:nvSpPr>
-        <p:spPr>
-          <a:xfrm>
-            <a:off x="373856" y="2510165"/>
-            <a:ext cx="11444287" cy="1569660"/>
-          </a:xfrm>
-          <a:prstGeom prst="rect">
-            <a:avLst/>
-          </a:prstGeom>
-          <a:noFill/>
-        </p:spPr>
-        <p:txBody>
-          <a:bodyPr wrap="square" rtlCol="0">
-            <a:spAutoFit/>
-          </a:bodyPr>
-          <a:lstStyle/>
-          <a:p>
-            <a:pPr algn="ctr"/>
-            <a:r>
-              <a:rPr lang="en-CH" sz="9600" dirty="0">
-                <a:solidFill>
-                  <a:schemeClr val="bg1"/>
-                </a:solidFill>
-                <a:latin typeface="Avenir Light" panose="020B0402020203020204" pitchFamily="34" charset="77"/>
-                <a:cs typeface="Arial" panose="020B0604020202020204" pitchFamily="34" charset="0"/>
-              </a:rPr>
-              <a:t>+</a:t>
-            </a:r>
-          </a:p>
-        </p:txBody>
-      </p:sp>
-    </p:spTree>
-    <p:extLst>
-      <p:ext uri="{BB962C8B-B14F-4D97-AF65-F5344CB8AC3E}">
-        <p14:creationId xmlns:p14="http://schemas.microsoft.com/office/powerpoint/2010/main" val="3372457678"/>
-      </p:ext>
-    </p:extLst>
-  </p:cSld>
-  <p:clrMapOvr>
-    <a:masterClrMapping/>
-  </p:clrMapOvr>
-</p:sld>
-</file>
-
-<file path=ppt/slides/slide23.xml><?xml version="1.0" encoding="utf-8"?>
-<p:sld xmlns:a="http://schemas.openxmlformats.org/drawingml/2006/main" xmlns:r="http://schemas.openxmlformats.org/officeDocument/2006/relationships" xmlns:p="http://schemas.openxmlformats.org/presentationml/2006/main">
-  <p:cSld>
-    <p:bg>
-      <p:bgPr>
-        <a:solidFill>
-          <a:srgbClr val="646464"/>
-        </a:solidFill>
-        <a:effectLst/>
-      </p:bgPr>
-    </p:bg>
-    <p:spTree>
-      <p:nvGrpSpPr>
-        <p:cNvPr id="1" name=""/>
-        <p:cNvGrpSpPr/>
-        <p:nvPr/>
-      </p:nvGrpSpPr>
-      <p:grpSpPr>
-        <a:xfrm>
-          <a:off x="0" y="0"/>
-          <a:ext cx="0" cy="0"/>
-          <a:chOff x="0" y="0"/>
-          <a:chExt cx="0" cy="0"/>
-        </a:xfrm>
-      </p:grpSpPr>
-      <p:pic>
-        <p:nvPicPr>
-          <p:cNvPr id="4" name="Picture 3">
-            <a:extLst>
-              <a:ext uri="{FF2B5EF4-FFF2-40B4-BE49-F238E27FC236}">
-                <a16:creationId xmlns:a16="http://schemas.microsoft.com/office/drawing/2014/main" id="{98A99499-E62E-36AE-E9CC-5AD602FD0030}"/>
-              </a:ext>
-            </a:extLst>
-          </p:cNvPr>
-          <p:cNvPicPr>
-            <a:picLocks noChangeAspect="1"/>
-          </p:cNvPicPr>
-          <p:nvPr/>
-        </p:nvPicPr>
-        <p:blipFill>
-          <a:blip r:embed="rId2"/>
-          <a:stretch>
-            <a:fillRect/>
-          </a:stretch>
-        </p:blipFill>
-        <p:spPr>
-          <a:xfrm>
-            <a:off x="4121400" y="1454400"/>
-            <a:ext cx="3949200" cy="3949200"/>
-          </a:xfrm>
-          <a:prstGeom prst="rect">
-            <a:avLst/>
-          </a:prstGeom>
-        </p:spPr>
-      </p:pic>
-    </p:spTree>
-    <p:extLst>
-      <p:ext uri="{BB962C8B-B14F-4D97-AF65-F5344CB8AC3E}">
-        <p14:creationId xmlns:p14="http://schemas.microsoft.com/office/powerpoint/2010/main" val="3024732115"/>
-      </p:ext>
-    </p:extLst>
-  </p:cSld>
-  <p:clrMapOvr>
-    <a:masterClrMapping/>
-  </p:clrMapOvr>
-</p:sld>
-</file>
-
-<file path=ppt/slides/slide24.xml><?xml version="1.0" encoding="utf-8"?>
-<p:sld xmlns:a="http://schemas.openxmlformats.org/drawingml/2006/main" xmlns:r="http://schemas.openxmlformats.org/officeDocument/2006/relationships" xmlns:p="http://schemas.openxmlformats.org/presentationml/2006/main">
-  <p:cSld>
-    <p:bg>
-      <p:bgPr>
-        <a:solidFill>
-          <a:srgbClr val="646464"/>
-        </a:solidFill>
-        <a:effectLst/>
-      </p:bgPr>
-    </p:bg>
-    <p:spTree>
-      <p:nvGrpSpPr>
-        <p:cNvPr id="1" name="">
-          <a:extLst>
-            <a:ext uri="{FF2B5EF4-FFF2-40B4-BE49-F238E27FC236}">
-              <a16:creationId xmlns:a16="http://schemas.microsoft.com/office/drawing/2014/main" id="{757EBA9A-231D-6E98-F53D-42C881A06F99}"/>
-            </a:ext>
-          </a:extLst>
-        </p:cNvPr>
-        <p:cNvGrpSpPr/>
-        <p:nvPr/>
-      </p:nvGrpSpPr>
-      <p:grpSpPr>
-        <a:xfrm>
-          <a:off x="0" y="0"/>
-          <a:ext cx="0" cy="0"/>
-          <a:chOff x="0" y="0"/>
-          <a:chExt cx="0" cy="0"/>
-        </a:xfrm>
-      </p:grpSpPr>
-      <p:pic>
-        <p:nvPicPr>
-          <p:cNvPr id="3" name="Picture 2">
-            <a:extLst>
-              <a:ext uri="{FF2B5EF4-FFF2-40B4-BE49-F238E27FC236}">
-                <a16:creationId xmlns:a16="http://schemas.microsoft.com/office/drawing/2014/main" id="{A66ACF03-06CF-DEEF-B6C6-3EB4F093909D}"/>
-              </a:ext>
-            </a:extLst>
-          </p:cNvPr>
-          <p:cNvPicPr>
-            <a:picLocks noChangeAspect="1"/>
-          </p:cNvPicPr>
-          <p:nvPr/>
-        </p:nvPicPr>
-        <p:blipFill>
-          <a:blip r:embed="rId2"/>
-          <a:stretch>
-            <a:fillRect/>
-          </a:stretch>
-        </p:blipFill>
-        <p:spPr>
-          <a:xfrm>
-            <a:off x="4121400" y="1454400"/>
-            <a:ext cx="3949200" cy="3949200"/>
-          </a:xfrm>
-          <a:prstGeom prst="rect">
-            <a:avLst/>
-          </a:prstGeom>
-        </p:spPr>
-      </p:pic>
-    </p:spTree>
-    <p:extLst>
-      <p:ext uri="{BB962C8B-B14F-4D97-AF65-F5344CB8AC3E}">
-        <p14:creationId xmlns:p14="http://schemas.microsoft.com/office/powerpoint/2010/main" val="2494584724"/>
-      </p:ext>
-    </p:extLst>
-  </p:cSld>
-  <p:clrMapOvr>
-    <a:masterClrMapping/>
-  </p:clrMapOvr>
-</p:sld>
-</file>
-
-<file path=ppt/slides/slide25.xml><?xml version="1.0" encoding="utf-8"?>
-<p:sld xmlns:a="http://schemas.openxmlformats.org/drawingml/2006/main" xmlns:r="http://schemas.openxmlformats.org/officeDocument/2006/relationships" xmlns:p="http://schemas.openxmlformats.org/presentationml/2006/main">
-  <p:cSld>
-    <p:bg>
-      <p:bgPr>
-        <a:solidFill>
-          <a:srgbClr val="646464"/>
-        </a:solidFill>
-        <a:effectLst/>
-      </p:bgPr>
-    </p:bg>
-    <p:spTree>
-      <p:nvGrpSpPr>
-        <p:cNvPr id="1" name="">
-          <a:extLst>
-            <a:ext uri="{FF2B5EF4-FFF2-40B4-BE49-F238E27FC236}">
-              <a16:creationId xmlns:a16="http://schemas.microsoft.com/office/drawing/2014/main" id="{AFCECEE9-9371-4319-429F-28F48D23EDB2}"/>
-            </a:ext>
-          </a:extLst>
-        </p:cNvPr>
-        <p:cNvGrpSpPr/>
-        <p:nvPr/>
-      </p:nvGrpSpPr>
-      <p:grpSpPr>
-        <a:xfrm>
-          <a:off x="0" y="0"/>
-          <a:ext cx="0" cy="0"/>
-          <a:chOff x="0" y="0"/>
-          <a:chExt cx="0" cy="0"/>
-        </a:xfrm>
-      </p:grpSpPr>
-      <p:pic>
-        <p:nvPicPr>
-          <p:cNvPr id="3" name="Picture 2">
-            <a:extLst>
-              <a:ext uri="{FF2B5EF4-FFF2-40B4-BE49-F238E27FC236}">
-                <a16:creationId xmlns:a16="http://schemas.microsoft.com/office/drawing/2014/main" id="{E00D12FB-B502-2141-84DB-699677F44440}"/>
-              </a:ext>
-            </a:extLst>
-          </p:cNvPr>
-          <p:cNvPicPr>
-            <a:picLocks noChangeAspect="1"/>
-          </p:cNvPicPr>
-          <p:nvPr/>
-        </p:nvPicPr>
-        <p:blipFill>
-          <a:blip r:embed="rId2"/>
-          <a:stretch>
-            <a:fillRect/>
-          </a:stretch>
-        </p:blipFill>
-        <p:spPr>
-          <a:xfrm>
-            <a:off x="4121400" y="1454400"/>
-            <a:ext cx="3949200" cy="3949200"/>
-          </a:xfrm>
-          <a:prstGeom prst="rect">
-            <a:avLst/>
-          </a:prstGeom>
-        </p:spPr>
-      </p:pic>
-    </p:spTree>
-    <p:extLst>
-      <p:ext uri="{BB962C8B-B14F-4D97-AF65-F5344CB8AC3E}">
-        <p14:creationId xmlns:p14="http://schemas.microsoft.com/office/powerpoint/2010/main" val="3633927710"/>
-      </p:ext>
-    </p:extLst>
-  </p:cSld>
-  <p:clrMapOvr>
-    <a:masterClrMapping/>
-  </p:clrMapOvr>
-</p:sld>
-</file>
-
-<file path=ppt/slides/slide26.xml><?xml version="1.0" encoding="utf-8"?>
-<p:sld xmlns:a="http://schemas.openxmlformats.org/drawingml/2006/main" xmlns:r="http://schemas.openxmlformats.org/officeDocument/2006/relationships" xmlns:p="http://schemas.openxmlformats.org/presentationml/2006/main">
-  <p:cSld>
-    <p:bg>
-      <p:bgPr>
-        <a:solidFill>
-          <a:srgbClr val="646464"/>
-        </a:solidFill>
-        <a:effectLst/>
-      </p:bgPr>
-    </p:bg>
-    <p:spTree>
-      <p:nvGrpSpPr>
-        <p:cNvPr id="1" name="">
-          <a:extLst>
-            <a:ext uri="{FF2B5EF4-FFF2-40B4-BE49-F238E27FC236}">
-              <a16:creationId xmlns:a16="http://schemas.microsoft.com/office/drawing/2014/main" id="{ED77651F-EE57-6D85-6805-98313E03CD52}"/>
-            </a:ext>
-          </a:extLst>
-        </p:cNvPr>
-        <p:cNvGrpSpPr/>
-        <p:nvPr/>
-      </p:nvGrpSpPr>
-      <p:grpSpPr>
-        <a:xfrm>
-          <a:off x="0" y="0"/>
-          <a:ext cx="0" cy="0"/>
-          <a:chOff x="0" y="0"/>
-          <a:chExt cx="0" cy="0"/>
-        </a:xfrm>
-      </p:grpSpPr>
-      <p:pic>
-        <p:nvPicPr>
-          <p:cNvPr id="3" name="Picture 2">
-            <a:extLst>
-              <a:ext uri="{FF2B5EF4-FFF2-40B4-BE49-F238E27FC236}">
-                <a16:creationId xmlns:a16="http://schemas.microsoft.com/office/drawing/2014/main" id="{709742A0-4437-4626-486F-DED455F4D8EC}"/>
-              </a:ext>
-            </a:extLst>
-          </p:cNvPr>
-          <p:cNvPicPr>
-            <a:picLocks noChangeAspect="1"/>
-          </p:cNvPicPr>
-          <p:nvPr/>
-        </p:nvPicPr>
-        <p:blipFill>
-          <a:blip r:embed="rId2"/>
-          <a:stretch>
-            <a:fillRect/>
-          </a:stretch>
-        </p:blipFill>
-        <p:spPr>
-          <a:xfrm>
-            <a:off x="4121400" y="1454400"/>
-            <a:ext cx="3949200" cy="3949200"/>
-          </a:xfrm>
-          <a:prstGeom prst="rect">
-            <a:avLst/>
-          </a:prstGeom>
-        </p:spPr>
-      </p:pic>
-    </p:spTree>
-    <p:extLst>
-      <p:ext uri="{BB962C8B-B14F-4D97-AF65-F5344CB8AC3E}">
-        <p14:creationId xmlns:p14="http://schemas.microsoft.com/office/powerpoint/2010/main" val="2984104329"/>
-      </p:ext>
-    </p:extLst>
-  </p:cSld>
-  <p:clrMapOvr>
-    <a:masterClrMapping/>
-  </p:clrMapOvr>
-</p:sld>
-</file>
-
-<file path=ppt/slides/slide27.xml><?xml version="1.0" encoding="utf-8"?>
-<p:sld xmlns:a="http://schemas.openxmlformats.org/drawingml/2006/main" xmlns:r="http://schemas.openxmlformats.org/officeDocument/2006/relationships" xmlns:p="http://schemas.openxmlformats.org/presentationml/2006/main">
-  <p:cSld>
-    <p:bg>
-      <p:bgPr>
-        <a:solidFill>
-          <a:srgbClr val="646464"/>
-        </a:solidFill>
-        <a:effectLst/>
-      </p:bgPr>
-    </p:bg>
-    <p:spTree>
-      <p:nvGrpSpPr>
-        <p:cNvPr id="1" name="">
-          <a:extLst>
-            <a:ext uri="{FF2B5EF4-FFF2-40B4-BE49-F238E27FC236}">
-              <a16:creationId xmlns:a16="http://schemas.microsoft.com/office/drawing/2014/main" id="{1F8AAB88-DD21-6A50-E0D3-955F767C2037}"/>
-            </a:ext>
-          </a:extLst>
-        </p:cNvPr>
-        <p:cNvGrpSpPr/>
-        <p:nvPr/>
-      </p:nvGrpSpPr>
-      <p:grpSpPr>
-        <a:xfrm>
-          <a:off x="0" y="0"/>
-          <a:ext cx="0" cy="0"/>
-          <a:chOff x="0" y="0"/>
-          <a:chExt cx="0" cy="0"/>
-        </a:xfrm>
-      </p:grpSpPr>
-      <p:pic>
-        <p:nvPicPr>
-          <p:cNvPr id="3" name="Picture 2">
-            <a:extLst>
-              <a:ext uri="{FF2B5EF4-FFF2-40B4-BE49-F238E27FC236}">
-                <a16:creationId xmlns:a16="http://schemas.microsoft.com/office/drawing/2014/main" id="{207EA149-F988-ACAE-AD3F-A45C3309A941}"/>
-              </a:ext>
-            </a:extLst>
-          </p:cNvPr>
-          <p:cNvPicPr>
-            <a:picLocks noChangeAspect="1"/>
-          </p:cNvPicPr>
-          <p:nvPr/>
-        </p:nvPicPr>
-        <p:blipFill>
-          <a:blip r:embed="rId2"/>
-          <a:stretch>
-            <a:fillRect/>
-          </a:stretch>
-        </p:blipFill>
-        <p:spPr>
-          <a:xfrm>
-            <a:off x="4121400" y="1454400"/>
-            <a:ext cx="3949200" cy="3949200"/>
-          </a:xfrm>
-          <a:prstGeom prst="rect">
-            <a:avLst/>
-          </a:prstGeom>
-        </p:spPr>
-      </p:pic>
-    </p:spTree>
-    <p:extLst>
-      <p:ext uri="{BB962C8B-B14F-4D97-AF65-F5344CB8AC3E}">
-        <p14:creationId xmlns:p14="http://schemas.microsoft.com/office/powerpoint/2010/main" val="1223329335"/>
-      </p:ext>
-    </p:extLst>
-  </p:cSld>
-  <p:clrMapOvr>
-    <a:masterClrMapping/>
-  </p:clrMapOvr>
-</p:sld>
-</file>
-
-<file path=ppt/slides/slide28.xml><?xml version="1.0" encoding="utf-8"?>
-<p:sld xmlns:a="http://schemas.openxmlformats.org/drawingml/2006/main" xmlns:r="http://schemas.openxmlformats.org/officeDocument/2006/relationships" xmlns:p="http://schemas.openxmlformats.org/presentationml/2006/main">
-  <p:cSld>
-    <p:bg>
-      <p:bgPr>
-        <a:solidFill>
-          <a:srgbClr val="646464"/>
-        </a:solidFill>
-        <a:effectLst/>
-      </p:bgPr>
-    </p:bg>
-    <p:spTree>
-      <p:nvGrpSpPr>
-        <p:cNvPr id="1" name="">
-          <a:extLst>
-            <a:ext uri="{FF2B5EF4-FFF2-40B4-BE49-F238E27FC236}">
-              <a16:creationId xmlns:a16="http://schemas.microsoft.com/office/drawing/2014/main" id="{012BC2EB-F701-40AE-590B-9D8777394042}"/>
-            </a:ext>
-          </a:extLst>
-        </p:cNvPr>
-        <p:cNvGrpSpPr/>
-        <p:nvPr/>
-      </p:nvGrpSpPr>
-      <p:grpSpPr>
-        <a:xfrm>
-          <a:off x="0" y="0"/>
-          <a:ext cx="0" cy="0"/>
-          <a:chOff x="0" y="0"/>
-          <a:chExt cx="0" cy="0"/>
-        </a:xfrm>
-      </p:grpSpPr>
-      <p:pic>
-        <p:nvPicPr>
-          <p:cNvPr id="3" name="Picture 2">
-            <a:extLst>
-              <a:ext uri="{FF2B5EF4-FFF2-40B4-BE49-F238E27FC236}">
-                <a16:creationId xmlns:a16="http://schemas.microsoft.com/office/drawing/2014/main" id="{6CC73594-A10B-3860-D4D6-62F137E8AB4E}"/>
-              </a:ext>
-            </a:extLst>
-          </p:cNvPr>
-          <p:cNvPicPr>
-            <a:picLocks noChangeAspect="1"/>
-          </p:cNvPicPr>
-          <p:nvPr/>
-        </p:nvPicPr>
-        <p:blipFill>
-          <a:blip r:embed="rId2"/>
-          <a:stretch>
-            <a:fillRect/>
-          </a:stretch>
-        </p:blipFill>
-        <p:spPr>
-          <a:xfrm>
-            <a:off x="4121400" y="1454400"/>
-            <a:ext cx="3949200" cy="3949200"/>
-          </a:xfrm>
-          <a:prstGeom prst="rect">
-            <a:avLst/>
-          </a:prstGeom>
-        </p:spPr>
-      </p:pic>
-    </p:spTree>
-    <p:extLst>
-      <p:ext uri="{BB962C8B-B14F-4D97-AF65-F5344CB8AC3E}">
-        <p14:creationId xmlns:p14="http://schemas.microsoft.com/office/powerpoint/2010/main" val="3183569116"/>
-      </p:ext>
-    </p:extLst>
-  </p:cSld>
-  <p:clrMapOvr>
-    <a:masterClrMapping/>
-  </p:clrMapOvr>
-</p:sld>
-</file>
-
-<file path=ppt/slides/slide29.xml><?xml version="1.0" encoding="utf-8"?>
-<p:sld xmlns:a="http://schemas.openxmlformats.org/drawingml/2006/main" xmlns:r="http://schemas.openxmlformats.org/officeDocument/2006/relationships" xmlns:p="http://schemas.openxmlformats.org/presentationml/2006/main">
-  <p:cSld>
-    <p:bg>
-      <p:bgPr>
-        <a:solidFill>
-          <a:srgbClr val="646464"/>
-        </a:solidFill>
-        <a:effectLst/>
-      </p:bgPr>
-    </p:bg>
-    <p:spTree>
-      <p:nvGrpSpPr>
-        <p:cNvPr id="1" name="">
-          <a:extLst>
-            <a:ext uri="{FF2B5EF4-FFF2-40B4-BE49-F238E27FC236}">
-              <a16:creationId xmlns:a16="http://schemas.microsoft.com/office/drawing/2014/main" id="{303A3D60-A86D-2CCD-C6C6-3879243C9D1C}"/>
-            </a:ext>
-          </a:extLst>
-        </p:cNvPr>
-        <p:cNvGrpSpPr/>
-        <p:nvPr/>
-      </p:nvGrpSpPr>
-      <p:grpSpPr>
-        <a:xfrm>
-          <a:off x="0" y="0"/>
-          <a:ext cx="0" cy="0"/>
-          <a:chOff x="0" y="0"/>
-          <a:chExt cx="0" cy="0"/>
-        </a:xfrm>
-      </p:grpSpPr>
-      <p:pic>
-        <p:nvPicPr>
-          <p:cNvPr id="3" name="Picture 2">
-            <a:extLst>
-              <a:ext uri="{FF2B5EF4-FFF2-40B4-BE49-F238E27FC236}">
-                <a16:creationId xmlns:a16="http://schemas.microsoft.com/office/drawing/2014/main" id="{95A24F34-F847-B17F-F6A1-01F39F4357A0}"/>
-              </a:ext>
-            </a:extLst>
-          </p:cNvPr>
-          <p:cNvPicPr>
-            <a:picLocks noChangeAspect="1"/>
-          </p:cNvPicPr>
-          <p:nvPr/>
-        </p:nvPicPr>
-        <p:blipFill>
-          <a:blip r:embed="rId2"/>
-          <a:stretch>
-            <a:fillRect/>
-          </a:stretch>
-        </p:blipFill>
-        <p:spPr>
-          <a:xfrm>
-            <a:off x="4121400" y="1454400"/>
-            <a:ext cx="3949200" cy="3949200"/>
-          </a:xfrm>
-          <a:prstGeom prst="rect">
-            <a:avLst/>
-          </a:prstGeom>
-        </p:spPr>
-      </p:pic>
-    </p:spTree>
-    <p:extLst>
-      <p:ext uri="{BB962C8B-B14F-4D97-AF65-F5344CB8AC3E}">
-        <p14:creationId xmlns:p14="http://schemas.microsoft.com/office/powerpoint/2010/main" val="2117946610"/>
       </p:ext>
     </p:extLst>
   </p:cSld>
@@ -5058,7 +5332,7 @@
         <p:spPr>
           <a:xfrm>
             <a:off x="391886" y="130629"/>
-            <a:ext cx="11614067" cy="4216539"/>
+            <a:ext cx="11614067" cy="5909310"/>
           </a:xfrm>
           <a:prstGeom prst="rect">
             <a:avLst/>
@@ -5104,7 +5378,7 @@
                 <a:latin typeface="Arial" panose="020B0604020202020204" pitchFamily="34" charset="0"/>
                 <a:cs typeface="Arial" panose="020B0604020202020204" pitchFamily="34" charset="0"/>
               </a:rPr>
-              <a:t>Your goal in this task is to buy as many fresh eggs from the egg farmer for your store as possible. You want to get a good variety of eggs but some of them are more sensitive and get rotten more easily. For good eggs you receive money, when you buy bad eggs you loose money.</a:t>
+              <a:t>Your goal in this task is to buy as many fresh eggs from the egg farmer for your store as possible. You want to get a good variety of eggs. Some of the eggs are more sensitive and get rotten more easily however. For good eggs you will receive money when reselling them at your shop. When you buy bad eggs you loose money because you cannot resell them.</a:t>
             </a:r>
           </a:p>
           <a:p>
@@ -5146,7 +5420,28 @@
                 <a:latin typeface="Arial" panose="020B0604020202020204" pitchFamily="34" charset="0"/>
                 <a:cs typeface="Arial" panose="020B0604020202020204" pitchFamily="34" charset="0"/>
               </a:rPr>
-              <a:t>Try to make as much profit as possible.</a:t>
+              <a:t>Try to make as much profit as possible by collecting as many and a high variety of fresh eggs as possible.</a:t>
+            </a:r>
+          </a:p>
+          <a:p>
+            <a:endParaRPr lang="en-GB" sz="2200" dirty="0">
+              <a:solidFill>
+                <a:schemeClr val="bg1"/>
+              </a:solidFill>
+              <a:latin typeface="Arial" panose="020B0604020202020204" pitchFamily="34" charset="0"/>
+              <a:cs typeface="Arial" panose="020B0604020202020204" pitchFamily="34" charset="0"/>
+            </a:endParaRPr>
+          </a:p>
+          <a:p>
+            <a:r>
+              <a:rPr lang="en-GB" sz="2200" dirty="0">
+                <a:solidFill>
+                  <a:schemeClr val="bg1"/>
+                </a:solidFill>
+                <a:latin typeface="Arial" panose="020B0604020202020204" pitchFamily="34" charset="0"/>
+                <a:cs typeface="Arial" panose="020B0604020202020204" pitchFamily="34" charset="0"/>
+              </a:rPr>
+              <a:t>To make it easier to distinguish between the different eggs, we reused some of the faces from the last task you played. The faces have nothing to do with the task itself. This is a profit task.</a:t>
             </a:r>
           </a:p>
           <a:p>
@@ -5189,7 +5484,7 @@
         <p:cNvPr id="1" name="">
           <a:extLst>
             <a:ext uri="{FF2B5EF4-FFF2-40B4-BE49-F238E27FC236}">
-              <a16:creationId xmlns:a16="http://schemas.microsoft.com/office/drawing/2014/main" id="{F09EB5C3-4709-1945-6744-4BDED1C41422}"/>
+              <a16:creationId xmlns:a16="http://schemas.microsoft.com/office/drawing/2014/main" id="{5EA679AB-5074-40AD-E227-B458D93FB644}"/>
             </a:ext>
           </a:extLst>
         </p:cNvPr>
@@ -5206,10 +5501,10 @@
       </p:grpSpPr>
       <p:pic>
         <p:nvPicPr>
-          <p:cNvPr id="3" name="Picture 2">
-            <a:extLst>
-              <a:ext uri="{FF2B5EF4-FFF2-40B4-BE49-F238E27FC236}">
-                <a16:creationId xmlns:a16="http://schemas.microsoft.com/office/drawing/2014/main" id="{A75B7CE9-1802-3529-4D9A-FA4C8DB8E77A}"/>
+          <p:cNvPr id="6" name="Picture 5">
+            <a:extLst>
+              <a:ext uri="{FF2B5EF4-FFF2-40B4-BE49-F238E27FC236}">
+                <a16:creationId xmlns:a16="http://schemas.microsoft.com/office/drawing/2014/main" id="{43EBE4FD-46F5-48A1-F98D-28077AB2F5AE}"/>
               </a:ext>
             </a:extLst>
           </p:cNvPr>
@@ -5219,15 +5514,42 @@
           <p:nvPr/>
         </p:nvPicPr>
         <p:blipFill>
-          <a:blip r:embed="rId2"/>
+          <a:blip r:embed="rId2">
+            <a:extLst>
+              <a:ext uri="{BEBA8EAE-BF5A-486C-A8C5-ECC9F3942E4B}">
+                <a14:imgProps xmlns:a14="http://schemas.microsoft.com/office/drawing/2010/main">
+                  <a14:imgLayer r:embed="rId3">
+                    <a14:imgEffect>
+                      <a14:backgroundRemoval t="1940" b="98922" l="9914" r="89871">
+                        <a14:foregroundMark x1="46552" y1="10345" x2="46552" y2="10345"/>
+                        <a14:foregroundMark x1="50000" y1="3879" x2="50000" y2="3879"/>
+                        <a14:foregroundMark x1="49784" y1="1940" x2="49784" y2="1940"/>
+                        <a14:foregroundMark x1="17672" y1="29957" x2="17672" y2="29957"/>
+                        <a14:foregroundMark x1="37716" y1="25862" x2="39440" y2="38147"/>
+                        <a14:foregroundMark x1="30603" y1="36422" x2="30603" y2="36422"/>
+                        <a14:foregroundMark x1="58836" y1="28017" x2="68966" y2="29310"/>
+                        <a14:foregroundMark x1="68966" y1="29310" x2="78233" y2="28448"/>
+                        <a14:foregroundMark x1="78233" y1="28448" x2="82974" y2="28664"/>
+                        <a14:foregroundMark x1="83836" y1="30388" x2="83836" y2="30388"/>
+                        <a14:foregroundMark x1="52802" y1="95043" x2="52802" y2="95043"/>
+                        <a14:foregroundMark x1="50216" y1="98922" x2="50216" y2="98922"/>
+                        <a14:foregroundMark x1="21121" y1="79741" x2="20259" y2="80172"/>
+                        <a14:foregroundMark x1="19397" y1="79526" x2="19397" y2="79526"/>
+                      </a14:backgroundRemoval>
+                    </a14:imgEffect>
+                  </a14:imgLayer>
+                </a14:imgProps>
+              </a:ext>
+            </a:extLst>
+          </a:blip>
           <a:stretch>
             <a:fillRect/>
           </a:stretch>
         </p:blipFill>
         <p:spPr>
           <a:xfrm>
-            <a:off x="4121400" y="1454400"/>
-            <a:ext cx="3949200" cy="3949200"/>
+            <a:off x="5016000" y="2349000"/>
+            <a:ext cx="2160000" cy="2160000"/>
           </a:xfrm>
           <a:prstGeom prst="rect">
             <a:avLst/>
@@ -5237,7 +5559,7 @@
     </p:spTree>
     <p:extLst>
       <p:ext uri="{BB962C8B-B14F-4D97-AF65-F5344CB8AC3E}">
-        <p14:creationId xmlns:p14="http://schemas.microsoft.com/office/powerpoint/2010/main" val="3128553988"/>
+        <p14:creationId xmlns:p14="http://schemas.microsoft.com/office/powerpoint/2010/main" val="2576971076"/>
       </p:ext>
     </p:extLst>
   </p:cSld>
@@ -5263,7 +5585,7 @@
         <p:cNvPr id="1" name="">
           <a:extLst>
             <a:ext uri="{FF2B5EF4-FFF2-40B4-BE49-F238E27FC236}">
-              <a16:creationId xmlns:a16="http://schemas.microsoft.com/office/drawing/2014/main" id="{2C88D5F1-9287-DE81-223B-7BB36D4EBA37}"/>
+              <a16:creationId xmlns:a16="http://schemas.microsoft.com/office/drawing/2014/main" id="{B7BF8486-D25B-DEDF-A9BC-EA95D7999C45}"/>
             </a:ext>
           </a:extLst>
         </p:cNvPr>
@@ -5283,7 +5605,7 @@
           <p:cNvPr id="3" name="Picture 2">
             <a:extLst>
               <a:ext uri="{FF2B5EF4-FFF2-40B4-BE49-F238E27FC236}">
-                <a16:creationId xmlns:a16="http://schemas.microsoft.com/office/drawing/2014/main" id="{1ACD70A3-D8E2-5C2B-39D5-9F38C0EA8743}"/>
+                <a16:creationId xmlns:a16="http://schemas.microsoft.com/office/drawing/2014/main" id="{2AABF1B2-DDAE-2D78-BB3E-41846F4CA6DF}"/>
               </a:ext>
             </a:extLst>
           </p:cNvPr>
@@ -5293,15 +5615,40 @@
           <p:nvPr/>
         </p:nvPicPr>
         <p:blipFill>
-          <a:blip r:embed="rId2"/>
+          <a:blip r:embed="rId2">
+            <a:extLst>
+              <a:ext uri="{BEBA8EAE-BF5A-486C-A8C5-ECC9F3942E4B}">
+                <a14:imgProps xmlns:a14="http://schemas.microsoft.com/office/drawing/2010/main">
+                  <a14:imgLayer r:embed="rId3">
+                    <a14:imgEffect>
+                      <a14:backgroundRemoval t="2802" b="99569" l="9914" r="89871">
+                        <a14:foregroundMark x1="41810" y1="12284" x2="52371" y2="6466"/>
+                        <a14:foregroundMark x1="52371" y1="6466" x2="56034" y2="2802"/>
+                        <a14:foregroundMark x1="16595" y1="29741" x2="19828" y2="24138"/>
+                        <a14:foregroundMark x1="25862" y1="33621" x2="43319" y2="37069"/>
+                        <a14:foregroundMark x1="43319" y1="37069" x2="49138" y2="40302"/>
+                        <a14:foregroundMark x1="68319" y1="24569" x2="57112" y2="43103"/>
+                        <a14:foregroundMark x1="78664" y1="21767" x2="83836" y2="31250"/>
+                        <a14:foregroundMark x1="72629" y1="32543" x2="69828" y2="32759"/>
+                        <a14:foregroundMark x1="68966" y1="71121" x2="68966" y2="71121"/>
+                        <a14:foregroundMark x1="56466" y1="95043" x2="56466" y2="95043"/>
+                        <a14:foregroundMark x1="51078" y1="99353" x2="51078" y2="99353"/>
+                        <a14:foregroundMark x1="43319" y1="99569" x2="43319" y2="99569"/>
+                      </a14:backgroundRemoval>
+                    </a14:imgEffect>
+                  </a14:imgLayer>
+                </a14:imgProps>
+              </a:ext>
+            </a:extLst>
+          </a:blip>
           <a:stretch>
             <a:fillRect/>
           </a:stretch>
         </p:blipFill>
         <p:spPr>
           <a:xfrm>
-            <a:off x="4121400" y="1454400"/>
-            <a:ext cx="3949200" cy="3949200"/>
+            <a:off x="5016000" y="2349000"/>
+            <a:ext cx="2160000" cy="2160000"/>
           </a:xfrm>
           <a:prstGeom prst="rect">
             <a:avLst/>
@@ -5311,7 +5658,7 @@
     </p:spTree>
     <p:extLst>
       <p:ext uri="{BB962C8B-B14F-4D97-AF65-F5344CB8AC3E}">
-        <p14:creationId xmlns:p14="http://schemas.microsoft.com/office/powerpoint/2010/main" val="2079877518"/>
+        <p14:creationId xmlns:p14="http://schemas.microsoft.com/office/powerpoint/2010/main" val="2743365660"/>
       </p:ext>
     </p:extLst>
   </p:cSld>
@@ -5337,7 +5684,7 @@
         <p:cNvPr id="1" name="">
           <a:extLst>
             <a:ext uri="{FF2B5EF4-FFF2-40B4-BE49-F238E27FC236}">
-              <a16:creationId xmlns:a16="http://schemas.microsoft.com/office/drawing/2014/main" id="{F6B622EE-F23F-D4BD-E824-7D4E4F4EC7FC}"/>
+              <a16:creationId xmlns:a16="http://schemas.microsoft.com/office/drawing/2014/main" id="{1E1F802D-02B9-65F8-6F94-4303786E7154}"/>
             </a:ext>
           </a:extLst>
         </p:cNvPr>
@@ -5357,7 +5704,7 @@
           <p:cNvPr id="4" name="Picture 3">
             <a:extLst>
               <a:ext uri="{FF2B5EF4-FFF2-40B4-BE49-F238E27FC236}">
-                <a16:creationId xmlns:a16="http://schemas.microsoft.com/office/drawing/2014/main" id="{3C69702F-BCE3-3CE8-AB49-46B384A0C11E}"/>
+                <a16:creationId xmlns:a16="http://schemas.microsoft.com/office/drawing/2014/main" id="{9E517BB0-0C03-BAFB-E9F4-27413468A70A}"/>
               </a:ext>
             </a:extLst>
           </p:cNvPr>
@@ -5374,8 +5721,8 @@
         </p:blipFill>
         <p:spPr>
           <a:xfrm>
-            <a:off x="4121400" y="1454400"/>
-            <a:ext cx="3949200" cy="3949200"/>
+            <a:off x="5016000" y="2349000"/>
+            <a:ext cx="2160000" cy="2160000"/>
           </a:xfrm>
           <a:prstGeom prst="rect">
             <a:avLst/>
@@ -5385,7 +5732,7 @@
     </p:spTree>
     <p:extLst>
       <p:ext uri="{BB962C8B-B14F-4D97-AF65-F5344CB8AC3E}">
-        <p14:creationId xmlns:p14="http://schemas.microsoft.com/office/powerpoint/2010/main" val="602917468"/>
+        <p14:creationId xmlns:p14="http://schemas.microsoft.com/office/powerpoint/2010/main" val="1439036244"/>
       </p:ext>
     </p:extLst>
   </p:cSld>
@@ -5401,7 +5748,7 @@
     <p:bg>
       <p:bgPr>
         <a:solidFill>
-          <a:srgbClr val="646464"/>
+          <a:srgbClr val="5C5C5C"/>
         </a:solidFill>
         <a:effectLst/>
       </p:bgPr>
@@ -5411,7 +5758,7 @@
         <p:cNvPr id="1" name="">
           <a:extLst>
             <a:ext uri="{FF2B5EF4-FFF2-40B4-BE49-F238E27FC236}">
-              <a16:creationId xmlns:a16="http://schemas.microsoft.com/office/drawing/2014/main" id="{744107FE-1F9D-EA44-2E78-12F9756D8471}"/>
+              <a16:creationId xmlns:a16="http://schemas.microsoft.com/office/drawing/2014/main" id="{F3F2F404-A47E-A10E-83A1-6BDE7975BF7F}"/>
             </a:ext>
           </a:extLst>
         </p:cNvPr>
@@ -5431,7 +5778,7 @@
           <p:cNvPr id="3" name="Picture 2">
             <a:extLst>
               <a:ext uri="{FF2B5EF4-FFF2-40B4-BE49-F238E27FC236}">
-                <a16:creationId xmlns:a16="http://schemas.microsoft.com/office/drawing/2014/main" id="{89B43FF8-12A2-9A38-FB5F-D8F1CE086B4E}"/>
+                <a16:creationId xmlns:a16="http://schemas.microsoft.com/office/drawing/2014/main" id="{D4FA992D-5DF9-8C9A-88EB-4B32614E1F0F}"/>
               </a:ext>
             </a:extLst>
           </p:cNvPr>
@@ -5448,8 +5795,8 @@
         </p:blipFill>
         <p:spPr>
           <a:xfrm>
-            <a:off x="4121400" y="1454400"/>
-            <a:ext cx="3949200" cy="3949200"/>
+            <a:off x="3501517" y="1449000"/>
+            <a:ext cx="5188966" cy="3960000"/>
           </a:xfrm>
           <a:prstGeom prst="rect">
             <a:avLst/>
@@ -5459,7 +5806,7 @@
     </p:spTree>
     <p:extLst>
       <p:ext uri="{BB962C8B-B14F-4D97-AF65-F5344CB8AC3E}">
-        <p14:creationId xmlns:p14="http://schemas.microsoft.com/office/powerpoint/2010/main" val="2687700712"/>
+        <p14:creationId xmlns:p14="http://schemas.microsoft.com/office/powerpoint/2010/main" val="167649608"/>
       </p:ext>
     </p:extLst>
   </p:cSld>
@@ -5485,7 +5832,7 @@
         <p:cNvPr id="1" name="">
           <a:extLst>
             <a:ext uri="{FF2B5EF4-FFF2-40B4-BE49-F238E27FC236}">
-              <a16:creationId xmlns:a16="http://schemas.microsoft.com/office/drawing/2014/main" id="{50472FFC-7DD5-3ABE-E8BE-9B97926BBAD0}"/>
+              <a16:creationId xmlns:a16="http://schemas.microsoft.com/office/drawing/2014/main" id="{E2549A1B-8A99-F1DE-BF00-5F97CF0A0C30}"/>
             </a:ext>
           </a:extLst>
         </p:cNvPr>
@@ -5502,10 +5849,10 @@
       </p:grpSpPr>
       <p:pic>
         <p:nvPicPr>
-          <p:cNvPr id="3" name="Picture 2">
-            <a:extLst>
-              <a:ext uri="{FF2B5EF4-FFF2-40B4-BE49-F238E27FC236}">
-                <a16:creationId xmlns:a16="http://schemas.microsoft.com/office/drawing/2014/main" id="{0F79E84C-2BA4-4705-BFA4-B576E74F7D13}"/>
+          <p:cNvPr id="5" name="Picture 4">
+            <a:extLst>
+              <a:ext uri="{FF2B5EF4-FFF2-40B4-BE49-F238E27FC236}">
+                <a16:creationId xmlns:a16="http://schemas.microsoft.com/office/drawing/2014/main" id="{6348597B-538C-3C29-21EB-ADFFEF2B4664}"/>
               </a:ext>
             </a:extLst>
           </p:cNvPr>
@@ -5515,15 +5862,41 @@
           <p:nvPr/>
         </p:nvPicPr>
         <p:blipFill>
-          <a:blip r:embed="rId2"/>
+          <a:blip r:embed="rId2">
+            <a:extLst>
+              <a:ext uri="{BEBA8EAE-BF5A-486C-A8C5-ECC9F3942E4B}">
+                <a14:imgProps xmlns:a14="http://schemas.microsoft.com/office/drawing/2010/main">
+                  <a14:imgLayer r:embed="rId3">
+                    <a14:imgEffect>
+                      <a14:backgroundRemoval t="1940" b="98707" l="9914" r="89871">
+                        <a14:foregroundMark x1="51940" y1="4526" x2="51940" y2="4526"/>
+                        <a14:foregroundMark x1="52371" y1="1940" x2="52371" y2="1940"/>
+                        <a14:foregroundMark x1="27371" y1="24784" x2="42457" y2="37284"/>
+                        <a14:foregroundMark x1="28664" y1="35560" x2="28664" y2="35560"/>
+                        <a14:foregroundMark x1="52802" y1="34052" x2="69181" y2="25647"/>
+                        <a14:foregroundMark x1="78233" y1="21983" x2="82759" y2="30819"/>
+                        <a14:foregroundMark x1="82543" y1="27155" x2="82543" y2="27155"/>
+                        <a14:foregroundMark x1="83405" y1="28233" x2="83405" y2="28233"/>
+                        <a14:foregroundMark x1="83405" y1="27155" x2="83405" y2="27155"/>
+                        <a14:foregroundMark x1="83405" y1="29095" x2="83405" y2="29095"/>
+                        <a14:foregroundMark x1="60129" y1="33190" x2="75431" y2="34267"/>
+                        <a14:foregroundMark x1="53664" y1="93534" x2="53664" y2="93534"/>
+                        <a14:foregroundMark x1="50216" y1="98707" x2="50216" y2="98707"/>
+                      </a14:backgroundRemoval>
+                    </a14:imgEffect>
+                  </a14:imgLayer>
+                </a14:imgProps>
+              </a:ext>
+            </a:extLst>
+          </a:blip>
           <a:stretch>
             <a:fillRect/>
           </a:stretch>
         </p:blipFill>
         <p:spPr>
           <a:xfrm>
-            <a:off x="4121400" y="1454400"/>
-            <a:ext cx="3949200" cy="3949200"/>
+            <a:off x="5016000" y="2349000"/>
+            <a:ext cx="2160000" cy="2160000"/>
           </a:xfrm>
           <a:prstGeom prst="rect">
             <a:avLst/>
@@ -5533,7 +5906,7 @@
     </p:spTree>
     <p:extLst>
       <p:ext uri="{BB962C8B-B14F-4D97-AF65-F5344CB8AC3E}">
-        <p14:creationId xmlns:p14="http://schemas.microsoft.com/office/powerpoint/2010/main" val="1004526270"/>
+        <p14:creationId xmlns:p14="http://schemas.microsoft.com/office/powerpoint/2010/main" val="3457798839"/>
       </p:ext>
     </p:extLst>
   </p:cSld>
@@ -5559,7 +5932,7 @@
         <p:cNvPr id="1" name="">
           <a:extLst>
             <a:ext uri="{FF2B5EF4-FFF2-40B4-BE49-F238E27FC236}">
-              <a16:creationId xmlns:a16="http://schemas.microsoft.com/office/drawing/2014/main" id="{BE95D80F-A785-8BCF-10E5-66214C05618D}"/>
+              <a16:creationId xmlns:a16="http://schemas.microsoft.com/office/drawing/2014/main" id="{7B6FF0A2-6479-42A3-F5C6-D535190E5EFA}"/>
             </a:ext>
           </a:extLst>
         </p:cNvPr>
@@ -5576,10 +5949,10 @@
       </p:grpSpPr>
       <p:pic>
         <p:nvPicPr>
-          <p:cNvPr id="4" name="Picture 3">
-            <a:extLst>
-              <a:ext uri="{FF2B5EF4-FFF2-40B4-BE49-F238E27FC236}">
-                <a16:creationId xmlns:a16="http://schemas.microsoft.com/office/drawing/2014/main" id="{B7F0EF7A-A3FD-92EA-555D-F9CFD2883547}"/>
+          <p:cNvPr id="3" name="Picture 2">
+            <a:extLst>
+              <a:ext uri="{FF2B5EF4-FFF2-40B4-BE49-F238E27FC236}">
+                <a16:creationId xmlns:a16="http://schemas.microsoft.com/office/drawing/2014/main" id="{70283889-3B48-14A9-C191-81D2FDB214C3}"/>
               </a:ext>
             </a:extLst>
           </p:cNvPr>
@@ -5589,15 +5962,50 @@
           <p:nvPr/>
         </p:nvPicPr>
         <p:blipFill>
-          <a:blip r:embed="rId2"/>
+          <a:blip r:embed="rId2">
+            <a:extLst>
+              <a:ext uri="{BEBA8EAE-BF5A-486C-A8C5-ECC9F3942E4B}">
+                <a14:imgProps xmlns:a14="http://schemas.microsoft.com/office/drawing/2010/main">
+                  <a14:imgLayer r:embed="rId3">
+                    <a14:imgEffect>
+                      <a14:backgroundRemoval t="1940" b="97414" l="9914" r="89871">
+                        <a14:foregroundMark x1="44612" y1="10560" x2="44612" y2="10560"/>
+                        <a14:foregroundMark x1="50000" y1="6250" x2="50000" y2="6250"/>
+                        <a14:foregroundMark x1="47845" y1="1940" x2="47845" y2="1940"/>
+                        <a14:foregroundMark x1="56466" y1="97414" x2="56466" y2="97414"/>
+                        <a14:foregroundMark x1="61853" y1="29310" x2="61853" y2="29310"/>
+                        <a14:foregroundMark x1="34267" y1="30603" x2="34267" y2="30603"/>
+                        <a14:foregroundMark x1="33621" y1="68966" x2="33621" y2="68966"/>
+                        <a14:foregroundMark x1="51724" y1="56034" x2="51724" y2="56034"/>
+                        <a14:foregroundMark x1="76078" y1="84052" x2="76078" y2="84052"/>
+                        <a14:foregroundMark x1="85991" y1="42457" x2="85991" y2="42457"/>
+                        <a14:foregroundMark x1="85991" y1="41164" x2="85991" y2="41164"/>
+                        <a14:foregroundMark x1="86207" y1="42241" x2="86207" y2="42241"/>
+                        <a14:foregroundMark x1="86207" y1="40302" x2="86207" y2="40302"/>
+                        <a14:foregroundMark x1="76724" y1="84052" x2="76724" y2="84052"/>
+                        <a14:foregroundMark x1="76724" y1="84267" x2="76724" y2="84267"/>
+                        <a14:foregroundMark x1="76724" y1="84914" x2="76724" y2="84914"/>
+                        <a14:foregroundMark x1="76293" y1="84052" x2="76293" y2="84052"/>
+                        <a14:foregroundMark x1="76724" y1="84267" x2="76724" y2="84267"/>
+                        <a14:foregroundMark x1="76724" y1="84267" x2="76724" y2="84483"/>
+                        <a14:foregroundMark x1="79095" y1="76078" x2="79095" y2="76078"/>
+                        <a14:foregroundMark x1="76509" y1="84267" x2="77371" y2="83621"/>
+                        <a14:foregroundMark x1="77371" y1="78017" x2="77371" y2="78017"/>
+                      </a14:backgroundRemoval>
+                    </a14:imgEffect>
+                  </a14:imgLayer>
+                </a14:imgProps>
+              </a:ext>
+            </a:extLst>
+          </a:blip>
           <a:stretch>
             <a:fillRect/>
           </a:stretch>
         </p:blipFill>
         <p:spPr>
           <a:xfrm>
-            <a:off x="4121400" y="1454400"/>
-            <a:ext cx="3949200" cy="3949200"/>
+            <a:off x="5016000" y="2349000"/>
+            <a:ext cx="2160000" cy="2160000"/>
           </a:xfrm>
           <a:prstGeom prst="rect">
             <a:avLst/>
@@ -5607,7 +6015,7 @@
     </p:spTree>
     <p:extLst>
       <p:ext uri="{BB962C8B-B14F-4D97-AF65-F5344CB8AC3E}">
-        <p14:creationId xmlns:p14="http://schemas.microsoft.com/office/powerpoint/2010/main" val="3038090159"/>
+        <p14:creationId xmlns:p14="http://schemas.microsoft.com/office/powerpoint/2010/main" val="1023085850"/>
       </p:ext>
     </p:extLst>
   </p:cSld>
@@ -5633,7 +6041,7 @@
         <p:cNvPr id="1" name="">
           <a:extLst>
             <a:ext uri="{FF2B5EF4-FFF2-40B4-BE49-F238E27FC236}">
-              <a16:creationId xmlns:a16="http://schemas.microsoft.com/office/drawing/2014/main" id="{175B0C43-B8D7-9BFF-40DF-31571A55E235}"/>
+              <a16:creationId xmlns:a16="http://schemas.microsoft.com/office/drawing/2014/main" id="{443C470D-9A5B-91DA-318A-6C272308FB5F}"/>
             </a:ext>
           </a:extLst>
         </p:cNvPr>
@@ -5650,10 +6058,10 @@
       </p:grpSpPr>
       <p:pic>
         <p:nvPicPr>
-          <p:cNvPr id="2" name="Picture 1">
-            <a:extLst>
-              <a:ext uri="{FF2B5EF4-FFF2-40B4-BE49-F238E27FC236}">
-                <a16:creationId xmlns:a16="http://schemas.microsoft.com/office/drawing/2014/main" id="{B1D20682-B213-15A7-E8C8-C2DCAAFE4CD3}"/>
+          <p:cNvPr id="3" name="Picture 2">
+            <a:extLst>
+              <a:ext uri="{FF2B5EF4-FFF2-40B4-BE49-F238E27FC236}">
+                <a16:creationId xmlns:a16="http://schemas.microsoft.com/office/drawing/2014/main" id="{BD1F0431-8318-73F0-8836-CE9DCE2D28FD}"/>
               </a:ext>
             </a:extLst>
           </p:cNvPr>
@@ -5670,8 +6078,8 @@
         </p:blipFill>
         <p:spPr>
           <a:xfrm>
-            <a:off x="4121400" y="1454400"/>
-            <a:ext cx="3949200" cy="3949200"/>
+            <a:off x="5016000" y="2349000"/>
+            <a:ext cx="2160000" cy="2160000"/>
           </a:xfrm>
           <a:prstGeom prst="rect">
             <a:avLst/>
@@ -5681,7 +6089,7 @@
     </p:spTree>
     <p:extLst>
       <p:ext uri="{BB962C8B-B14F-4D97-AF65-F5344CB8AC3E}">
-        <p14:creationId xmlns:p14="http://schemas.microsoft.com/office/powerpoint/2010/main" val="1540355046"/>
+        <p14:creationId xmlns:p14="http://schemas.microsoft.com/office/powerpoint/2010/main" val="1011469499"/>
       </p:ext>
     </p:extLst>
   </p:cSld>
@@ -5707,7 +6115,7 @@
         <p:cNvPr id="1" name="">
           <a:extLst>
             <a:ext uri="{FF2B5EF4-FFF2-40B4-BE49-F238E27FC236}">
-              <a16:creationId xmlns:a16="http://schemas.microsoft.com/office/drawing/2014/main" id="{CC9EF0FA-14BF-1060-87F9-71452158C018}"/>
+              <a16:creationId xmlns:a16="http://schemas.microsoft.com/office/drawing/2014/main" id="{6E54AA87-90A2-FE43-EFA2-56AC519A3F90}"/>
             </a:ext>
           </a:extLst>
         </p:cNvPr>
@@ -5724,10 +6132,10 @@
       </p:grpSpPr>
       <p:pic>
         <p:nvPicPr>
-          <p:cNvPr id="3" name="Picture 2">
-            <a:extLst>
-              <a:ext uri="{FF2B5EF4-FFF2-40B4-BE49-F238E27FC236}">
-                <a16:creationId xmlns:a16="http://schemas.microsoft.com/office/drawing/2014/main" id="{BA94D826-2971-FE60-B8E0-3A1D067CCDF0}"/>
+          <p:cNvPr id="4" name="Picture 3">
+            <a:extLst>
+              <a:ext uri="{FF2B5EF4-FFF2-40B4-BE49-F238E27FC236}">
+                <a16:creationId xmlns:a16="http://schemas.microsoft.com/office/drawing/2014/main" id="{F53509F2-DE82-AE26-7358-5BAE99E7AEA0}"/>
               </a:ext>
             </a:extLst>
           </p:cNvPr>
@@ -5737,15 +6145,27 @@
           <p:nvPr/>
         </p:nvPicPr>
         <p:blipFill>
-          <a:blip r:embed="rId2"/>
+          <a:blip r:embed="rId2">
+            <a:extLst>
+              <a:ext uri="{BEBA8EAE-BF5A-486C-A8C5-ECC9F3942E4B}">
+                <a14:imgProps xmlns:a14="http://schemas.microsoft.com/office/drawing/2010/main">
+                  <a14:imgLayer r:embed="rId3">
+                    <a14:imgEffect>
+                      <a14:backgroundRemoval t="10000" b="90000" l="10000" r="90000"/>
+                    </a14:imgEffect>
+                  </a14:imgLayer>
+                </a14:imgProps>
+              </a:ext>
+            </a:extLst>
+          </a:blip>
           <a:stretch>
             <a:fillRect/>
           </a:stretch>
         </p:blipFill>
         <p:spPr>
           <a:xfrm>
-            <a:off x="4121400" y="1454400"/>
-            <a:ext cx="3949200" cy="3949200"/>
+            <a:off x="4680827" y="2349000"/>
+            <a:ext cx="2830345" cy="2160000"/>
           </a:xfrm>
           <a:prstGeom prst="rect">
             <a:avLst/>
@@ -5755,7 +6175,7 @@
     </p:spTree>
     <p:extLst>
       <p:ext uri="{BB962C8B-B14F-4D97-AF65-F5344CB8AC3E}">
-        <p14:creationId xmlns:p14="http://schemas.microsoft.com/office/powerpoint/2010/main" val="3138369400"/>
+        <p14:creationId xmlns:p14="http://schemas.microsoft.com/office/powerpoint/2010/main" val="621995241"/>
       </p:ext>
     </p:extLst>
   </p:cSld>
@@ -5781,7 +6201,7 @@
         <p:cNvPr id="1" name="">
           <a:extLst>
             <a:ext uri="{FF2B5EF4-FFF2-40B4-BE49-F238E27FC236}">
-              <a16:creationId xmlns:a16="http://schemas.microsoft.com/office/drawing/2014/main" id="{76D4FADA-1D18-D543-8664-E51154FF8FB5}"/>
+              <a16:creationId xmlns:a16="http://schemas.microsoft.com/office/drawing/2014/main" id="{9ECDCAC2-305E-E2C4-69B5-5035E5D5B8D0}"/>
             </a:ext>
           </a:extLst>
         </p:cNvPr>
@@ -5801,7 +6221,7 @@
           <p:cNvPr id="4" name="Picture 3">
             <a:extLst>
               <a:ext uri="{FF2B5EF4-FFF2-40B4-BE49-F238E27FC236}">
-                <a16:creationId xmlns:a16="http://schemas.microsoft.com/office/drawing/2014/main" id="{D2E32F9E-80DE-D59A-F217-30F87E616522}"/>
+                <a16:creationId xmlns:a16="http://schemas.microsoft.com/office/drawing/2014/main" id="{AB5083BC-61B5-79C7-618E-4FE538A0DBD5}"/>
               </a:ext>
             </a:extLst>
           </p:cNvPr>
@@ -5811,25 +6231,76 @@
           <p:nvPr/>
         </p:nvPicPr>
         <p:blipFill>
-          <a:blip r:embed="rId2"/>
+          <a:blip r:embed="rId2">
+            <a:extLst>
+              <a:ext uri="{BEBA8EAE-BF5A-486C-A8C5-ECC9F3942E4B}">
+                <a14:imgProps xmlns:a14="http://schemas.microsoft.com/office/drawing/2010/main">
+                  <a14:imgLayer r:embed="rId3">
+                    <a14:imgEffect>
+                      <a14:backgroundRemoval t="10000" b="90000" l="10000" r="90000"/>
+                    </a14:imgEffect>
+                  </a14:imgLayer>
+                </a14:imgProps>
+              </a:ext>
+            </a:extLst>
+          </a:blip>
           <a:stretch>
             <a:fillRect/>
           </a:stretch>
         </p:blipFill>
         <p:spPr>
           <a:xfrm>
-            <a:off x="4121400" y="1454400"/>
-            <a:ext cx="3949200" cy="3949200"/>
+            <a:off x="4680827" y="2349000"/>
+            <a:ext cx="2830345" cy="2160000"/>
           </a:xfrm>
           <a:prstGeom prst="rect">
             <a:avLst/>
           </a:prstGeom>
         </p:spPr>
       </p:pic>
+      <p:pic>
+        <p:nvPicPr>
+          <p:cNvPr id="12" name="Graphic 11" descr="Close with solid fill">
+            <a:extLst>
+              <a:ext uri="{FF2B5EF4-FFF2-40B4-BE49-F238E27FC236}">
+                <a16:creationId xmlns:a16="http://schemas.microsoft.com/office/drawing/2014/main" id="{585D4A3B-AFE8-09B3-F2B4-EE908C0264BF}"/>
+              </a:ext>
+            </a:extLst>
+          </p:cNvPr>
+          <p:cNvPicPr>
+            <a:picLocks noChangeAspect="1"/>
+          </p:cNvPicPr>
+          <p:nvPr/>
+        </p:nvPicPr>
+        <p:blipFill>
+          <a:blip r:embed="rId4">
+            <a:extLst>
+              <a:ext uri="{96DAC541-7B7A-43D3-8B79-37D633B846F1}">
+                <asvg:svgBlip xmlns:asvg="http://schemas.microsoft.com/office/drawing/2016/SVG/main" r:embed="rId5"/>
+              </a:ext>
+            </a:extLst>
+          </a:blip>
+          <a:stretch>
+            <a:fillRect/>
+          </a:stretch>
+        </p:blipFill>
+        <p:spPr>
+          <a:xfrm>
+            <a:off x="5015999" y="2349000"/>
+            <a:ext cx="2160000" cy="2160000"/>
+          </a:xfrm>
+          <a:prstGeom prst="rect">
+            <a:avLst/>
+          </a:prstGeom>
+          <a:effectLst>
+            <a:softEdge rad="0"/>
+          </a:effectLst>
+        </p:spPr>
+      </p:pic>
     </p:spTree>
     <p:extLst>
       <p:ext uri="{BB962C8B-B14F-4D97-AF65-F5344CB8AC3E}">
-        <p14:creationId xmlns:p14="http://schemas.microsoft.com/office/powerpoint/2010/main" val="3876573207"/>
+        <p14:creationId xmlns:p14="http://schemas.microsoft.com/office/powerpoint/2010/main" val="3112204446"/>
       </p:ext>
     </p:extLst>
   </p:cSld>
@@ -5866,10 +6337,10 @@
       </p:grpSpPr>
       <p:sp>
         <p:nvSpPr>
-          <p:cNvPr id="6" name="TextBox 5">
-            <a:extLst>
-              <a:ext uri="{FF2B5EF4-FFF2-40B4-BE49-F238E27FC236}">
-                <a16:creationId xmlns:a16="http://schemas.microsoft.com/office/drawing/2014/main" id="{D73EA4BC-C794-ADDF-A1A3-B7FC9E83B19C}"/>
+          <p:cNvPr id="5" name="TextBox 4">
+            <a:extLst>
+              <a:ext uri="{FF2B5EF4-FFF2-40B4-BE49-F238E27FC236}">
+                <a16:creationId xmlns:a16="http://schemas.microsoft.com/office/drawing/2014/main" id="{5C3101FE-916F-7AC8-03CF-F8680EC21ADF}"/>
               </a:ext>
             </a:extLst>
           </p:cNvPr>
@@ -5878,8 +6349,8 @@
         </p:nvSpPr>
         <p:spPr>
           <a:xfrm>
-            <a:off x="373853" y="3013501"/>
-            <a:ext cx="11444287" cy="830997"/>
+            <a:off x="373856" y="2510165"/>
+            <a:ext cx="11444287" cy="1569660"/>
           </a:xfrm>
           <a:prstGeom prst="rect">
             <a:avLst/>
@@ -5894,14 +6365,14 @@
           <a:p>
             <a:pPr algn="ctr"/>
             <a:r>
-              <a:rPr lang="en-CH" sz="4800" dirty="0">
+              <a:rPr lang="en-CH" sz="9600" dirty="0">
                 <a:solidFill>
                   <a:schemeClr val="bg1"/>
                 </a:solidFill>
-                <a:latin typeface="Arial" panose="020B0604020202020204" pitchFamily="34" charset="0"/>
+                <a:latin typeface="Avenir Light" panose="020B0402020203020204" pitchFamily="34" charset="77"/>
                 <a:cs typeface="Arial" panose="020B0604020202020204" pitchFamily="34" charset="0"/>
               </a:rPr>
-              <a:t>+ 1</a:t>
+              <a:t>+</a:t>
             </a:r>
           </a:p>
         </p:txBody>
@@ -5909,7 +6380,7 @@
     </p:spTree>
     <p:extLst>
       <p:ext uri="{BB962C8B-B14F-4D97-AF65-F5344CB8AC3E}">
-        <p14:creationId xmlns:p14="http://schemas.microsoft.com/office/powerpoint/2010/main" val="1062932709"/>
+        <p14:creationId xmlns:p14="http://schemas.microsoft.com/office/powerpoint/2010/main" val="3372457678"/>
       </p:ext>
     </p:extLst>
   </p:cSld>
@@ -6114,6 +6585,86 @@
 </file>
 
 <file path=ppt/slides/slide40.xml><?xml version="1.0" encoding="utf-8"?>
+<p:sld xmlns:a="http://schemas.openxmlformats.org/drawingml/2006/main" xmlns:r="http://schemas.openxmlformats.org/officeDocument/2006/relationships" xmlns:p="http://schemas.openxmlformats.org/presentationml/2006/main">
+  <p:cSld>
+    <p:bg>
+      <p:bgPr>
+        <a:solidFill>
+          <a:srgbClr val="5C5C5C"/>
+        </a:solidFill>
+        <a:effectLst/>
+      </p:bgPr>
+    </p:bg>
+    <p:spTree>
+      <p:nvGrpSpPr>
+        <p:cNvPr id="1" name=""/>
+        <p:cNvGrpSpPr/>
+        <p:nvPr/>
+      </p:nvGrpSpPr>
+      <p:grpSpPr>
+        <a:xfrm>
+          <a:off x="0" y="0"/>
+          <a:ext cx="0" cy="0"/>
+          <a:chOff x="0" y="0"/>
+          <a:chExt cx="0" cy="0"/>
+        </a:xfrm>
+      </p:grpSpPr>
+      <p:sp>
+        <p:nvSpPr>
+          <p:cNvPr id="6" name="TextBox 5">
+            <a:extLst>
+              <a:ext uri="{FF2B5EF4-FFF2-40B4-BE49-F238E27FC236}">
+                <a16:creationId xmlns:a16="http://schemas.microsoft.com/office/drawing/2014/main" id="{D73EA4BC-C794-ADDF-A1A3-B7FC9E83B19C}"/>
+              </a:ext>
+            </a:extLst>
+          </p:cNvPr>
+          <p:cNvSpPr txBox="1"/>
+          <p:nvPr/>
+        </p:nvSpPr>
+        <p:spPr>
+          <a:xfrm>
+            <a:off x="373853" y="3013501"/>
+            <a:ext cx="11444287" cy="830997"/>
+          </a:xfrm>
+          <a:prstGeom prst="rect">
+            <a:avLst/>
+          </a:prstGeom>
+          <a:noFill/>
+        </p:spPr>
+        <p:txBody>
+          <a:bodyPr wrap="square" rtlCol="0">
+            <a:spAutoFit/>
+          </a:bodyPr>
+          <a:lstStyle/>
+          <a:p>
+            <a:pPr algn="ctr"/>
+            <a:r>
+              <a:rPr lang="en-CH" sz="4800" dirty="0">
+                <a:solidFill>
+                  <a:schemeClr val="bg1"/>
+                </a:solidFill>
+                <a:latin typeface="Arial" panose="020B0604020202020204" pitchFamily="34" charset="0"/>
+                <a:cs typeface="Arial" panose="020B0604020202020204" pitchFamily="34" charset="0"/>
+              </a:rPr>
+              <a:t>+ 1</a:t>
+            </a:r>
+          </a:p>
+        </p:txBody>
+      </p:sp>
+    </p:spTree>
+    <p:extLst>
+      <p:ext uri="{BB962C8B-B14F-4D97-AF65-F5344CB8AC3E}">
+        <p14:creationId xmlns:p14="http://schemas.microsoft.com/office/powerpoint/2010/main" val="1062932709"/>
+      </p:ext>
+    </p:extLst>
+  </p:cSld>
+  <p:clrMapOvr>
+    <a:masterClrMapping/>
+  </p:clrMapOvr>
+</p:sld>
+</file>
+
+<file path=ppt/slides/slide41.xml><?xml version="1.0" encoding="utf-8"?>
 <p:sld xmlns:a="http://schemas.openxmlformats.org/drawingml/2006/main" xmlns:r="http://schemas.openxmlformats.org/officeDocument/2006/relationships" xmlns:p="http://schemas.openxmlformats.org/presentationml/2006/main">
   <p:cSld>
     <p:bg>
@@ -6294,10 +6845,10 @@
       </p:grpSpPr>
       <p:pic>
         <p:nvPicPr>
-          <p:cNvPr id="3" name="Picture 2">
-            <a:extLst>
-              <a:ext uri="{FF2B5EF4-FFF2-40B4-BE49-F238E27FC236}">
-                <a16:creationId xmlns:a16="http://schemas.microsoft.com/office/drawing/2014/main" id="{7EB2FB4D-C64D-9D3E-1D86-97A662A6A574}"/>
+          <p:cNvPr id="10" name="Picture 9">
+            <a:extLst>
+              <a:ext uri="{FF2B5EF4-FFF2-40B4-BE49-F238E27FC236}">
+                <a16:creationId xmlns:a16="http://schemas.microsoft.com/office/drawing/2014/main" id="{BEF3D65A-5462-E8CF-AC01-B62E2C036211}"/>
               </a:ext>
             </a:extLst>
           </p:cNvPr>
@@ -6307,7 +6858,29 @@
           <p:nvPr/>
         </p:nvPicPr>
         <p:blipFill>
-          <a:blip r:embed="rId2"/>
+          <a:blip r:embed="rId2">
+            <a:extLst>
+              <a:ext uri="{BEBA8EAE-BF5A-486C-A8C5-ECC9F3942E4B}">
+                <a14:imgProps xmlns:a14="http://schemas.microsoft.com/office/drawing/2010/main">
+                  <a14:imgLayer r:embed="rId3">
+                    <a14:imgEffect>
+                      <a14:backgroundRemoval t="1940" b="98060" l="9914" r="89871">
+                        <a14:foregroundMark x1="52586" y1="6250" x2="52586" y2="6250"/>
+                        <a14:foregroundMark x1="52155" y1="1940" x2="52155" y2="1940"/>
+                        <a14:foregroundMark x1="33621" y1="21767" x2="33190" y2="44828"/>
+                        <a14:foregroundMark x1="33190" y1="44828" x2="32759" y2="45043"/>
+                        <a14:foregroundMark x1="65086" y1="19612" x2="71121" y2="43319"/>
+                        <a14:foregroundMark x1="13362" y1="39871" x2="18750" y2="25647"/>
+                        <a14:foregroundMark x1="51293" y1="92241" x2="51293" y2="92241"/>
+                        <a14:foregroundMark x1="50862" y1="98060" x2="50862" y2="98060"/>
+                        <a14:foregroundMark x1="75647" y1="18319" x2="75647" y2="18319"/>
+                      </a14:backgroundRemoval>
+                    </a14:imgEffect>
+                  </a14:imgLayer>
+                </a14:imgProps>
+              </a:ext>
+            </a:extLst>
+          </a:blip>
           <a:stretch>
             <a:fillRect/>
           </a:stretch>
@@ -6341,14 +6914,20 @@
     <p:bg>
       <p:bgPr>
         <a:solidFill>
-          <a:srgbClr val="5C5C5C"/>
+          <a:srgbClr val="646464"/>
         </a:solidFill>
         <a:effectLst/>
       </p:bgPr>
     </p:bg>
     <p:spTree>
       <p:nvGrpSpPr>
-        <p:cNvPr id="1" name=""/>
+        <p:cNvPr id="1" name="">
+          <a:extLst>
+            <a:ext uri="{FF2B5EF4-FFF2-40B4-BE49-F238E27FC236}">
+              <a16:creationId xmlns:a16="http://schemas.microsoft.com/office/drawing/2014/main" id="{F8DB4A07-65F7-C296-104F-8BFCE9B676D3}"/>
+            </a:ext>
+          </a:extLst>
+        </p:cNvPr>
         <p:cNvGrpSpPr/>
         <p:nvPr/>
       </p:nvGrpSpPr>
@@ -6362,10 +6941,10 @@
       </p:grpSpPr>
       <p:pic>
         <p:nvPicPr>
-          <p:cNvPr id="3" name="Picture 2">
-            <a:extLst>
-              <a:ext uri="{FF2B5EF4-FFF2-40B4-BE49-F238E27FC236}">
-                <a16:creationId xmlns:a16="http://schemas.microsoft.com/office/drawing/2014/main" id="{08526774-AD3D-A2BF-8B22-289424073E47}"/>
+          <p:cNvPr id="8" name="Picture 7">
+            <a:extLst>
+              <a:ext uri="{FF2B5EF4-FFF2-40B4-BE49-F238E27FC236}">
+                <a16:creationId xmlns:a16="http://schemas.microsoft.com/office/drawing/2014/main" id="{27FB650C-4E7B-F242-F4CF-1A623EA5452F}"/>
               </a:ext>
             </a:extLst>
           </p:cNvPr>
@@ -6375,15 +6954,37 @@
           <p:nvPr/>
         </p:nvPicPr>
         <p:blipFill>
-          <a:blip r:embed="rId2"/>
+          <a:blip r:embed="rId2">
+            <a:extLst>
+              <a:ext uri="{BEBA8EAE-BF5A-486C-A8C5-ECC9F3942E4B}">
+                <a14:imgProps xmlns:a14="http://schemas.microsoft.com/office/drawing/2010/main">
+                  <a14:imgLayer r:embed="rId3">
+                    <a14:imgEffect>
+                      <a14:backgroundRemoval t="1940" b="99353" l="9914" r="89871">
+                        <a14:foregroundMark x1="44612" y1="6034" x2="44612" y2="6034"/>
+                        <a14:foregroundMark x1="50216" y1="2155" x2="50216" y2="2155"/>
+                        <a14:foregroundMark x1="35129" y1="25000" x2="35776" y2="37069"/>
+                        <a14:foregroundMark x1="27155" y1="35345" x2="27155" y2="35345"/>
+                        <a14:foregroundMark x1="40086" y1="35776" x2="40086" y2="35776"/>
+                        <a14:foregroundMark x1="60991" y1="27802" x2="75000" y2="32974"/>
+                        <a14:foregroundMark x1="31466" y1="68750" x2="36207" y2="72198"/>
+                        <a14:foregroundMark x1="47629" y1="94397" x2="47629" y2="94397"/>
+                        <a14:foregroundMark x1="49784" y1="99353" x2="49784" y2="99353"/>
+                      </a14:backgroundRemoval>
+                    </a14:imgEffect>
+                  </a14:imgLayer>
+                </a14:imgProps>
+              </a:ext>
+            </a:extLst>
+          </a:blip>
           <a:stretch>
             <a:fillRect/>
           </a:stretch>
         </p:blipFill>
         <p:spPr>
           <a:xfrm>
-            <a:off x="3501517" y="1449000"/>
-            <a:ext cx="5188966" cy="3960000"/>
+            <a:off x="5016000" y="2349000"/>
+            <a:ext cx="2160000" cy="2160000"/>
           </a:xfrm>
           <a:prstGeom prst="rect">
             <a:avLst/>
@@ -6393,7 +6994,7 @@
     </p:spTree>
     <p:extLst>
       <p:ext uri="{BB962C8B-B14F-4D97-AF65-F5344CB8AC3E}">
-        <p14:creationId xmlns:p14="http://schemas.microsoft.com/office/powerpoint/2010/main" val="4139463847"/>
+        <p14:creationId xmlns:p14="http://schemas.microsoft.com/office/powerpoint/2010/main" val="2575793716"/>
       </p:ext>
     </p:extLst>
   </p:cSld>
@@ -6419,7 +7020,7 @@
         <p:cNvPr id="1" name="">
           <a:extLst>
             <a:ext uri="{FF2B5EF4-FFF2-40B4-BE49-F238E27FC236}">
-              <a16:creationId xmlns:a16="http://schemas.microsoft.com/office/drawing/2014/main" id="{8E821182-6885-2416-A668-D4183C90ACD1}"/>
+              <a16:creationId xmlns:a16="http://schemas.microsoft.com/office/drawing/2014/main" id="{DE19C48C-AD49-1B80-D533-BE394BE774BD}"/>
             </a:ext>
           </a:extLst>
         </p:cNvPr>
@@ -6436,10 +7037,10 @@
       </p:grpSpPr>
       <p:pic>
         <p:nvPicPr>
-          <p:cNvPr id="4" name="Picture 3">
-            <a:extLst>
-              <a:ext uri="{FF2B5EF4-FFF2-40B4-BE49-F238E27FC236}">
-                <a16:creationId xmlns:a16="http://schemas.microsoft.com/office/drawing/2014/main" id="{8AB7B542-2D53-49EB-869E-3A95B8434C64}"/>
+          <p:cNvPr id="6" name="Picture 5">
+            <a:extLst>
+              <a:ext uri="{FF2B5EF4-FFF2-40B4-BE49-F238E27FC236}">
+                <a16:creationId xmlns:a16="http://schemas.microsoft.com/office/drawing/2014/main" id="{52D5C8F3-9035-6AF3-84E4-F6C9D9B8184F}"/>
               </a:ext>
             </a:extLst>
           </p:cNvPr>
@@ -6467,7 +7068,7 @@
     </p:spTree>
     <p:extLst>
       <p:ext uri="{BB962C8B-B14F-4D97-AF65-F5344CB8AC3E}">
-        <p14:creationId xmlns:p14="http://schemas.microsoft.com/office/powerpoint/2010/main" val="1808002623"/>
+        <p14:creationId xmlns:p14="http://schemas.microsoft.com/office/powerpoint/2010/main" val="1763482391"/>
       </p:ext>
     </p:extLst>
   </p:cSld>
@@ -6507,7 +7108,7 @@
           <p:cNvPr id="3" name="Picture 2">
             <a:extLst>
               <a:ext uri="{FF2B5EF4-FFF2-40B4-BE49-F238E27FC236}">
-                <a16:creationId xmlns:a16="http://schemas.microsoft.com/office/drawing/2014/main" id="{02C3729A-FF3F-F995-3345-DEEDC1FC84C1}"/>
+                <a16:creationId xmlns:a16="http://schemas.microsoft.com/office/drawing/2014/main" id="{08526774-AD3D-A2BF-8B22-289424073E47}"/>
               </a:ext>
             </a:extLst>
           </p:cNvPr>
@@ -6535,7 +7136,7 @@
     </p:spTree>
     <p:extLst>
       <p:ext uri="{BB962C8B-B14F-4D97-AF65-F5344CB8AC3E}">
-        <p14:creationId xmlns:p14="http://schemas.microsoft.com/office/powerpoint/2010/main" val="1313142258"/>
+        <p14:creationId xmlns:p14="http://schemas.microsoft.com/office/powerpoint/2010/main" val="4139463847"/>
       </p:ext>
     </p:extLst>
   </p:cSld>

</xml_diff>